<commit_message>
added examples and  code activity
</commit_message>
<xml_diff>
--- a/slides/On-Campus/03_02_Loops.pptx
+++ b/slides/On-Campus/03_02_Loops.pptx
@@ -5,10 +5,10 @@
     <p:sldMasterId id="2147483648" r:id="rId1"/>
   </p:sldMasterIdLst>
   <p:notesMasterIdLst>
-    <p:notesMasterId r:id="rId12"/>
+    <p:notesMasterId r:id="rId15"/>
   </p:notesMasterIdLst>
   <p:handoutMasterIdLst>
-    <p:handoutMasterId r:id="rId13"/>
+    <p:handoutMasterId r:id="rId16"/>
   </p:handoutMasterIdLst>
   <p:sldIdLst>
     <p:sldId id="256" r:id="rId2"/>
@@ -17,10 +17,13 @@
     <p:sldId id="258" r:id="rId5"/>
     <p:sldId id="265" r:id="rId6"/>
     <p:sldId id="259" r:id="rId7"/>
-    <p:sldId id="260" r:id="rId8"/>
-    <p:sldId id="264" r:id="rId9"/>
-    <p:sldId id="261" r:id="rId10"/>
-    <p:sldId id="262" r:id="rId11"/>
+    <p:sldId id="266" r:id="rId8"/>
+    <p:sldId id="260" r:id="rId9"/>
+    <p:sldId id="267" r:id="rId10"/>
+    <p:sldId id="264" r:id="rId11"/>
+    <p:sldId id="261" r:id="rId12"/>
+    <p:sldId id="262" r:id="rId13"/>
+    <p:sldId id="268" r:id="rId14"/>
   </p:sldIdLst>
   <p:sldSz cx="13817600" cy="7772400"/>
   <p:notesSz cx="6858000" cy="9144000"/>
@@ -223,7 +226,7 @@
           <a:p>
             <a:fld id="{4D7E51A5-B478-1E40-8CBB-0DAA8831E99D}" type="datetimeFigureOut">
               <a:rPr lang="en-US" smtClean="0"/>
-              <a:t>8/26/2021</a:t>
+              <a:t>9/1/2021</a:t>
             </a:fld>
             <a:endParaRPr lang="en-US"/>
           </a:p>
@@ -388,7 +391,7 @@
           <a:p>
             <a:fld id="{D0ED587F-861E-6740-9643-E3DDAE89B8D6}" type="datetimeFigureOut">
               <a:rPr lang="en-US" smtClean="0"/>
-              <a:t>8/26/2021</a:t>
+              <a:t>9/1/2021</a:t>
             </a:fld>
             <a:endParaRPr lang="en-US"/>
           </a:p>
@@ -6709,10 +6712,947 @@
       </p:transition>
     </mc:Fallback>
   </mc:AlternateContent>
+  <p:timing>
+    <p:tnLst>
+      <p:par>
+        <p:cTn id="1" dur="indefinite" restart="never" nodeType="tmRoot"/>
+      </p:par>
+    </p:tnLst>
+  </p:timing>
 </p:sld>
 </file>
 
 <file path=ppt/slides/slide10.xml><?xml version="1.0" encoding="utf-8"?>
+<p:sld xmlns:a="http://schemas.openxmlformats.org/drawingml/2006/main" xmlns:r="http://schemas.openxmlformats.org/officeDocument/2006/relationships" xmlns:p="http://schemas.openxmlformats.org/presentationml/2006/main">
+  <p:cSld>
+    <p:spTree>
+      <p:nvGrpSpPr>
+        <p:cNvPr id="1" name=""/>
+        <p:cNvGrpSpPr/>
+        <p:nvPr/>
+      </p:nvGrpSpPr>
+      <p:grpSpPr>
+        <a:xfrm>
+          <a:off x="0" y="0"/>
+          <a:ext cx="0" cy="0"/>
+          <a:chOff x="0" y="0"/>
+          <a:chExt cx="0" cy="0"/>
+        </a:xfrm>
+      </p:grpSpPr>
+      <p:sp>
+        <p:nvSpPr>
+          <p:cNvPr id="2" name="Title 1">
+            <a:extLst>
+              <a:ext uri="{FF2B5EF4-FFF2-40B4-BE49-F238E27FC236}">
+                <a16:creationId xmlns:a16="http://schemas.microsoft.com/office/drawing/2014/main" id="{380B640B-36BF-3C4B-916C-AC584F6601AF}"/>
+              </a:ext>
+            </a:extLst>
+          </p:cNvPr>
+          <p:cNvSpPr>
+            <a:spLocks noGrp="1"/>
+          </p:cNvSpPr>
+          <p:nvPr>
+            <p:ph type="title"/>
+          </p:nvPr>
+        </p:nvSpPr>
+        <p:spPr/>
+        <p:txBody>
+          <a:bodyPr/>
+          <a:lstStyle/>
+          <a:p>
+            <a:r>
+              <a:rPr lang="en-US" dirty="0"/>
+              <a:t>Activity</a:t>
+            </a:r>
+          </a:p>
+        </p:txBody>
+      </p:sp>
+      <p:sp>
+        <p:nvSpPr>
+          <p:cNvPr id="3" name="Text Placeholder 2">
+            <a:extLst>
+              <a:ext uri="{FF2B5EF4-FFF2-40B4-BE49-F238E27FC236}">
+                <a16:creationId xmlns:a16="http://schemas.microsoft.com/office/drawing/2014/main" id="{52466651-B913-2643-95EC-1F7359A4277D}"/>
+              </a:ext>
+            </a:extLst>
+          </p:cNvPr>
+          <p:cNvSpPr>
+            <a:spLocks noGrp="1"/>
+          </p:cNvSpPr>
+          <p:nvPr>
+            <p:ph type="body" sz="quarter" idx="10"/>
+          </p:nvPr>
+        </p:nvSpPr>
+        <p:spPr>
+          <a:xfrm>
+            <a:off x="628075" y="1776683"/>
+            <a:ext cx="12561453" cy="494879"/>
+          </a:xfrm>
+        </p:spPr>
+        <p:txBody>
+          <a:bodyPr/>
+          <a:lstStyle/>
+          <a:p>
+            <a:r>
+              <a:rPr lang="en-US" dirty="0"/>
+              <a:t>Write the following as a </a:t>
+            </a:r>
+            <a:r>
+              <a:rPr lang="en-US" b="1" dirty="0"/>
+              <a:t>for</a:t>
+            </a:r>
+            <a:r>
+              <a:rPr lang="en-US" dirty="0"/>
+              <a:t> loop</a:t>
+            </a:r>
+          </a:p>
+        </p:txBody>
+      </p:sp>
+      <p:sp>
+        <p:nvSpPr>
+          <p:cNvPr id="5" name="TextBox 4">
+            <a:extLst>
+              <a:ext uri="{FF2B5EF4-FFF2-40B4-BE49-F238E27FC236}">
+                <a16:creationId xmlns:a16="http://schemas.microsoft.com/office/drawing/2014/main" id="{7043FF54-5C91-2B42-8FCC-7C6355334681}"/>
+              </a:ext>
+            </a:extLst>
+          </p:cNvPr>
+          <p:cNvSpPr txBox="1"/>
+          <p:nvPr/>
+        </p:nvSpPr>
+        <p:spPr>
+          <a:xfrm>
+            <a:off x="3454400" y="2611750"/>
+            <a:ext cx="6908800" cy="2554545"/>
+          </a:xfrm>
+          <a:prstGeom prst="rect">
+            <a:avLst/>
+          </a:prstGeom>
+          <a:noFill/>
+        </p:spPr>
+        <p:txBody>
+          <a:bodyPr wrap="square">
+            <a:spAutoFit/>
+          </a:bodyPr>
+          <a:lstStyle/>
+          <a:p>
+            <a:r>
+              <a:rPr lang="en-US" dirty="0">
+                <a:solidFill>
+                  <a:srgbClr val="CC7832"/>
+                </a:solidFill>
+                <a:effectLst/>
+                <a:latin typeface="Consolas" panose="020B0609020204030204" pitchFamily="49" charset="0"/>
+                <a:cs typeface="Consolas" panose="020B0609020204030204" pitchFamily="49" charset="0"/>
+              </a:rPr>
+              <a:t>public static void </a:t>
+            </a:r>
+            <a:r>
+              <a:rPr lang="en-US" dirty="0" err="1">
+                <a:solidFill>
+                  <a:srgbClr val="FFC66D"/>
+                </a:solidFill>
+                <a:effectLst/>
+                <a:latin typeface="Consolas" panose="020B0609020204030204" pitchFamily="49" charset="0"/>
+                <a:cs typeface="Consolas" panose="020B0609020204030204" pitchFamily="49" charset="0"/>
+              </a:rPr>
+              <a:t>simpleLoop</a:t>
+            </a:r>
+            <a:r>
+              <a:rPr lang="en-US" dirty="0">
+                <a:latin typeface="Consolas" panose="020B0609020204030204" pitchFamily="49" charset="0"/>
+                <a:cs typeface="Consolas" panose="020B0609020204030204" pitchFamily="49" charset="0"/>
+              </a:rPr>
+              <a:t>(</a:t>
+            </a:r>
+            <a:r>
+              <a:rPr lang="en-US" dirty="0">
+                <a:solidFill>
+                  <a:srgbClr val="CC7832"/>
+                </a:solidFill>
+                <a:effectLst/>
+                <a:latin typeface="Consolas" panose="020B0609020204030204" pitchFamily="49" charset="0"/>
+                <a:cs typeface="Consolas" panose="020B0609020204030204" pitchFamily="49" charset="0"/>
+              </a:rPr>
+              <a:t>int </a:t>
+            </a:r>
+            <a:r>
+              <a:rPr lang="en-US" i="1" dirty="0">
+                <a:solidFill>
+                  <a:srgbClr val="9876AA"/>
+                </a:solidFill>
+                <a:effectLst/>
+                <a:latin typeface="Consolas" panose="020B0609020204030204" pitchFamily="49" charset="0"/>
+                <a:cs typeface="Consolas" panose="020B0609020204030204" pitchFamily="49" charset="0"/>
+              </a:rPr>
+              <a:t>total</a:t>
+            </a:r>
+            <a:r>
+              <a:rPr lang="en-US" dirty="0">
+                <a:latin typeface="Consolas" panose="020B0609020204030204" pitchFamily="49" charset="0"/>
+                <a:cs typeface="Consolas" panose="020B0609020204030204" pitchFamily="49" charset="0"/>
+              </a:rPr>
+              <a:t>) {</a:t>
+            </a:r>
+            <a:br>
+              <a:rPr lang="en-US" dirty="0">
+                <a:latin typeface="Consolas" panose="020B0609020204030204" pitchFamily="49" charset="0"/>
+                <a:cs typeface="Consolas" panose="020B0609020204030204" pitchFamily="49" charset="0"/>
+              </a:rPr>
+            </a:br>
+            <a:r>
+              <a:rPr lang="en-US" dirty="0">
+                <a:latin typeface="Consolas" panose="020B0609020204030204" pitchFamily="49" charset="0"/>
+                <a:cs typeface="Consolas" panose="020B0609020204030204" pitchFamily="49" charset="0"/>
+              </a:rPr>
+              <a:t/>
+            </a:r>
+            <a:br>
+              <a:rPr lang="en-US" dirty="0">
+                <a:latin typeface="Consolas" panose="020B0609020204030204" pitchFamily="49" charset="0"/>
+                <a:cs typeface="Consolas" panose="020B0609020204030204" pitchFamily="49" charset="0"/>
+              </a:rPr>
+            </a:br>
+            <a:r>
+              <a:rPr lang="en-US" dirty="0">
+                <a:latin typeface="Consolas" panose="020B0609020204030204" pitchFamily="49" charset="0"/>
+                <a:cs typeface="Consolas" panose="020B0609020204030204" pitchFamily="49" charset="0"/>
+              </a:rPr>
+              <a:t>    </a:t>
+            </a:r>
+            <a:r>
+              <a:rPr lang="en-US" dirty="0">
+                <a:solidFill>
+                  <a:srgbClr val="CC7832"/>
+                </a:solidFill>
+                <a:effectLst/>
+                <a:latin typeface="Consolas" panose="020B0609020204030204" pitchFamily="49" charset="0"/>
+                <a:cs typeface="Consolas" panose="020B0609020204030204" pitchFamily="49" charset="0"/>
+              </a:rPr>
+              <a:t>int </a:t>
+            </a:r>
+            <a:r>
+              <a:rPr lang="en-US" i="1" dirty="0" err="1">
+                <a:solidFill>
+                  <a:srgbClr val="9876AA"/>
+                </a:solidFill>
+                <a:effectLst/>
+                <a:latin typeface="Consolas" panose="020B0609020204030204" pitchFamily="49" charset="0"/>
+                <a:cs typeface="Consolas" panose="020B0609020204030204" pitchFamily="49" charset="0"/>
+              </a:rPr>
+              <a:t>i</a:t>
+            </a:r>
+            <a:r>
+              <a:rPr lang="en-US" i="1" dirty="0">
+                <a:solidFill>
+                  <a:srgbClr val="9876AA"/>
+                </a:solidFill>
+                <a:effectLst/>
+                <a:latin typeface="Consolas" panose="020B0609020204030204" pitchFamily="49" charset="0"/>
+                <a:cs typeface="Consolas" panose="020B0609020204030204" pitchFamily="49" charset="0"/>
+              </a:rPr>
+              <a:t> </a:t>
+            </a:r>
+            <a:r>
+              <a:rPr lang="en-US" dirty="0">
+                <a:latin typeface="Consolas" panose="020B0609020204030204" pitchFamily="49" charset="0"/>
+                <a:cs typeface="Consolas" panose="020B0609020204030204" pitchFamily="49" charset="0"/>
+              </a:rPr>
+              <a:t>= </a:t>
+            </a:r>
+            <a:r>
+              <a:rPr lang="en-US" dirty="0">
+                <a:solidFill>
+                  <a:srgbClr val="6897BB"/>
+                </a:solidFill>
+                <a:effectLst/>
+                <a:latin typeface="Consolas" panose="020B0609020204030204" pitchFamily="49" charset="0"/>
+                <a:cs typeface="Consolas" panose="020B0609020204030204" pitchFamily="49" charset="0"/>
+              </a:rPr>
+              <a:t>1</a:t>
+            </a:r>
+            <a:r>
+              <a:rPr lang="en-US" dirty="0">
+                <a:solidFill>
+                  <a:srgbClr val="CC7832"/>
+                </a:solidFill>
+                <a:effectLst/>
+                <a:latin typeface="Consolas" panose="020B0609020204030204" pitchFamily="49" charset="0"/>
+                <a:cs typeface="Consolas" panose="020B0609020204030204" pitchFamily="49" charset="0"/>
+              </a:rPr>
+              <a:t>;</a:t>
+            </a:r>
+            <a:br>
+              <a:rPr lang="en-US" dirty="0">
+                <a:solidFill>
+                  <a:srgbClr val="CC7832"/>
+                </a:solidFill>
+                <a:effectLst/>
+                <a:latin typeface="Consolas" panose="020B0609020204030204" pitchFamily="49" charset="0"/>
+                <a:cs typeface="Consolas" panose="020B0609020204030204" pitchFamily="49" charset="0"/>
+              </a:rPr>
+            </a:br>
+            <a:r>
+              <a:rPr lang="en-US" dirty="0">
+                <a:solidFill>
+                  <a:srgbClr val="CC7832"/>
+                </a:solidFill>
+                <a:effectLst/>
+                <a:latin typeface="Consolas" panose="020B0609020204030204" pitchFamily="49" charset="0"/>
+                <a:cs typeface="Consolas" panose="020B0609020204030204" pitchFamily="49" charset="0"/>
+              </a:rPr>
+              <a:t>    while</a:t>
+            </a:r>
+            <a:r>
+              <a:rPr lang="en-US" dirty="0">
+                <a:latin typeface="Consolas" panose="020B0609020204030204" pitchFamily="49" charset="0"/>
+                <a:cs typeface="Consolas" panose="020B0609020204030204" pitchFamily="49" charset="0"/>
+              </a:rPr>
+              <a:t>(</a:t>
+            </a:r>
+            <a:r>
+              <a:rPr lang="en-US" i="1" dirty="0" err="1">
+                <a:solidFill>
+                  <a:srgbClr val="9876AA"/>
+                </a:solidFill>
+                <a:effectLst/>
+                <a:latin typeface="Consolas" panose="020B0609020204030204" pitchFamily="49" charset="0"/>
+                <a:cs typeface="Consolas" panose="020B0609020204030204" pitchFamily="49" charset="0"/>
+              </a:rPr>
+              <a:t>i</a:t>
+            </a:r>
+            <a:r>
+              <a:rPr lang="en-US" i="1" dirty="0">
+                <a:solidFill>
+                  <a:srgbClr val="9876AA"/>
+                </a:solidFill>
+                <a:effectLst/>
+                <a:latin typeface="Consolas" panose="020B0609020204030204" pitchFamily="49" charset="0"/>
+                <a:cs typeface="Consolas" panose="020B0609020204030204" pitchFamily="49" charset="0"/>
+              </a:rPr>
+              <a:t> </a:t>
+            </a:r>
+            <a:r>
+              <a:rPr lang="en-US" dirty="0">
+                <a:latin typeface="Consolas" panose="020B0609020204030204" pitchFamily="49" charset="0"/>
+                <a:cs typeface="Consolas" panose="020B0609020204030204" pitchFamily="49" charset="0"/>
+              </a:rPr>
+              <a:t>&lt;= </a:t>
+            </a:r>
+            <a:r>
+              <a:rPr lang="en-US" i="1" dirty="0">
+                <a:solidFill>
+                  <a:srgbClr val="9876AA"/>
+                </a:solidFill>
+                <a:effectLst/>
+                <a:latin typeface="Consolas" panose="020B0609020204030204" pitchFamily="49" charset="0"/>
+                <a:cs typeface="Consolas" panose="020B0609020204030204" pitchFamily="49" charset="0"/>
+              </a:rPr>
+              <a:t>total</a:t>
+            </a:r>
+            <a:r>
+              <a:rPr lang="en-US" dirty="0">
+                <a:latin typeface="Consolas" panose="020B0609020204030204" pitchFamily="49" charset="0"/>
+                <a:cs typeface="Consolas" panose="020B0609020204030204" pitchFamily="49" charset="0"/>
+              </a:rPr>
+              <a:t>) {</a:t>
+            </a:r>
+            <a:br>
+              <a:rPr lang="en-US" dirty="0">
+                <a:latin typeface="Consolas" panose="020B0609020204030204" pitchFamily="49" charset="0"/>
+                <a:cs typeface="Consolas" panose="020B0609020204030204" pitchFamily="49" charset="0"/>
+              </a:rPr>
+            </a:br>
+            <a:r>
+              <a:rPr lang="en-US" dirty="0">
+                <a:latin typeface="Consolas" panose="020B0609020204030204" pitchFamily="49" charset="0"/>
+                <a:cs typeface="Consolas" panose="020B0609020204030204" pitchFamily="49" charset="0"/>
+              </a:rPr>
+              <a:t>        </a:t>
+            </a:r>
+            <a:r>
+              <a:rPr lang="en-US" dirty="0" err="1">
+                <a:latin typeface="Consolas" panose="020B0609020204030204" pitchFamily="49" charset="0"/>
+                <a:cs typeface="Consolas" panose="020B0609020204030204" pitchFamily="49" charset="0"/>
+              </a:rPr>
+              <a:t>System.</a:t>
+            </a:r>
+            <a:r>
+              <a:rPr lang="en-US" i="1" dirty="0" err="1">
+                <a:solidFill>
+                  <a:srgbClr val="9876AA"/>
+                </a:solidFill>
+                <a:effectLst/>
+                <a:latin typeface="Consolas" panose="020B0609020204030204" pitchFamily="49" charset="0"/>
+                <a:cs typeface="Consolas" panose="020B0609020204030204" pitchFamily="49" charset="0"/>
+              </a:rPr>
+              <a:t>out</a:t>
+            </a:r>
+            <a:r>
+              <a:rPr lang="en-US" dirty="0" err="1">
+                <a:latin typeface="Consolas" panose="020B0609020204030204" pitchFamily="49" charset="0"/>
+                <a:cs typeface="Consolas" panose="020B0609020204030204" pitchFamily="49" charset="0"/>
+              </a:rPr>
+              <a:t>.print</a:t>
+            </a:r>
+            <a:r>
+              <a:rPr lang="en-US" dirty="0">
+                <a:latin typeface="Consolas" panose="020B0609020204030204" pitchFamily="49" charset="0"/>
+                <a:cs typeface="Consolas" panose="020B0609020204030204" pitchFamily="49" charset="0"/>
+              </a:rPr>
+              <a:t>(</a:t>
+            </a:r>
+            <a:r>
+              <a:rPr lang="en-US" i="1" dirty="0" err="1">
+                <a:solidFill>
+                  <a:srgbClr val="9876AA"/>
+                </a:solidFill>
+                <a:effectLst/>
+                <a:latin typeface="Consolas" panose="020B0609020204030204" pitchFamily="49" charset="0"/>
+                <a:cs typeface="Consolas" panose="020B0609020204030204" pitchFamily="49" charset="0"/>
+              </a:rPr>
+              <a:t>i</a:t>
+            </a:r>
+            <a:r>
+              <a:rPr lang="en-US" i="1" dirty="0">
+                <a:solidFill>
+                  <a:srgbClr val="9876AA"/>
+                </a:solidFill>
+                <a:effectLst/>
+                <a:latin typeface="Consolas" panose="020B0609020204030204" pitchFamily="49" charset="0"/>
+                <a:cs typeface="Consolas" panose="020B0609020204030204" pitchFamily="49" charset="0"/>
+              </a:rPr>
+              <a:t> </a:t>
+            </a:r>
+            <a:r>
+              <a:rPr lang="en-US" dirty="0">
+                <a:latin typeface="Consolas" panose="020B0609020204030204" pitchFamily="49" charset="0"/>
+                <a:cs typeface="Consolas" panose="020B0609020204030204" pitchFamily="49" charset="0"/>
+              </a:rPr>
+              <a:t>+ </a:t>
+            </a:r>
+            <a:r>
+              <a:rPr lang="en-US" dirty="0">
+                <a:solidFill>
+                  <a:srgbClr val="6A8759"/>
+                </a:solidFill>
+                <a:effectLst/>
+                <a:latin typeface="Consolas" panose="020B0609020204030204" pitchFamily="49" charset="0"/>
+                <a:cs typeface="Consolas" panose="020B0609020204030204" pitchFamily="49" charset="0"/>
+              </a:rPr>
+              <a:t>","</a:t>
+            </a:r>
+            <a:r>
+              <a:rPr lang="en-US" dirty="0">
+                <a:latin typeface="Consolas" panose="020B0609020204030204" pitchFamily="49" charset="0"/>
+                <a:cs typeface="Consolas" panose="020B0609020204030204" pitchFamily="49" charset="0"/>
+              </a:rPr>
+              <a:t>)</a:t>
+            </a:r>
+            <a:r>
+              <a:rPr lang="en-US" dirty="0">
+                <a:solidFill>
+                  <a:srgbClr val="CC7832"/>
+                </a:solidFill>
+                <a:effectLst/>
+                <a:latin typeface="Consolas" panose="020B0609020204030204" pitchFamily="49" charset="0"/>
+                <a:cs typeface="Consolas" panose="020B0609020204030204" pitchFamily="49" charset="0"/>
+              </a:rPr>
+              <a:t>;</a:t>
+            </a:r>
+            <a:br>
+              <a:rPr lang="en-US" dirty="0">
+                <a:solidFill>
+                  <a:srgbClr val="CC7832"/>
+                </a:solidFill>
+                <a:effectLst/>
+                <a:latin typeface="Consolas" panose="020B0609020204030204" pitchFamily="49" charset="0"/>
+                <a:cs typeface="Consolas" panose="020B0609020204030204" pitchFamily="49" charset="0"/>
+              </a:rPr>
+            </a:br>
+            <a:r>
+              <a:rPr lang="en-US" dirty="0">
+                <a:solidFill>
+                  <a:srgbClr val="CC7832"/>
+                </a:solidFill>
+                <a:effectLst/>
+                <a:latin typeface="Consolas" panose="020B0609020204030204" pitchFamily="49" charset="0"/>
+                <a:cs typeface="Consolas" panose="020B0609020204030204" pitchFamily="49" charset="0"/>
+              </a:rPr>
+              <a:t>        </a:t>
+            </a:r>
+            <a:r>
+              <a:rPr lang="en-US" i="1" dirty="0" err="1">
+                <a:solidFill>
+                  <a:srgbClr val="9876AA"/>
+                </a:solidFill>
+                <a:effectLst/>
+                <a:latin typeface="Consolas" panose="020B0609020204030204" pitchFamily="49" charset="0"/>
+                <a:cs typeface="Consolas" panose="020B0609020204030204" pitchFamily="49" charset="0"/>
+              </a:rPr>
+              <a:t>i</a:t>
+            </a:r>
+            <a:r>
+              <a:rPr lang="en-US" i="1" dirty="0">
+                <a:solidFill>
+                  <a:srgbClr val="9876AA"/>
+                </a:solidFill>
+                <a:effectLst/>
+                <a:latin typeface="Consolas" panose="020B0609020204030204" pitchFamily="49" charset="0"/>
+                <a:cs typeface="Consolas" panose="020B0609020204030204" pitchFamily="49" charset="0"/>
+              </a:rPr>
+              <a:t> </a:t>
+            </a:r>
+            <a:r>
+              <a:rPr lang="en-US" dirty="0">
+                <a:latin typeface="Consolas" panose="020B0609020204030204" pitchFamily="49" charset="0"/>
+                <a:cs typeface="Consolas" panose="020B0609020204030204" pitchFamily="49" charset="0"/>
+              </a:rPr>
+              <a:t>= </a:t>
+            </a:r>
+            <a:r>
+              <a:rPr lang="en-US" i="1" dirty="0" err="1">
+                <a:solidFill>
+                  <a:srgbClr val="9876AA"/>
+                </a:solidFill>
+                <a:effectLst/>
+                <a:latin typeface="Consolas" panose="020B0609020204030204" pitchFamily="49" charset="0"/>
+                <a:cs typeface="Consolas" panose="020B0609020204030204" pitchFamily="49" charset="0"/>
+              </a:rPr>
+              <a:t>i</a:t>
+            </a:r>
+            <a:r>
+              <a:rPr lang="en-US" i="1" dirty="0">
+                <a:solidFill>
+                  <a:srgbClr val="9876AA"/>
+                </a:solidFill>
+                <a:effectLst/>
+                <a:latin typeface="Consolas" panose="020B0609020204030204" pitchFamily="49" charset="0"/>
+                <a:cs typeface="Consolas" panose="020B0609020204030204" pitchFamily="49" charset="0"/>
+              </a:rPr>
+              <a:t> </a:t>
+            </a:r>
+            <a:r>
+              <a:rPr lang="en-US" dirty="0">
+                <a:latin typeface="Consolas" panose="020B0609020204030204" pitchFamily="49" charset="0"/>
+                <a:cs typeface="Consolas" panose="020B0609020204030204" pitchFamily="49" charset="0"/>
+              </a:rPr>
+              <a:t>+ </a:t>
+            </a:r>
+            <a:r>
+              <a:rPr lang="en-US" dirty="0">
+                <a:solidFill>
+                  <a:srgbClr val="6897BB"/>
+                </a:solidFill>
+                <a:effectLst/>
+                <a:latin typeface="Consolas" panose="020B0609020204030204" pitchFamily="49" charset="0"/>
+                <a:cs typeface="Consolas" panose="020B0609020204030204" pitchFamily="49" charset="0"/>
+              </a:rPr>
+              <a:t>1</a:t>
+            </a:r>
+            <a:r>
+              <a:rPr lang="en-US" dirty="0">
+                <a:solidFill>
+                  <a:srgbClr val="CC7832"/>
+                </a:solidFill>
+                <a:effectLst/>
+                <a:latin typeface="Consolas" panose="020B0609020204030204" pitchFamily="49" charset="0"/>
+                <a:cs typeface="Consolas" panose="020B0609020204030204" pitchFamily="49" charset="0"/>
+              </a:rPr>
+              <a:t>;</a:t>
+            </a:r>
+            <a:br>
+              <a:rPr lang="en-US" dirty="0">
+                <a:solidFill>
+                  <a:srgbClr val="CC7832"/>
+                </a:solidFill>
+                <a:effectLst/>
+                <a:latin typeface="Consolas" panose="020B0609020204030204" pitchFamily="49" charset="0"/>
+                <a:cs typeface="Consolas" panose="020B0609020204030204" pitchFamily="49" charset="0"/>
+              </a:rPr>
+            </a:br>
+            <a:r>
+              <a:rPr lang="en-US" dirty="0">
+                <a:solidFill>
+                  <a:srgbClr val="CC7832"/>
+                </a:solidFill>
+                <a:effectLst/>
+                <a:latin typeface="Consolas" panose="020B0609020204030204" pitchFamily="49" charset="0"/>
+                <a:cs typeface="Consolas" panose="020B0609020204030204" pitchFamily="49" charset="0"/>
+              </a:rPr>
+              <a:t>    </a:t>
+            </a:r>
+            <a:r>
+              <a:rPr lang="en-US" dirty="0">
+                <a:latin typeface="Consolas" panose="020B0609020204030204" pitchFamily="49" charset="0"/>
+                <a:cs typeface="Consolas" panose="020B0609020204030204" pitchFamily="49" charset="0"/>
+              </a:rPr>
+              <a:t>}</a:t>
+            </a:r>
+            <a:br>
+              <a:rPr lang="en-US" dirty="0">
+                <a:latin typeface="Consolas" panose="020B0609020204030204" pitchFamily="49" charset="0"/>
+                <a:cs typeface="Consolas" panose="020B0609020204030204" pitchFamily="49" charset="0"/>
+              </a:rPr>
+            </a:br>
+            <a:r>
+              <a:rPr lang="en-US" dirty="0">
+                <a:latin typeface="Consolas" panose="020B0609020204030204" pitchFamily="49" charset="0"/>
+                <a:cs typeface="Consolas" panose="020B0609020204030204" pitchFamily="49" charset="0"/>
+              </a:rPr>
+              <a:t>}</a:t>
+            </a:r>
+          </a:p>
+        </p:txBody>
+      </p:sp>
+    </p:spTree>
+    <p:extLst>
+      <p:ext uri="{BB962C8B-B14F-4D97-AF65-F5344CB8AC3E}">
+        <p14:creationId xmlns:p14="http://schemas.microsoft.com/office/powerpoint/2010/main" val="1000839727"/>
+      </p:ext>
+    </p:extLst>
+  </p:cSld>
+  <p:clrMapOvr>
+    <a:masterClrMapping/>
+  </p:clrMapOvr>
+  <mc:AlternateContent xmlns:mc="http://schemas.openxmlformats.org/markup-compatibility/2006" xmlns:p14="http://schemas.microsoft.com/office/powerpoint/2010/main">
+    <mc:Choice Requires="p14">
+      <p:transition p14:dur="300">
+        <p:fade/>
+      </p:transition>
+    </mc:Choice>
+    <mc:Fallback xmlns="">
+      <p:transition>
+        <p:fade/>
+      </p:transition>
+    </mc:Fallback>
+  </mc:AlternateContent>
+  <p:timing>
+    <p:tnLst>
+      <p:par>
+        <p:cTn id="1" dur="indefinite" restart="never" nodeType="tmRoot"/>
+      </p:par>
+    </p:tnLst>
+  </p:timing>
+</p:sld>
+</file>
+
+<file path=ppt/slides/slide11.xml><?xml version="1.0" encoding="utf-8"?>
+<p:sld xmlns:a="http://schemas.openxmlformats.org/drawingml/2006/main" xmlns:r="http://schemas.openxmlformats.org/officeDocument/2006/relationships" xmlns:p="http://schemas.openxmlformats.org/presentationml/2006/main">
+  <p:cSld>
+    <p:spTree>
+      <p:nvGrpSpPr>
+        <p:cNvPr id="1" name=""/>
+        <p:cNvGrpSpPr/>
+        <p:nvPr/>
+      </p:nvGrpSpPr>
+      <p:grpSpPr>
+        <a:xfrm>
+          <a:off x="0" y="0"/>
+          <a:ext cx="0" cy="0"/>
+          <a:chOff x="0" y="0"/>
+          <a:chExt cx="0" cy="0"/>
+        </a:xfrm>
+      </p:grpSpPr>
+      <p:sp>
+        <p:nvSpPr>
+          <p:cNvPr id="2" name="Title 1">
+            <a:extLst>
+              <a:ext uri="{FF2B5EF4-FFF2-40B4-BE49-F238E27FC236}">
+                <a16:creationId xmlns:a16="http://schemas.microsoft.com/office/drawing/2014/main" id="{1A61D683-00D4-0445-9448-BC3044AD8ED9}"/>
+              </a:ext>
+            </a:extLst>
+          </p:cNvPr>
+          <p:cNvSpPr>
+            <a:spLocks noGrp="1"/>
+          </p:cNvSpPr>
+          <p:nvPr>
+            <p:ph type="title"/>
+          </p:nvPr>
+        </p:nvSpPr>
+        <p:spPr/>
+        <p:txBody>
+          <a:bodyPr/>
+          <a:lstStyle/>
+          <a:p>
+            <a:r>
+              <a:rPr lang="en-US" dirty="0"/>
+              <a:t>While/For Mostly Interchangeable</a:t>
+            </a:r>
+          </a:p>
+        </p:txBody>
+      </p:sp>
+      <p:sp>
+        <p:nvSpPr>
+          <p:cNvPr id="3" name="Text Placeholder 2">
+            <a:extLst>
+              <a:ext uri="{FF2B5EF4-FFF2-40B4-BE49-F238E27FC236}">
+                <a16:creationId xmlns:a16="http://schemas.microsoft.com/office/drawing/2014/main" id="{E449288E-D494-1942-ABCE-51152CB06154}"/>
+              </a:ext>
+            </a:extLst>
+          </p:cNvPr>
+          <p:cNvSpPr>
+            <a:spLocks noGrp="1"/>
+          </p:cNvSpPr>
+          <p:nvPr>
+            <p:ph type="body" sz="quarter" idx="10"/>
+          </p:nvPr>
+        </p:nvSpPr>
+        <p:spPr>
+          <a:xfrm>
+            <a:off x="9826171" y="1776682"/>
+            <a:ext cx="3363357" cy="1300099"/>
+          </a:xfrm>
+        </p:spPr>
+        <p:txBody>
+          <a:bodyPr/>
+          <a:lstStyle/>
+          <a:p>
+            <a:r>
+              <a:rPr lang="en-US" dirty="0"/>
+              <a:t>Let total = 10</a:t>
+            </a:r>
+          </a:p>
+          <a:p>
+            <a:r>
+              <a:rPr lang="en-US" dirty="0"/>
+              <a:t>0,1,2,3,4,5,6,7,8,9,</a:t>
+            </a:r>
+            <a:br>
+              <a:rPr lang="en-US" dirty="0"/>
+            </a:br>
+            <a:endParaRPr lang="en-US" dirty="0"/>
+          </a:p>
+        </p:txBody>
+      </p:sp>
+      <p:pic>
+        <p:nvPicPr>
+          <p:cNvPr id="3074" name="Picture 2">
+            <a:extLst>
+              <a:ext uri="{FF2B5EF4-FFF2-40B4-BE49-F238E27FC236}">
+                <a16:creationId xmlns:a16="http://schemas.microsoft.com/office/drawing/2014/main" id="{FB7748DD-DF09-434C-8BE3-3D3CB996FB6F}"/>
+              </a:ext>
+            </a:extLst>
+          </p:cNvPr>
+          <p:cNvPicPr>
+            <a:picLocks noChangeAspect="1" noChangeArrowheads="1"/>
+          </p:cNvPicPr>
+          <p:nvPr/>
+        </p:nvPicPr>
+        <p:blipFill>
+          <a:blip r:embed="rId2">
+            <a:extLst>
+              <a:ext uri="{28A0092B-C50C-407E-A947-70E740481C1C}">
+                <a14:useLocalDpi xmlns:a14="http://schemas.microsoft.com/office/drawing/2010/main" val="0"/>
+              </a:ext>
+            </a:extLst>
+          </a:blip>
+          <a:srcRect/>
+          <a:stretch>
+            <a:fillRect/>
+          </a:stretch>
+        </p:blipFill>
+        <p:spPr bwMode="auto">
+          <a:xfrm>
+            <a:off x="268514" y="1463722"/>
+            <a:ext cx="9245600" cy="5232400"/>
+          </a:xfrm>
+          <a:prstGeom prst="rect">
+            <a:avLst/>
+          </a:prstGeom>
+          <a:noFill/>
+          <a:extLst>
+            <a:ext uri="{909E8E84-426E-40DD-AFC4-6F175D3DCCD1}">
+              <a14:hiddenFill xmlns:a14="http://schemas.microsoft.com/office/drawing/2010/main">
+                <a:solidFill>
+                  <a:srgbClr val="FFFFFF"/>
+                </a:solidFill>
+              </a14:hiddenFill>
+            </a:ext>
+          </a:extLst>
+        </p:spPr>
+      </p:pic>
+    </p:spTree>
+    <p:extLst>
+      <p:ext uri="{BB962C8B-B14F-4D97-AF65-F5344CB8AC3E}">
+        <p14:creationId xmlns:p14="http://schemas.microsoft.com/office/powerpoint/2010/main" val="4045076339"/>
+      </p:ext>
+    </p:extLst>
+  </p:cSld>
+  <p:clrMapOvr>
+    <a:masterClrMapping/>
+  </p:clrMapOvr>
+  <mc:AlternateContent xmlns:mc="http://schemas.openxmlformats.org/markup-compatibility/2006" xmlns:p14="http://schemas.microsoft.com/office/powerpoint/2010/main">
+    <mc:Choice Requires="p14">
+      <p:transition p14:dur="300">
+        <p:fade/>
+      </p:transition>
+    </mc:Choice>
+    <mc:Fallback xmlns="">
+      <p:transition>
+        <p:fade/>
+      </p:transition>
+    </mc:Fallback>
+  </mc:AlternateContent>
+  <p:timing>
+    <p:tnLst>
+      <p:par>
+        <p:cTn id="1" dur="indefinite" restart="never" nodeType="tmRoot">
+          <p:childTnLst>
+            <p:seq concurrent="1" nextAc="seek">
+              <p:cTn id="2" dur="indefinite" nodeType="mainSeq">
+                <p:childTnLst>
+                  <p:par>
+                    <p:cTn id="3" fill="hold">
+                      <p:stCondLst>
+                        <p:cond delay="indefinite"/>
+                      </p:stCondLst>
+                      <p:childTnLst>
+                        <p:par>
+                          <p:cTn id="4" fill="hold">
+                            <p:stCondLst>
+                              <p:cond delay="0"/>
+                            </p:stCondLst>
+                            <p:childTnLst>
+                              <p:par>
+                                <p:cTn id="5" presetID="9" presetClass="entr" presetSubtype="0" fill="hold" grpId="0" nodeType="clickEffect">
+                                  <p:stCondLst>
+                                    <p:cond delay="0"/>
+                                  </p:stCondLst>
+                                  <p:childTnLst>
+                                    <p:set>
+                                      <p:cBhvr>
+                                        <p:cTn id="6" dur="1" fill="hold">
+                                          <p:stCondLst>
+                                            <p:cond delay="0"/>
+                                          </p:stCondLst>
+                                        </p:cTn>
+                                        <p:tgtEl>
+                                          <p:spTgt spid="3">
+                                            <p:txEl>
+                                              <p:pRg st="0" end="0"/>
+                                            </p:txEl>
+                                          </p:spTgt>
+                                        </p:tgtEl>
+                                        <p:attrNameLst>
+                                          <p:attrName>style.visibility</p:attrName>
+                                        </p:attrNameLst>
+                                      </p:cBhvr>
+                                      <p:to>
+                                        <p:strVal val="visible"/>
+                                      </p:to>
+                                    </p:set>
+                                    <p:animEffect transition="in" filter="dissolve">
+                                      <p:cBhvr>
+                                        <p:cTn id="7" dur="500"/>
+                                        <p:tgtEl>
+                                          <p:spTgt spid="3">
+                                            <p:txEl>
+                                              <p:pRg st="0" end="0"/>
+                                            </p:txEl>
+                                          </p:spTgt>
+                                        </p:tgtEl>
+                                      </p:cBhvr>
+                                    </p:animEffect>
+                                  </p:childTnLst>
+                                </p:cTn>
+                              </p:par>
+                            </p:childTnLst>
+                          </p:cTn>
+                        </p:par>
+                      </p:childTnLst>
+                    </p:cTn>
+                  </p:par>
+                  <p:par>
+                    <p:cTn id="8" fill="hold">
+                      <p:stCondLst>
+                        <p:cond delay="indefinite"/>
+                      </p:stCondLst>
+                      <p:childTnLst>
+                        <p:par>
+                          <p:cTn id="9" fill="hold">
+                            <p:stCondLst>
+                              <p:cond delay="0"/>
+                            </p:stCondLst>
+                            <p:childTnLst>
+                              <p:par>
+                                <p:cTn id="10" presetID="9" presetClass="entr" presetSubtype="0" fill="hold" grpId="0" nodeType="clickEffect">
+                                  <p:stCondLst>
+                                    <p:cond delay="0"/>
+                                  </p:stCondLst>
+                                  <p:childTnLst>
+                                    <p:set>
+                                      <p:cBhvr>
+                                        <p:cTn id="11" dur="1" fill="hold">
+                                          <p:stCondLst>
+                                            <p:cond delay="0"/>
+                                          </p:stCondLst>
+                                        </p:cTn>
+                                        <p:tgtEl>
+                                          <p:spTgt spid="3">
+                                            <p:txEl>
+                                              <p:pRg st="1" end="1"/>
+                                            </p:txEl>
+                                          </p:spTgt>
+                                        </p:tgtEl>
+                                        <p:attrNameLst>
+                                          <p:attrName>style.visibility</p:attrName>
+                                        </p:attrNameLst>
+                                      </p:cBhvr>
+                                      <p:to>
+                                        <p:strVal val="visible"/>
+                                      </p:to>
+                                    </p:set>
+                                    <p:animEffect transition="in" filter="dissolve">
+                                      <p:cBhvr>
+                                        <p:cTn id="12" dur="500"/>
+                                        <p:tgtEl>
+                                          <p:spTgt spid="3">
+                                            <p:txEl>
+                                              <p:pRg st="1" end="1"/>
+                                            </p:txEl>
+                                          </p:spTgt>
+                                        </p:tgtEl>
+                                      </p:cBhvr>
+                                    </p:animEffect>
+                                  </p:childTnLst>
+                                </p:cTn>
+                              </p:par>
+                            </p:childTnLst>
+                          </p:cTn>
+                        </p:par>
+                      </p:childTnLst>
+                    </p:cTn>
+                  </p:par>
+                </p:childTnLst>
+              </p:cTn>
+              <p:prevCondLst>
+                <p:cond evt="onPrev" delay="0">
+                  <p:tgtEl>
+                    <p:sldTgt/>
+                  </p:tgtEl>
+                </p:cond>
+              </p:prevCondLst>
+              <p:nextCondLst>
+                <p:cond evt="onNext" delay="0">
+                  <p:tgtEl>
+                    <p:sldTgt/>
+                  </p:tgtEl>
+                </p:cond>
+              </p:nextCondLst>
+            </p:seq>
+          </p:childTnLst>
+        </p:cTn>
+      </p:par>
+    </p:tnLst>
+    <p:bldLst>
+      <p:bldP spid="3" grpId="0" build="p"/>
+    </p:bldLst>
+  </p:timing>
+</p:sld>
+</file>
+
+<file path=ppt/slides/slide12.xml><?xml version="1.0" encoding="utf-8"?>
 <p:sld xmlns:a="http://schemas.openxmlformats.org/drawingml/2006/main" xmlns:r="http://schemas.openxmlformats.org/officeDocument/2006/relationships" xmlns:p="http://schemas.openxmlformats.org/presentationml/2006/main">
   <p:cSld>
     <p:spTree>
@@ -7007,6 +7947,162 @@
 </p:sld>
 </file>
 
+<file path=ppt/slides/slide13.xml><?xml version="1.0" encoding="utf-8"?>
+<p:sld xmlns:a="http://schemas.openxmlformats.org/drawingml/2006/main" xmlns:r="http://schemas.openxmlformats.org/officeDocument/2006/relationships" xmlns:p="http://schemas.openxmlformats.org/presentationml/2006/main">
+  <p:cSld>
+    <p:spTree>
+      <p:nvGrpSpPr>
+        <p:cNvPr id="1" name=""/>
+        <p:cNvGrpSpPr/>
+        <p:nvPr/>
+      </p:nvGrpSpPr>
+      <p:grpSpPr>
+        <a:xfrm>
+          <a:off x="0" y="0"/>
+          <a:ext cx="0" cy="0"/>
+          <a:chOff x="0" y="0"/>
+          <a:chExt cx="0" cy="0"/>
+        </a:xfrm>
+      </p:grpSpPr>
+      <p:sp>
+        <p:nvSpPr>
+          <p:cNvPr id="2" name="Title 1">
+            <a:extLst>
+              <a:ext uri="{FF2B5EF4-FFF2-40B4-BE49-F238E27FC236}">
+                <a16:creationId xmlns:a16="http://schemas.microsoft.com/office/drawing/2014/main" id="{380B640B-36BF-3C4B-916C-AC584F6601AF}"/>
+              </a:ext>
+            </a:extLst>
+          </p:cNvPr>
+          <p:cNvSpPr>
+            <a:spLocks noGrp="1"/>
+          </p:cNvSpPr>
+          <p:nvPr>
+            <p:ph type="title"/>
+          </p:nvPr>
+        </p:nvSpPr>
+        <p:spPr/>
+        <p:txBody>
+          <a:bodyPr/>
+          <a:lstStyle/>
+          <a:p>
+            <a:r>
+              <a:rPr lang="en-US" dirty="0" smtClean="0"/>
+              <a:t>Code Along</a:t>
+            </a:r>
+            <a:endParaRPr lang="en-US" dirty="0"/>
+          </a:p>
+        </p:txBody>
+      </p:sp>
+      <p:sp>
+        <p:nvSpPr>
+          <p:cNvPr id="3" name="Text Placeholder 2">
+            <a:extLst>
+              <a:ext uri="{FF2B5EF4-FFF2-40B4-BE49-F238E27FC236}">
+                <a16:creationId xmlns:a16="http://schemas.microsoft.com/office/drawing/2014/main" id="{52466651-B913-2643-95EC-1F7359A4277D}"/>
+              </a:ext>
+            </a:extLst>
+          </p:cNvPr>
+          <p:cNvSpPr>
+            <a:spLocks noGrp="1"/>
+          </p:cNvSpPr>
+          <p:nvPr>
+            <p:ph type="body" sz="quarter" idx="10"/>
+          </p:nvPr>
+        </p:nvSpPr>
+        <p:spPr>
+          <a:xfrm>
+            <a:off x="628075" y="1731645"/>
+            <a:ext cx="11087675" cy="2154436"/>
+          </a:xfrm>
+        </p:spPr>
+        <p:txBody>
+          <a:bodyPr/>
+          <a:lstStyle/>
+          <a:p>
+            <a:r>
+              <a:rPr lang="en-US" dirty="0"/>
+              <a:t>Write a program that reads 5 pairs (value1, value2) of </a:t>
+            </a:r>
+            <a:r>
+              <a:rPr lang="en-US" dirty="0" err="1"/>
+              <a:t>int</a:t>
+            </a:r>
+            <a:r>
+              <a:rPr lang="en-US" dirty="0"/>
+              <a:t> values. For each pair print the smaller value. If the values are equal, print "equals" and the number</a:t>
+            </a:r>
+            <a:r>
+              <a:rPr lang="en-US" dirty="0" smtClean="0"/>
+              <a:t>.</a:t>
+            </a:r>
+          </a:p>
+          <a:p>
+            <a:r>
+              <a:rPr lang="en-US" dirty="0" smtClean="0"/>
+              <a:t>What do we need to change in our </a:t>
+            </a:r>
+            <a:r>
+              <a:rPr lang="en-US" dirty="0" smtClean="0"/>
+              <a:t>code </a:t>
+            </a:r>
+            <a:r>
+              <a:rPr lang="en-US" dirty="0" smtClean="0"/>
+              <a:t>if instead of 5 we want 100 pairs?</a:t>
+            </a:r>
+          </a:p>
+          <a:p>
+            <a:r>
+              <a:rPr lang="en-US" dirty="0" smtClean="0"/>
+              <a:t>What do we need to change in our code if instead of a predefined number we would like to ask for </a:t>
+            </a:r>
+            <a:r>
+              <a:rPr lang="en-US" smtClean="0"/>
+              <a:t>the total </a:t>
+            </a:r>
+            <a:r>
+              <a:rPr lang="en-US" dirty="0" smtClean="0"/>
+              <a:t>number </a:t>
+            </a:r>
+            <a:r>
+              <a:rPr lang="en-US" smtClean="0"/>
+              <a:t>of pairs to read?</a:t>
+            </a:r>
+            <a:endParaRPr lang="en-US" dirty="0"/>
+          </a:p>
+        </p:txBody>
+      </p:sp>
+    </p:spTree>
+    <p:extLst>
+      <p:ext uri="{BB962C8B-B14F-4D97-AF65-F5344CB8AC3E}">
+        <p14:creationId xmlns:p14="http://schemas.microsoft.com/office/powerpoint/2010/main" val="2143134772"/>
+      </p:ext>
+    </p:extLst>
+  </p:cSld>
+  <p:clrMapOvr>
+    <a:masterClrMapping/>
+  </p:clrMapOvr>
+  <mc:AlternateContent xmlns:mc="http://schemas.openxmlformats.org/markup-compatibility/2006" xmlns:p14="http://schemas.microsoft.com/office/powerpoint/2010/main">
+    <mc:Choice Requires="p14">
+      <p:transition p14:dur="300">
+        <p:fade/>
+      </p:transition>
+    </mc:Choice>
+    <mc:Fallback xmlns="">
+      <p:transition>
+        <p:fade/>
+      </p:transition>
+    </mc:Fallback>
+  </mc:AlternateContent>
+  <p:timing>
+    <p:tnLst>
+      <p:par>
+        <p:cTn id="1" dur="indefinite" restart="never" nodeType="tmRoot"/>
+      </p:par>
+    </p:tnLst>
+  </p:timing>
+</p:sld>
+</file>
+
 <file path=ppt/slides/slide2.xml><?xml version="1.0" encoding="utf-8"?>
 <p:sld xmlns:a="http://schemas.openxmlformats.org/drawingml/2006/main" xmlns:r="http://schemas.openxmlformats.org/officeDocument/2006/relationships" xmlns:p="http://schemas.openxmlformats.org/presentationml/2006/main">
   <p:cSld>
@@ -7162,6 +8258,13 @@
       </p:transition>
     </mc:Fallback>
   </mc:AlternateContent>
+  <p:timing>
+    <p:tnLst>
+      <p:par>
+        <p:cTn id="1" dur="indefinite" restart="never" nodeType="tmRoot"/>
+      </p:par>
+    </p:tnLst>
+  </p:timing>
 </p:sld>
 </file>
 
@@ -7341,6 +8444,13 @@
       </p:transition>
     </mc:Fallback>
   </mc:AlternateContent>
+  <p:timing>
+    <p:tnLst>
+      <p:par>
+        <p:cTn id="1" dur="indefinite" restart="never" nodeType="tmRoot"/>
+      </p:par>
+    </p:tnLst>
+  </p:timing>
 </p:sld>
 </file>
 
@@ -7421,7 +8531,7 @@
         <p:spPr>
           <a:xfrm>
             <a:off x="628075" y="1776683"/>
-            <a:ext cx="12561453" cy="3507692"/>
+            <a:ext cx="12561453" cy="3207032"/>
           </a:xfrm>
         </p:spPr>
         <p:txBody>
@@ -7456,21 +8566,22 @@
             <a:pPr fontAlgn="base"/>
             <a:r>
               <a:rPr lang="en-US" dirty="0"/>
-              <a:t>Do While loops (we will cover this later)</a:t>
+              <a:t>Do While loops (we will cover this later</a:t>
+            </a:r>
+            <a:r>
+              <a:rPr lang="en-US" dirty="0" smtClean="0"/>
+              <a:t>)</a:t>
             </a:r>
           </a:p>
           <a:p>
             <a:pPr fontAlgn="base"/>
             <a:r>
+              <a:rPr lang="en-US" dirty="0" smtClean="0"/>
+              <a:t>All </a:t>
+            </a:r>
+            <a:r>
               <a:rPr lang="en-US" dirty="0"/>
-              <a:t/>
-            </a:r>
-            <a:br>
-              <a:rPr lang="en-US" dirty="0"/>
-            </a:br>
-            <a:r>
-              <a:rPr lang="en-US" dirty="0"/>
-              <a:t>All loops have</a:t>
+              <a:t>loops have</a:t>
             </a:r>
           </a:p>
           <a:p>
@@ -8972,6 +10083,2088 @@
           <p:cNvPr id="2" name="Title 1">
             <a:extLst>
               <a:ext uri="{FF2B5EF4-FFF2-40B4-BE49-F238E27FC236}">
+                <a16:creationId xmlns:a16="http://schemas.microsoft.com/office/drawing/2014/main" id="{4AC1FBFA-B4F8-4B41-A345-2555AF731618}"/>
+              </a:ext>
+            </a:extLst>
+          </p:cNvPr>
+          <p:cNvSpPr>
+            <a:spLocks noGrp="1"/>
+          </p:cNvSpPr>
+          <p:nvPr>
+            <p:ph type="title"/>
+          </p:nvPr>
+        </p:nvSpPr>
+        <p:spPr>
+          <a:xfrm>
+            <a:off x="628075" y="448059"/>
+            <a:ext cx="12561453" cy="1015663"/>
+          </a:xfrm>
+        </p:spPr>
+        <p:txBody>
+          <a:bodyPr/>
+          <a:lstStyle/>
+          <a:p>
+            <a:r>
+              <a:rPr lang="en-US" dirty="0"/>
+              <a:t>While Loop</a:t>
+            </a:r>
+          </a:p>
+        </p:txBody>
+      </p:sp>
+      <p:sp>
+        <p:nvSpPr>
+          <p:cNvPr id="3" name="Text Placeholder 2">
+            <a:extLst>
+              <a:ext uri="{FF2B5EF4-FFF2-40B4-BE49-F238E27FC236}">
+                <a16:creationId xmlns:a16="http://schemas.microsoft.com/office/drawing/2014/main" id="{688EABE0-97EF-264A-B1C9-BD4BA1FBFD1F}"/>
+              </a:ext>
+            </a:extLst>
+          </p:cNvPr>
+          <p:cNvSpPr>
+            <a:spLocks noGrp="1"/>
+          </p:cNvSpPr>
+          <p:nvPr>
+            <p:ph type="body" sz="quarter" idx="10"/>
+          </p:nvPr>
+        </p:nvSpPr>
+        <p:spPr>
+          <a:xfrm>
+            <a:off x="397832" y="1925680"/>
+            <a:ext cx="4339421" cy="1335750"/>
+          </a:xfrm>
+        </p:spPr>
+        <p:txBody>
+          <a:bodyPr/>
+          <a:lstStyle/>
+          <a:p>
+            <a:pPr fontAlgn="base"/>
+            <a:r>
+              <a:rPr lang="en-US" dirty="0" smtClean="0">
+                <a:cs typeface="Consolas" panose="020B0609020204030204" pitchFamily="49" charset="0"/>
+              </a:rPr>
+              <a:t>Lets assume:</a:t>
+            </a:r>
+          </a:p>
+          <a:p>
+            <a:pPr marL="699614" lvl="1" indent="0" fontAlgn="base">
+              <a:buNone/>
+            </a:pPr>
+            <a:r>
+              <a:rPr lang="en-US" sz="1800" dirty="0">
+                <a:latin typeface="Consolas" panose="020B0609020204030204" pitchFamily="49" charset="0"/>
+                <a:cs typeface="Consolas" panose="020B0609020204030204" pitchFamily="49" charset="0"/>
+              </a:rPr>
+              <a:t>e</a:t>
+            </a:r>
+            <a:r>
+              <a:rPr lang="en-US" sz="1800" dirty="0" smtClean="0">
+                <a:latin typeface="Consolas" panose="020B0609020204030204" pitchFamily="49" charset="0"/>
+                <a:cs typeface="Consolas" panose="020B0609020204030204" pitchFamily="49" charset="0"/>
+              </a:rPr>
+              <a:t>nd = 3;</a:t>
+            </a:r>
+          </a:p>
+          <a:p>
+            <a:pPr marL="699614" lvl="1" indent="0" fontAlgn="base">
+              <a:buNone/>
+            </a:pPr>
+            <a:r>
+              <a:rPr lang="en-US" sz="1800" dirty="0">
+                <a:latin typeface="Consolas" panose="020B0609020204030204" pitchFamily="49" charset="0"/>
+                <a:cs typeface="Consolas" panose="020B0609020204030204" pitchFamily="49" charset="0"/>
+              </a:rPr>
+              <a:t>s</a:t>
+            </a:r>
+            <a:r>
+              <a:rPr lang="en-US" sz="1800" dirty="0" smtClean="0">
+                <a:latin typeface="Consolas" panose="020B0609020204030204" pitchFamily="49" charset="0"/>
+                <a:cs typeface="Consolas" panose="020B0609020204030204" pitchFamily="49" charset="0"/>
+              </a:rPr>
+              <a:t>tart = 1;</a:t>
+            </a:r>
+            <a:endParaRPr lang="en-US" sz="1800" dirty="0">
+              <a:latin typeface="Consolas" panose="020B0609020204030204" pitchFamily="49" charset="0"/>
+              <a:cs typeface="Consolas" panose="020B0609020204030204" pitchFamily="49" charset="0"/>
+            </a:endParaRPr>
+          </a:p>
+        </p:txBody>
+      </p:sp>
+      <p:pic>
+        <p:nvPicPr>
+          <p:cNvPr id="1026" name="Picture 2">
+            <a:extLst>
+              <a:ext uri="{FF2B5EF4-FFF2-40B4-BE49-F238E27FC236}">
+                <a16:creationId xmlns:a16="http://schemas.microsoft.com/office/drawing/2014/main" id="{00F26F20-6AC5-0140-9AD8-D6FAE2201276}"/>
+              </a:ext>
+            </a:extLst>
+          </p:cNvPr>
+          <p:cNvPicPr>
+            <a:picLocks noChangeAspect="1" noChangeArrowheads="1"/>
+          </p:cNvPicPr>
+          <p:nvPr/>
+        </p:nvPicPr>
+        <p:blipFill>
+          <a:blip r:embed="rId2">
+            <a:extLst>
+              <a:ext uri="{28A0092B-C50C-407E-A947-70E740481C1C}">
+                <a14:useLocalDpi xmlns:a14="http://schemas.microsoft.com/office/drawing/2010/main" val="0"/>
+              </a:ext>
+            </a:extLst>
+          </a:blip>
+          <a:srcRect/>
+          <a:stretch>
+            <a:fillRect/>
+          </a:stretch>
+        </p:blipFill>
+        <p:spPr bwMode="auto">
+          <a:xfrm>
+            <a:off x="6437415" y="0"/>
+            <a:ext cx="7380185" cy="2277835"/>
+          </a:xfrm>
+          <a:prstGeom prst="rect">
+            <a:avLst/>
+          </a:prstGeom>
+          <a:noFill/>
+          <a:extLst>
+            <a:ext uri="{909E8E84-426E-40DD-AFC4-6F175D3DCCD1}">
+              <a14:hiddenFill xmlns:a14="http://schemas.microsoft.com/office/drawing/2010/main">
+                <a:solidFill>
+                  <a:srgbClr val="FFFFFF"/>
+                </a:solidFill>
+              </a14:hiddenFill>
+            </a:ext>
+          </a:extLst>
+        </p:spPr>
+      </p:pic>
+      <p:sp>
+        <p:nvSpPr>
+          <p:cNvPr id="5" name="TextBox 4"/>
+          <p:cNvSpPr txBox="1"/>
+          <p:nvPr/>
+        </p:nvSpPr>
+        <p:spPr>
+          <a:xfrm>
+            <a:off x="5883007" y="2554158"/>
+            <a:ext cx="793215" cy="400110"/>
+          </a:xfrm>
+          <a:prstGeom prst="rect">
+            <a:avLst/>
+          </a:prstGeom>
+          <a:noFill/>
+        </p:spPr>
+        <p:txBody>
+          <a:bodyPr wrap="square" rtlCol="0">
+            <a:spAutoFit/>
+          </a:bodyPr>
+          <a:lstStyle/>
+          <a:p>
+            <a:r>
+              <a:rPr lang="en-US" dirty="0" smtClean="0">
+                <a:latin typeface="Consolas" panose="020B0609020204030204" pitchFamily="49" charset="0"/>
+              </a:rPr>
+              <a:t>end</a:t>
+            </a:r>
+            <a:endParaRPr lang="en-US" dirty="0">
+              <a:latin typeface="Consolas" panose="020B0609020204030204" pitchFamily="49" charset="0"/>
+            </a:endParaRPr>
+          </a:p>
+        </p:txBody>
+      </p:sp>
+      <p:sp>
+        <p:nvSpPr>
+          <p:cNvPr id="8" name="TextBox 7"/>
+          <p:cNvSpPr txBox="1"/>
+          <p:nvPr/>
+        </p:nvSpPr>
+        <p:spPr>
+          <a:xfrm>
+            <a:off x="6908801" y="2554158"/>
+            <a:ext cx="1012327" cy="400110"/>
+          </a:xfrm>
+          <a:prstGeom prst="rect">
+            <a:avLst/>
+          </a:prstGeom>
+          <a:noFill/>
+        </p:spPr>
+        <p:txBody>
+          <a:bodyPr wrap="square" rtlCol="0">
+            <a:spAutoFit/>
+          </a:bodyPr>
+          <a:lstStyle/>
+          <a:p>
+            <a:r>
+              <a:rPr lang="en-US" dirty="0" smtClean="0">
+                <a:latin typeface="Consolas" panose="020B0609020204030204" pitchFamily="49" charset="0"/>
+              </a:rPr>
+              <a:t>start</a:t>
+            </a:r>
+            <a:endParaRPr lang="en-US" dirty="0">
+              <a:latin typeface="Consolas" panose="020B0609020204030204" pitchFamily="49" charset="0"/>
+            </a:endParaRPr>
+          </a:p>
+        </p:txBody>
+      </p:sp>
+      <p:sp>
+        <p:nvSpPr>
+          <p:cNvPr id="9" name="TextBox 8"/>
+          <p:cNvSpPr txBox="1"/>
+          <p:nvPr/>
+        </p:nvSpPr>
+        <p:spPr>
+          <a:xfrm>
+            <a:off x="5820470" y="3092063"/>
+            <a:ext cx="793215" cy="400110"/>
+          </a:xfrm>
+          <a:prstGeom prst="rect">
+            <a:avLst/>
+          </a:prstGeom>
+          <a:noFill/>
+          <a:ln>
+            <a:solidFill>
+              <a:schemeClr val="tx1"/>
+            </a:solidFill>
+          </a:ln>
+        </p:spPr>
+        <p:txBody>
+          <a:bodyPr wrap="square" rtlCol="0">
+            <a:spAutoFit/>
+          </a:bodyPr>
+          <a:lstStyle/>
+          <a:p>
+            <a:pPr algn="ctr"/>
+            <a:r>
+              <a:rPr lang="en-US" dirty="0">
+                <a:latin typeface="Consolas" panose="020B0609020204030204" pitchFamily="49" charset="0"/>
+              </a:rPr>
+              <a:t>3</a:t>
+            </a:r>
+          </a:p>
+        </p:txBody>
+      </p:sp>
+      <p:sp>
+        <p:nvSpPr>
+          <p:cNvPr id="10" name="TextBox 9"/>
+          <p:cNvSpPr txBox="1"/>
+          <p:nvPr/>
+        </p:nvSpPr>
+        <p:spPr>
+          <a:xfrm>
+            <a:off x="7018355" y="4640373"/>
+            <a:ext cx="793215" cy="400110"/>
+          </a:xfrm>
+          <a:prstGeom prst="rect">
+            <a:avLst/>
+          </a:prstGeom>
+          <a:noFill/>
+          <a:ln>
+            <a:solidFill>
+              <a:schemeClr val="tx1"/>
+            </a:solidFill>
+          </a:ln>
+        </p:spPr>
+        <p:txBody>
+          <a:bodyPr wrap="square" rtlCol="0">
+            <a:spAutoFit/>
+          </a:bodyPr>
+          <a:lstStyle/>
+          <a:p>
+            <a:pPr algn="ctr"/>
+            <a:r>
+              <a:rPr lang="en-US" dirty="0" smtClean="0">
+                <a:latin typeface="Consolas" panose="020B0609020204030204" pitchFamily="49" charset="0"/>
+              </a:rPr>
+              <a:t>3</a:t>
+            </a:r>
+            <a:endParaRPr lang="en-US" dirty="0">
+              <a:latin typeface="Consolas" panose="020B0609020204030204" pitchFamily="49" charset="0"/>
+            </a:endParaRPr>
+          </a:p>
+        </p:txBody>
+      </p:sp>
+      <p:sp>
+        <p:nvSpPr>
+          <p:cNvPr id="11" name="TextBox 10"/>
+          <p:cNvSpPr txBox="1"/>
+          <p:nvPr/>
+        </p:nvSpPr>
+        <p:spPr>
+          <a:xfrm>
+            <a:off x="7018356" y="3116071"/>
+            <a:ext cx="793215" cy="400110"/>
+          </a:xfrm>
+          <a:prstGeom prst="rect">
+            <a:avLst/>
+          </a:prstGeom>
+          <a:noFill/>
+          <a:ln>
+            <a:solidFill>
+              <a:schemeClr val="tx1"/>
+            </a:solidFill>
+          </a:ln>
+        </p:spPr>
+        <p:txBody>
+          <a:bodyPr wrap="square" rtlCol="0">
+            <a:spAutoFit/>
+          </a:bodyPr>
+          <a:lstStyle/>
+          <a:p>
+            <a:pPr algn="ctr"/>
+            <a:r>
+              <a:rPr lang="en-US" dirty="0" smtClean="0">
+                <a:latin typeface="Consolas" panose="020B0609020204030204" pitchFamily="49" charset="0"/>
+              </a:rPr>
+              <a:t>1</a:t>
+            </a:r>
+            <a:endParaRPr lang="en-US" dirty="0">
+              <a:latin typeface="Consolas" panose="020B0609020204030204" pitchFamily="49" charset="0"/>
+            </a:endParaRPr>
+          </a:p>
+        </p:txBody>
+      </p:sp>
+      <p:sp>
+        <p:nvSpPr>
+          <p:cNvPr id="12" name="Text Placeholder 2">
+            <a:extLst>
+              <a:ext uri="{FF2B5EF4-FFF2-40B4-BE49-F238E27FC236}">
+                <a16:creationId xmlns:a16="http://schemas.microsoft.com/office/drawing/2014/main" id="{688EABE0-97EF-264A-B1C9-BD4BA1FBFD1F}"/>
+              </a:ext>
+            </a:extLst>
+          </p:cNvPr>
+          <p:cNvSpPr txBox="1">
+            <a:spLocks/>
+          </p:cNvSpPr>
+          <p:nvPr/>
+        </p:nvSpPr>
+        <p:spPr>
+          <a:xfrm>
+            <a:off x="340779" y="3355203"/>
+            <a:ext cx="4339421" cy="1489639"/>
+          </a:xfrm>
+          <a:prstGeom prst="rect">
+            <a:avLst/>
+          </a:prstGeom>
+        </p:spPr>
+        <p:txBody>
+          <a:bodyPr vert="horz" lIns="91440" tIns="91440" rIns="91440" bIns="91440" rtlCol="0">
+            <a:spAutoFit/>
+          </a:bodyPr>
+          <a:lstStyle>
+            <a:lvl1pPr marL="524712" indent="-524712" algn="l" defTabSz="699614" rtl="0" eaLnBrk="1" latinLnBrk="0" hangingPunct="1">
+              <a:lnSpc>
+                <a:spcPct val="120000"/>
+              </a:lnSpc>
+              <a:spcBef>
+                <a:spcPts val="600"/>
+              </a:spcBef>
+              <a:spcAft>
+                <a:spcPts val="600"/>
+              </a:spcAft>
+              <a:buFont typeface="Arial"/>
+              <a:buChar char="•"/>
+              <a:defRPr sz="1800" b="0" i="0" kern="1200">
+                <a:solidFill>
+                  <a:srgbClr val="092529"/>
+                </a:solidFill>
+                <a:latin typeface="Proxima Nova" charset="0"/>
+                <a:ea typeface="Proxima Nova" charset="0"/>
+                <a:cs typeface="Proxima Nova" charset="0"/>
+              </a:defRPr>
+            </a:lvl1pPr>
+            <a:lvl2pPr marL="1136875" indent="-437261" algn="l" defTabSz="699614" rtl="0" eaLnBrk="1" latinLnBrk="0" hangingPunct="1">
+              <a:lnSpc>
+                <a:spcPct val="120000"/>
+              </a:lnSpc>
+              <a:spcBef>
+                <a:spcPts val="0"/>
+              </a:spcBef>
+              <a:spcAft>
+                <a:spcPts val="600"/>
+              </a:spcAft>
+              <a:buFont typeface="Arial"/>
+              <a:buChar char="–"/>
+              <a:defRPr sz="1600" b="0" i="0" kern="1200">
+                <a:solidFill>
+                  <a:srgbClr val="092529"/>
+                </a:solidFill>
+                <a:latin typeface="Proxima Nova" charset="0"/>
+                <a:ea typeface="Proxima Nova" charset="0"/>
+                <a:cs typeface="Proxima Nova" charset="0"/>
+              </a:defRPr>
+            </a:lvl2pPr>
+            <a:lvl3pPr marL="1749040" indent="-349807" algn="l" defTabSz="699614" rtl="0" eaLnBrk="1" latinLnBrk="0" hangingPunct="1">
+              <a:lnSpc>
+                <a:spcPct val="120000"/>
+              </a:lnSpc>
+              <a:spcBef>
+                <a:spcPts val="0"/>
+              </a:spcBef>
+              <a:spcAft>
+                <a:spcPts val="600"/>
+              </a:spcAft>
+              <a:buFont typeface="Arial"/>
+              <a:buChar char="•"/>
+              <a:defRPr sz="1600" b="0" i="0" kern="1200">
+                <a:solidFill>
+                  <a:srgbClr val="092529"/>
+                </a:solidFill>
+                <a:latin typeface="Proxima Nova" charset="0"/>
+                <a:ea typeface="Proxima Nova" charset="0"/>
+                <a:cs typeface="Proxima Nova" charset="0"/>
+              </a:defRPr>
+            </a:lvl3pPr>
+            <a:lvl4pPr marL="2448655" indent="-349807" algn="l" defTabSz="699614" rtl="0" eaLnBrk="1" latinLnBrk="0" hangingPunct="1">
+              <a:lnSpc>
+                <a:spcPct val="120000"/>
+              </a:lnSpc>
+              <a:spcBef>
+                <a:spcPts val="0"/>
+              </a:spcBef>
+              <a:spcAft>
+                <a:spcPts val="600"/>
+              </a:spcAft>
+              <a:buFont typeface="Arial"/>
+              <a:buChar char="–"/>
+              <a:defRPr sz="1600" b="0" i="0" kern="1200">
+                <a:solidFill>
+                  <a:srgbClr val="092529"/>
+                </a:solidFill>
+                <a:latin typeface="Proxima Nova" charset="0"/>
+                <a:ea typeface="Proxima Nova" charset="0"/>
+                <a:cs typeface="Proxima Nova" charset="0"/>
+              </a:defRPr>
+            </a:lvl4pPr>
+            <a:lvl5pPr marL="3148272" indent="-349807" algn="l" defTabSz="699614" rtl="0" eaLnBrk="1" latinLnBrk="0" hangingPunct="1">
+              <a:spcBef>
+                <a:spcPct val="20000"/>
+              </a:spcBef>
+              <a:buFont typeface="Arial"/>
+              <a:buChar char="»"/>
+              <a:defRPr sz="1648" b="0" kern="1200">
+                <a:solidFill>
+                  <a:srgbClr val="092529"/>
+                </a:solidFill>
+                <a:latin typeface="Franklin Gothic Book" charset="0"/>
+                <a:ea typeface="Franklin Gothic Book" charset="0"/>
+                <a:cs typeface="Franklin Gothic Book" charset="0"/>
+              </a:defRPr>
+            </a:lvl5pPr>
+            <a:lvl6pPr marL="3847888" indent="-349807" algn="l" defTabSz="699614" rtl="0" eaLnBrk="1" latinLnBrk="0" hangingPunct="1">
+              <a:spcBef>
+                <a:spcPct val="20000"/>
+              </a:spcBef>
+              <a:buFont typeface="Arial"/>
+              <a:buChar char="•"/>
+              <a:defRPr sz="3022" kern="1200">
+                <a:solidFill>
+                  <a:schemeClr val="tx1"/>
+                </a:solidFill>
+                <a:latin typeface="+mn-lt"/>
+                <a:ea typeface="+mn-ea"/>
+                <a:cs typeface="+mn-cs"/>
+              </a:defRPr>
+            </a:lvl6pPr>
+            <a:lvl7pPr marL="4547505" indent="-349807" algn="l" defTabSz="699614" rtl="0" eaLnBrk="1" latinLnBrk="0" hangingPunct="1">
+              <a:spcBef>
+                <a:spcPct val="20000"/>
+              </a:spcBef>
+              <a:buFont typeface="Arial"/>
+              <a:buChar char="•"/>
+              <a:defRPr sz="3022" kern="1200">
+                <a:solidFill>
+                  <a:schemeClr val="tx1"/>
+                </a:solidFill>
+                <a:latin typeface="+mn-lt"/>
+                <a:ea typeface="+mn-ea"/>
+                <a:cs typeface="+mn-cs"/>
+              </a:defRPr>
+            </a:lvl7pPr>
+            <a:lvl8pPr marL="5247119" indent="-349807" algn="l" defTabSz="699614" rtl="0" eaLnBrk="1" latinLnBrk="0" hangingPunct="1">
+              <a:spcBef>
+                <a:spcPct val="20000"/>
+              </a:spcBef>
+              <a:buFont typeface="Arial"/>
+              <a:buChar char="•"/>
+              <a:defRPr sz="3022" kern="1200">
+                <a:solidFill>
+                  <a:schemeClr val="tx1"/>
+                </a:solidFill>
+                <a:latin typeface="+mn-lt"/>
+                <a:ea typeface="+mn-ea"/>
+                <a:cs typeface="+mn-cs"/>
+              </a:defRPr>
+            </a:lvl8pPr>
+            <a:lvl9pPr marL="5946736" indent="-349807" algn="l" defTabSz="699614" rtl="0" eaLnBrk="1" latinLnBrk="0" hangingPunct="1">
+              <a:spcBef>
+                <a:spcPct val="20000"/>
+              </a:spcBef>
+              <a:buFont typeface="Arial"/>
+              <a:buChar char="•"/>
+              <a:defRPr sz="3022" kern="1200">
+                <a:solidFill>
+                  <a:schemeClr val="tx1"/>
+                </a:solidFill>
+                <a:latin typeface="+mn-lt"/>
+                <a:ea typeface="+mn-ea"/>
+                <a:cs typeface="+mn-cs"/>
+              </a:defRPr>
+            </a:lvl9pPr>
+          </a:lstStyle>
+          <a:p>
+            <a:pPr marL="0" indent="0" fontAlgn="base">
+              <a:buNone/>
+            </a:pPr>
+            <a:r>
+              <a:rPr lang="en-US" dirty="0" smtClean="0">
+                <a:latin typeface="Consolas" panose="020B0609020204030204" pitchFamily="49" charset="0"/>
+                <a:cs typeface="Consolas" panose="020B0609020204030204" pitchFamily="49" charset="0"/>
+              </a:rPr>
+              <a:t>	while(1 &lt; 3){</a:t>
+            </a:r>
+          </a:p>
+          <a:p>
+            <a:pPr marL="0" indent="0" fontAlgn="base">
+              <a:buNone/>
+            </a:pPr>
+            <a:r>
+              <a:rPr lang="en-US" sz="1800" dirty="0">
+                <a:latin typeface="Consolas" panose="020B0609020204030204" pitchFamily="49" charset="0"/>
+                <a:cs typeface="Consolas" panose="020B0609020204030204" pitchFamily="49" charset="0"/>
+              </a:rPr>
+              <a:t> </a:t>
+            </a:r>
+            <a:r>
+              <a:rPr lang="en-US" sz="1800" dirty="0" smtClean="0">
+                <a:latin typeface="Consolas" panose="020B0609020204030204" pitchFamily="49" charset="0"/>
+                <a:cs typeface="Consolas" panose="020B0609020204030204" pitchFamily="49" charset="0"/>
+              </a:rPr>
+              <a:t>       start++;</a:t>
+            </a:r>
+          </a:p>
+          <a:p>
+            <a:pPr marL="0" indent="0" fontAlgn="base">
+              <a:buNone/>
+            </a:pPr>
+            <a:r>
+              <a:rPr lang="en-US" sz="1800" dirty="0" smtClean="0">
+                <a:latin typeface="Consolas" panose="020B0609020204030204" pitchFamily="49" charset="0"/>
+                <a:cs typeface="Consolas" panose="020B0609020204030204" pitchFamily="49" charset="0"/>
+              </a:rPr>
+              <a:t>     }</a:t>
+            </a:r>
+            <a:endParaRPr lang="en-US" sz="1800" dirty="0">
+              <a:latin typeface="Consolas" panose="020B0609020204030204" pitchFamily="49" charset="0"/>
+              <a:cs typeface="Consolas" panose="020B0609020204030204" pitchFamily="49" charset="0"/>
+            </a:endParaRPr>
+          </a:p>
+        </p:txBody>
+      </p:sp>
+      <p:cxnSp>
+        <p:nvCxnSpPr>
+          <p:cNvPr id="13" name="Straight Connector 12"/>
+          <p:cNvCxnSpPr/>
+          <p:nvPr/>
+        </p:nvCxnSpPr>
+        <p:spPr>
+          <a:xfrm flipV="1">
+            <a:off x="7138930" y="3316077"/>
+            <a:ext cx="495759" cy="11017"/>
+          </a:xfrm>
+          <a:prstGeom prst="line">
+            <a:avLst/>
+          </a:prstGeom>
+        </p:spPr>
+        <p:style>
+          <a:lnRef idx="2">
+            <a:schemeClr val="accent1"/>
+          </a:lnRef>
+          <a:fillRef idx="0">
+            <a:schemeClr val="accent1"/>
+          </a:fillRef>
+          <a:effectRef idx="1">
+            <a:schemeClr val="accent1"/>
+          </a:effectRef>
+          <a:fontRef idx="minor">
+            <a:schemeClr val="tx1"/>
+          </a:fontRef>
+        </p:style>
+      </p:cxnSp>
+      <p:sp>
+        <p:nvSpPr>
+          <p:cNvPr id="15" name="Text Placeholder 2">
+            <a:extLst>
+              <a:ext uri="{FF2B5EF4-FFF2-40B4-BE49-F238E27FC236}">
+                <a16:creationId xmlns:a16="http://schemas.microsoft.com/office/drawing/2014/main" id="{688EABE0-97EF-264A-B1C9-BD4BA1FBFD1F}"/>
+              </a:ext>
+            </a:extLst>
+          </p:cNvPr>
+          <p:cNvSpPr txBox="1">
+            <a:spLocks/>
+          </p:cNvSpPr>
+          <p:nvPr/>
+        </p:nvSpPr>
+        <p:spPr>
+          <a:xfrm>
+            <a:off x="340778" y="4766458"/>
+            <a:ext cx="4339421" cy="1489639"/>
+          </a:xfrm>
+          <a:prstGeom prst="rect">
+            <a:avLst/>
+          </a:prstGeom>
+        </p:spPr>
+        <p:txBody>
+          <a:bodyPr vert="horz" lIns="91440" tIns="91440" rIns="91440" bIns="91440" rtlCol="0">
+            <a:spAutoFit/>
+          </a:bodyPr>
+          <a:lstStyle>
+            <a:lvl1pPr marL="524712" indent="-524712" algn="l" defTabSz="699614" rtl="0" eaLnBrk="1" latinLnBrk="0" hangingPunct="1">
+              <a:lnSpc>
+                <a:spcPct val="120000"/>
+              </a:lnSpc>
+              <a:spcBef>
+                <a:spcPts val="600"/>
+              </a:spcBef>
+              <a:spcAft>
+                <a:spcPts val="600"/>
+              </a:spcAft>
+              <a:buFont typeface="Arial"/>
+              <a:buChar char="•"/>
+              <a:defRPr sz="1800" b="0" i="0" kern="1200">
+                <a:solidFill>
+                  <a:srgbClr val="092529"/>
+                </a:solidFill>
+                <a:latin typeface="Proxima Nova" charset="0"/>
+                <a:ea typeface="Proxima Nova" charset="0"/>
+                <a:cs typeface="Proxima Nova" charset="0"/>
+              </a:defRPr>
+            </a:lvl1pPr>
+            <a:lvl2pPr marL="1136875" indent="-437261" algn="l" defTabSz="699614" rtl="0" eaLnBrk="1" latinLnBrk="0" hangingPunct="1">
+              <a:lnSpc>
+                <a:spcPct val="120000"/>
+              </a:lnSpc>
+              <a:spcBef>
+                <a:spcPts val="0"/>
+              </a:spcBef>
+              <a:spcAft>
+                <a:spcPts val="600"/>
+              </a:spcAft>
+              <a:buFont typeface="Arial"/>
+              <a:buChar char="–"/>
+              <a:defRPr sz="1600" b="0" i="0" kern="1200">
+                <a:solidFill>
+                  <a:srgbClr val="092529"/>
+                </a:solidFill>
+                <a:latin typeface="Proxima Nova" charset="0"/>
+                <a:ea typeface="Proxima Nova" charset="0"/>
+                <a:cs typeface="Proxima Nova" charset="0"/>
+              </a:defRPr>
+            </a:lvl2pPr>
+            <a:lvl3pPr marL="1749040" indent="-349807" algn="l" defTabSz="699614" rtl="0" eaLnBrk="1" latinLnBrk="0" hangingPunct="1">
+              <a:lnSpc>
+                <a:spcPct val="120000"/>
+              </a:lnSpc>
+              <a:spcBef>
+                <a:spcPts val="0"/>
+              </a:spcBef>
+              <a:spcAft>
+                <a:spcPts val="600"/>
+              </a:spcAft>
+              <a:buFont typeface="Arial"/>
+              <a:buChar char="•"/>
+              <a:defRPr sz="1600" b="0" i="0" kern="1200">
+                <a:solidFill>
+                  <a:srgbClr val="092529"/>
+                </a:solidFill>
+                <a:latin typeface="Proxima Nova" charset="0"/>
+                <a:ea typeface="Proxima Nova" charset="0"/>
+                <a:cs typeface="Proxima Nova" charset="0"/>
+              </a:defRPr>
+            </a:lvl3pPr>
+            <a:lvl4pPr marL="2448655" indent="-349807" algn="l" defTabSz="699614" rtl="0" eaLnBrk="1" latinLnBrk="0" hangingPunct="1">
+              <a:lnSpc>
+                <a:spcPct val="120000"/>
+              </a:lnSpc>
+              <a:spcBef>
+                <a:spcPts val="0"/>
+              </a:spcBef>
+              <a:spcAft>
+                <a:spcPts val="600"/>
+              </a:spcAft>
+              <a:buFont typeface="Arial"/>
+              <a:buChar char="–"/>
+              <a:defRPr sz="1600" b="0" i="0" kern="1200">
+                <a:solidFill>
+                  <a:srgbClr val="092529"/>
+                </a:solidFill>
+                <a:latin typeface="Proxima Nova" charset="0"/>
+                <a:ea typeface="Proxima Nova" charset="0"/>
+                <a:cs typeface="Proxima Nova" charset="0"/>
+              </a:defRPr>
+            </a:lvl4pPr>
+            <a:lvl5pPr marL="3148272" indent="-349807" algn="l" defTabSz="699614" rtl="0" eaLnBrk="1" latinLnBrk="0" hangingPunct="1">
+              <a:spcBef>
+                <a:spcPct val="20000"/>
+              </a:spcBef>
+              <a:buFont typeface="Arial"/>
+              <a:buChar char="»"/>
+              <a:defRPr sz="1648" b="0" kern="1200">
+                <a:solidFill>
+                  <a:srgbClr val="092529"/>
+                </a:solidFill>
+                <a:latin typeface="Franklin Gothic Book" charset="0"/>
+                <a:ea typeface="Franklin Gothic Book" charset="0"/>
+                <a:cs typeface="Franklin Gothic Book" charset="0"/>
+              </a:defRPr>
+            </a:lvl5pPr>
+            <a:lvl6pPr marL="3847888" indent="-349807" algn="l" defTabSz="699614" rtl="0" eaLnBrk="1" latinLnBrk="0" hangingPunct="1">
+              <a:spcBef>
+                <a:spcPct val="20000"/>
+              </a:spcBef>
+              <a:buFont typeface="Arial"/>
+              <a:buChar char="•"/>
+              <a:defRPr sz="3022" kern="1200">
+                <a:solidFill>
+                  <a:schemeClr val="tx1"/>
+                </a:solidFill>
+                <a:latin typeface="+mn-lt"/>
+                <a:ea typeface="+mn-ea"/>
+                <a:cs typeface="+mn-cs"/>
+              </a:defRPr>
+            </a:lvl6pPr>
+            <a:lvl7pPr marL="4547505" indent="-349807" algn="l" defTabSz="699614" rtl="0" eaLnBrk="1" latinLnBrk="0" hangingPunct="1">
+              <a:spcBef>
+                <a:spcPct val="20000"/>
+              </a:spcBef>
+              <a:buFont typeface="Arial"/>
+              <a:buChar char="•"/>
+              <a:defRPr sz="3022" kern="1200">
+                <a:solidFill>
+                  <a:schemeClr val="tx1"/>
+                </a:solidFill>
+                <a:latin typeface="+mn-lt"/>
+                <a:ea typeface="+mn-ea"/>
+                <a:cs typeface="+mn-cs"/>
+              </a:defRPr>
+            </a:lvl7pPr>
+            <a:lvl8pPr marL="5247119" indent="-349807" algn="l" defTabSz="699614" rtl="0" eaLnBrk="1" latinLnBrk="0" hangingPunct="1">
+              <a:spcBef>
+                <a:spcPct val="20000"/>
+              </a:spcBef>
+              <a:buFont typeface="Arial"/>
+              <a:buChar char="•"/>
+              <a:defRPr sz="3022" kern="1200">
+                <a:solidFill>
+                  <a:schemeClr val="tx1"/>
+                </a:solidFill>
+                <a:latin typeface="+mn-lt"/>
+                <a:ea typeface="+mn-ea"/>
+                <a:cs typeface="+mn-cs"/>
+              </a:defRPr>
+            </a:lvl8pPr>
+            <a:lvl9pPr marL="5946736" indent="-349807" algn="l" defTabSz="699614" rtl="0" eaLnBrk="1" latinLnBrk="0" hangingPunct="1">
+              <a:spcBef>
+                <a:spcPct val="20000"/>
+              </a:spcBef>
+              <a:buFont typeface="Arial"/>
+              <a:buChar char="•"/>
+              <a:defRPr sz="3022" kern="1200">
+                <a:solidFill>
+                  <a:schemeClr val="tx1"/>
+                </a:solidFill>
+                <a:latin typeface="+mn-lt"/>
+                <a:ea typeface="+mn-ea"/>
+                <a:cs typeface="+mn-cs"/>
+              </a:defRPr>
+            </a:lvl9pPr>
+          </a:lstStyle>
+          <a:p>
+            <a:pPr marL="0" indent="0" fontAlgn="base">
+              <a:buNone/>
+            </a:pPr>
+            <a:r>
+              <a:rPr lang="en-US" dirty="0" smtClean="0">
+                <a:latin typeface="Consolas" panose="020B0609020204030204" pitchFamily="49" charset="0"/>
+                <a:cs typeface="Consolas" panose="020B0609020204030204" pitchFamily="49" charset="0"/>
+              </a:rPr>
+              <a:t>	while(2 &lt; 3){</a:t>
+            </a:r>
+          </a:p>
+          <a:p>
+            <a:pPr marL="0" indent="0" fontAlgn="base">
+              <a:buNone/>
+            </a:pPr>
+            <a:r>
+              <a:rPr lang="en-US" sz="1800" dirty="0">
+                <a:latin typeface="Consolas" panose="020B0609020204030204" pitchFamily="49" charset="0"/>
+                <a:cs typeface="Consolas" panose="020B0609020204030204" pitchFamily="49" charset="0"/>
+              </a:rPr>
+              <a:t> </a:t>
+            </a:r>
+            <a:r>
+              <a:rPr lang="en-US" sz="1800" dirty="0" smtClean="0">
+                <a:latin typeface="Consolas" panose="020B0609020204030204" pitchFamily="49" charset="0"/>
+                <a:cs typeface="Consolas" panose="020B0609020204030204" pitchFamily="49" charset="0"/>
+              </a:rPr>
+              <a:t>       start++;</a:t>
+            </a:r>
+          </a:p>
+          <a:p>
+            <a:pPr marL="0" indent="0" fontAlgn="base">
+              <a:buNone/>
+            </a:pPr>
+            <a:r>
+              <a:rPr lang="en-US" dirty="0">
+                <a:latin typeface="Consolas" panose="020B0609020204030204" pitchFamily="49" charset="0"/>
+                <a:cs typeface="Consolas" panose="020B0609020204030204" pitchFamily="49" charset="0"/>
+              </a:rPr>
+              <a:t> </a:t>
+            </a:r>
+            <a:r>
+              <a:rPr lang="en-US" dirty="0" smtClean="0">
+                <a:latin typeface="Consolas" panose="020B0609020204030204" pitchFamily="49" charset="0"/>
+                <a:cs typeface="Consolas" panose="020B0609020204030204" pitchFamily="49" charset="0"/>
+              </a:rPr>
+              <a:t>     }</a:t>
+            </a:r>
+            <a:endParaRPr lang="en-US" sz="1800" dirty="0">
+              <a:latin typeface="Consolas" panose="020B0609020204030204" pitchFamily="49" charset="0"/>
+              <a:cs typeface="Consolas" panose="020B0609020204030204" pitchFamily="49" charset="0"/>
+            </a:endParaRPr>
+          </a:p>
+        </p:txBody>
+      </p:sp>
+      <p:sp>
+        <p:nvSpPr>
+          <p:cNvPr id="16" name="TextBox 15"/>
+          <p:cNvSpPr txBox="1"/>
+          <p:nvPr/>
+        </p:nvSpPr>
+        <p:spPr>
+          <a:xfrm>
+            <a:off x="7018968" y="3929823"/>
+            <a:ext cx="793215" cy="400110"/>
+          </a:xfrm>
+          <a:prstGeom prst="rect">
+            <a:avLst/>
+          </a:prstGeom>
+          <a:noFill/>
+          <a:ln>
+            <a:solidFill>
+              <a:schemeClr val="tx1"/>
+            </a:solidFill>
+          </a:ln>
+        </p:spPr>
+        <p:txBody>
+          <a:bodyPr wrap="square" rtlCol="0">
+            <a:spAutoFit/>
+          </a:bodyPr>
+          <a:lstStyle/>
+          <a:p>
+            <a:pPr algn="ctr"/>
+            <a:r>
+              <a:rPr lang="en-US" dirty="0">
+                <a:latin typeface="Consolas" panose="020B0609020204030204" pitchFamily="49" charset="0"/>
+              </a:rPr>
+              <a:t>2</a:t>
+            </a:r>
+          </a:p>
+        </p:txBody>
+      </p:sp>
+      <p:cxnSp>
+        <p:nvCxnSpPr>
+          <p:cNvPr id="17" name="Straight Connector 16"/>
+          <p:cNvCxnSpPr/>
+          <p:nvPr/>
+        </p:nvCxnSpPr>
+        <p:spPr>
+          <a:xfrm>
+            <a:off x="7138930" y="4129878"/>
+            <a:ext cx="440675" cy="12464"/>
+          </a:xfrm>
+          <a:prstGeom prst="line">
+            <a:avLst/>
+          </a:prstGeom>
+        </p:spPr>
+        <p:style>
+          <a:lnRef idx="2">
+            <a:schemeClr val="accent1"/>
+          </a:lnRef>
+          <a:fillRef idx="0">
+            <a:schemeClr val="accent1"/>
+          </a:fillRef>
+          <a:effectRef idx="1">
+            <a:schemeClr val="accent1"/>
+          </a:effectRef>
+          <a:fontRef idx="minor">
+            <a:schemeClr val="tx1"/>
+          </a:fontRef>
+        </p:style>
+      </p:cxnSp>
+      <p:sp>
+        <p:nvSpPr>
+          <p:cNvPr id="20" name="Text Placeholder 2">
+            <a:extLst>
+              <a:ext uri="{FF2B5EF4-FFF2-40B4-BE49-F238E27FC236}">
+                <a16:creationId xmlns:a16="http://schemas.microsoft.com/office/drawing/2014/main" id="{688EABE0-97EF-264A-B1C9-BD4BA1FBFD1F}"/>
+              </a:ext>
+            </a:extLst>
+          </p:cNvPr>
+          <p:cNvSpPr txBox="1">
+            <a:spLocks/>
+          </p:cNvSpPr>
+          <p:nvPr/>
+        </p:nvSpPr>
+        <p:spPr>
+          <a:xfrm>
+            <a:off x="397832" y="6164675"/>
+            <a:ext cx="8259941" cy="1003352"/>
+          </a:xfrm>
+          <a:prstGeom prst="rect">
+            <a:avLst/>
+          </a:prstGeom>
+        </p:spPr>
+        <p:txBody>
+          <a:bodyPr vert="horz" wrap="square" lIns="91440" tIns="91440" rIns="91440" bIns="91440" rtlCol="0">
+            <a:spAutoFit/>
+          </a:bodyPr>
+          <a:lstStyle>
+            <a:lvl1pPr marL="524712" indent="-524712" algn="l" defTabSz="699614" rtl="0" eaLnBrk="1" latinLnBrk="0" hangingPunct="1">
+              <a:lnSpc>
+                <a:spcPct val="120000"/>
+              </a:lnSpc>
+              <a:spcBef>
+                <a:spcPts val="600"/>
+              </a:spcBef>
+              <a:spcAft>
+                <a:spcPts val="600"/>
+              </a:spcAft>
+              <a:buFont typeface="Arial"/>
+              <a:buChar char="•"/>
+              <a:defRPr sz="1800" b="0" i="0" kern="1200">
+                <a:solidFill>
+                  <a:srgbClr val="092529"/>
+                </a:solidFill>
+                <a:latin typeface="Proxima Nova" charset="0"/>
+                <a:ea typeface="Proxima Nova" charset="0"/>
+                <a:cs typeface="Proxima Nova" charset="0"/>
+              </a:defRPr>
+            </a:lvl1pPr>
+            <a:lvl2pPr marL="1136875" indent="-437261" algn="l" defTabSz="699614" rtl="0" eaLnBrk="1" latinLnBrk="0" hangingPunct="1">
+              <a:lnSpc>
+                <a:spcPct val="120000"/>
+              </a:lnSpc>
+              <a:spcBef>
+                <a:spcPts val="0"/>
+              </a:spcBef>
+              <a:spcAft>
+                <a:spcPts val="600"/>
+              </a:spcAft>
+              <a:buFont typeface="Arial"/>
+              <a:buChar char="–"/>
+              <a:defRPr sz="1600" b="0" i="0" kern="1200">
+                <a:solidFill>
+                  <a:srgbClr val="092529"/>
+                </a:solidFill>
+                <a:latin typeface="Proxima Nova" charset="0"/>
+                <a:ea typeface="Proxima Nova" charset="0"/>
+                <a:cs typeface="Proxima Nova" charset="0"/>
+              </a:defRPr>
+            </a:lvl2pPr>
+            <a:lvl3pPr marL="1749040" indent="-349807" algn="l" defTabSz="699614" rtl="0" eaLnBrk="1" latinLnBrk="0" hangingPunct="1">
+              <a:lnSpc>
+                <a:spcPct val="120000"/>
+              </a:lnSpc>
+              <a:spcBef>
+                <a:spcPts val="0"/>
+              </a:spcBef>
+              <a:spcAft>
+                <a:spcPts val="600"/>
+              </a:spcAft>
+              <a:buFont typeface="Arial"/>
+              <a:buChar char="•"/>
+              <a:defRPr sz="1600" b="0" i="0" kern="1200">
+                <a:solidFill>
+                  <a:srgbClr val="092529"/>
+                </a:solidFill>
+                <a:latin typeface="Proxima Nova" charset="0"/>
+                <a:ea typeface="Proxima Nova" charset="0"/>
+                <a:cs typeface="Proxima Nova" charset="0"/>
+              </a:defRPr>
+            </a:lvl3pPr>
+            <a:lvl4pPr marL="2448655" indent="-349807" algn="l" defTabSz="699614" rtl="0" eaLnBrk="1" latinLnBrk="0" hangingPunct="1">
+              <a:lnSpc>
+                <a:spcPct val="120000"/>
+              </a:lnSpc>
+              <a:spcBef>
+                <a:spcPts val="0"/>
+              </a:spcBef>
+              <a:spcAft>
+                <a:spcPts val="600"/>
+              </a:spcAft>
+              <a:buFont typeface="Arial"/>
+              <a:buChar char="–"/>
+              <a:defRPr sz="1600" b="0" i="0" kern="1200">
+                <a:solidFill>
+                  <a:srgbClr val="092529"/>
+                </a:solidFill>
+                <a:latin typeface="Proxima Nova" charset="0"/>
+                <a:ea typeface="Proxima Nova" charset="0"/>
+                <a:cs typeface="Proxima Nova" charset="0"/>
+              </a:defRPr>
+            </a:lvl4pPr>
+            <a:lvl5pPr marL="3148272" indent="-349807" algn="l" defTabSz="699614" rtl="0" eaLnBrk="1" latinLnBrk="0" hangingPunct="1">
+              <a:spcBef>
+                <a:spcPct val="20000"/>
+              </a:spcBef>
+              <a:buFont typeface="Arial"/>
+              <a:buChar char="»"/>
+              <a:defRPr sz="1648" b="0" kern="1200">
+                <a:solidFill>
+                  <a:srgbClr val="092529"/>
+                </a:solidFill>
+                <a:latin typeface="Franklin Gothic Book" charset="0"/>
+                <a:ea typeface="Franklin Gothic Book" charset="0"/>
+                <a:cs typeface="Franklin Gothic Book" charset="0"/>
+              </a:defRPr>
+            </a:lvl5pPr>
+            <a:lvl6pPr marL="3847888" indent="-349807" algn="l" defTabSz="699614" rtl="0" eaLnBrk="1" latinLnBrk="0" hangingPunct="1">
+              <a:spcBef>
+                <a:spcPct val="20000"/>
+              </a:spcBef>
+              <a:buFont typeface="Arial"/>
+              <a:buChar char="•"/>
+              <a:defRPr sz="3022" kern="1200">
+                <a:solidFill>
+                  <a:schemeClr val="tx1"/>
+                </a:solidFill>
+                <a:latin typeface="+mn-lt"/>
+                <a:ea typeface="+mn-ea"/>
+                <a:cs typeface="+mn-cs"/>
+              </a:defRPr>
+            </a:lvl6pPr>
+            <a:lvl7pPr marL="4547505" indent="-349807" algn="l" defTabSz="699614" rtl="0" eaLnBrk="1" latinLnBrk="0" hangingPunct="1">
+              <a:spcBef>
+                <a:spcPct val="20000"/>
+              </a:spcBef>
+              <a:buFont typeface="Arial"/>
+              <a:buChar char="•"/>
+              <a:defRPr sz="3022" kern="1200">
+                <a:solidFill>
+                  <a:schemeClr val="tx1"/>
+                </a:solidFill>
+                <a:latin typeface="+mn-lt"/>
+                <a:ea typeface="+mn-ea"/>
+                <a:cs typeface="+mn-cs"/>
+              </a:defRPr>
+            </a:lvl7pPr>
+            <a:lvl8pPr marL="5247119" indent="-349807" algn="l" defTabSz="699614" rtl="0" eaLnBrk="1" latinLnBrk="0" hangingPunct="1">
+              <a:spcBef>
+                <a:spcPct val="20000"/>
+              </a:spcBef>
+              <a:buFont typeface="Arial"/>
+              <a:buChar char="•"/>
+              <a:defRPr sz="3022" kern="1200">
+                <a:solidFill>
+                  <a:schemeClr val="tx1"/>
+                </a:solidFill>
+                <a:latin typeface="+mn-lt"/>
+                <a:ea typeface="+mn-ea"/>
+                <a:cs typeface="+mn-cs"/>
+              </a:defRPr>
+            </a:lvl8pPr>
+            <a:lvl9pPr marL="5946736" indent="-349807" algn="l" defTabSz="699614" rtl="0" eaLnBrk="1" latinLnBrk="0" hangingPunct="1">
+              <a:spcBef>
+                <a:spcPct val="20000"/>
+              </a:spcBef>
+              <a:buFont typeface="Arial"/>
+              <a:buChar char="•"/>
+              <a:defRPr sz="3022" kern="1200">
+                <a:solidFill>
+                  <a:schemeClr val="tx1"/>
+                </a:solidFill>
+                <a:latin typeface="+mn-lt"/>
+                <a:ea typeface="+mn-ea"/>
+                <a:cs typeface="+mn-cs"/>
+              </a:defRPr>
+            </a:lvl9pPr>
+          </a:lstStyle>
+          <a:p>
+            <a:pPr marL="0" indent="0" fontAlgn="base">
+              <a:buNone/>
+            </a:pPr>
+            <a:r>
+              <a:rPr lang="en-US" dirty="0" smtClean="0">
+                <a:latin typeface="Consolas" panose="020B0609020204030204" pitchFamily="49" charset="0"/>
+                <a:cs typeface="Consolas" panose="020B0609020204030204" pitchFamily="49" charset="0"/>
+              </a:rPr>
+              <a:t>	while(3 &lt; 3) – out of while</a:t>
+            </a:r>
+          </a:p>
+          <a:p>
+            <a:pPr marL="0" indent="0" fontAlgn="base">
+              <a:buNone/>
+            </a:pPr>
+            <a:r>
+              <a:rPr lang="en-US" dirty="0" smtClean="0">
+                <a:latin typeface="Consolas" panose="020B0609020204030204" pitchFamily="49" charset="0"/>
+                <a:cs typeface="Consolas" panose="020B0609020204030204" pitchFamily="49" charset="0"/>
+              </a:rPr>
+              <a:t>	</a:t>
+            </a:r>
+            <a:r>
+              <a:rPr lang="en-US" dirty="0" err="1" smtClean="0">
+                <a:latin typeface="Consolas" panose="020B0609020204030204" pitchFamily="49" charset="0"/>
+                <a:cs typeface="Consolas" panose="020B0609020204030204" pitchFamily="49" charset="0"/>
+              </a:rPr>
+              <a:t>System.out.println</a:t>
+            </a:r>
+            <a:r>
+              <a:rPr lang="en-US" dirty="0" smtClean="0">
+                <a:latin typeface="Consolas" panose="020B0609020204030204" pitchFamily="49" charset="0"/>
+                <a:cs typeface="Consolas" panose="020B0609020204030204" pitchFamily="49" charset="0"/>
+              </a:rPr>
+              <a:t>(“My Start is now: ”+ start);</a:t>
+            </a:r>
+          </a:p>
+        </p:txBody>
+      </p:sp>
+    </p:spTree>
+    <p:extLst>
+      <p:ext uri="{BB962C8B-B14F-4D97-AF65-F5344CB8AC3E}">
+        <p14:creationId xmlns:p14="http://schemas.microsoft.com/office/powerpoint/2010/main" val="202948957"/>
+      </p:ext>
+    </p:extLst>
+  </p:cSld>
+  <p:clrMapOvr>
+    <a:masterClrMapping/>
+  </p:clrMapOvr>
+  <mc:AlternateContent xmlns:mc="http://schemas.openxmlformats.org/markup-compatibility/2006" xmlns:p14="http://schemas.microsoft.com/office/powerpoint/2010/main">
+    <mc:Choice Requires="p14">
+      <p:transition p14:dur="300">
+        <p:fade/>
+      </p:transition>
+    </mc:Choice>
+    <mc:Fallback xmlns="">
+      <p:transition>
+        <p:fade/>
+      </p:transition>
+    </mc:Fallback>
+  </mc:AlternateContent>
+  <p:timing>
+    <p:tnLst>
+      <p:par>
+        <p:cTn id="1" dur="indefinite" restart="never" nodeType="tmRoot">
+          <p:childTnLst>
+            <p:seq concurrent="1" nextAc="seek">
+              <p:cTn id="2" dur="indefinite" nodeType="mainSeq">
+                <p:childTnLst>
+                  <p:par>
+                    <p:cTn id="3" fill="hold">
+                      <p:stCondLst>
+                        <p:cond delay="indefinite"/>
+                      </p:stCondLst>
+                      <p:childTnLst>
+                        <p:par>
+                          <p:cTn id="4" fill="hold">
+                            <p:stCondLst>
+                              <p:cond delay="0"/>
+                            </p:stCondLst>
+                            <p:childTnLst>
+                              <p:par>
+                                <p:cTn id="5" presetID="1" presetClass="entr" presetSubtype="0" fill="hold" grpId="0" nodeType="clickEffect">
+                                  <p:stCondLst>
+                                    <p:cond delay="0"/>
+                                  </p:stCondLst>
+                                  <p:childTnLst>
+                                    <p:set>
+                                      <p:cBhvr>
+                                        <p:cTn id="6" dur="1" fill="hold">
+                                          <p:stCondLst>
+                                            <p:cond delay="0"/>
+                                          </p:stCondLst>
+                                        </p:cTn>
+                                        <p:tgtEl>
+                                          <p:spTgt spid="3">
+                                            <p:txEl>
+                                              <p:pRg st="0" end="0"/>
+                                            </p:txEl>
+                                          </p:spTgt>
+                                        </p:tgtEl>
+                                        <p:attrNameLst>
+                                          <p:attrName>style.visibility</p:attrName>
+                                        </p:attrNameLst>
+                                      </p:cBhvr>
+                                      <p:to>
+                                        <p:strVal val="visible"/>
+                                      </p:to>
+                                    </p:set>
+                                  </p:childTnLst>
+                                </p:cTn>
+                              </p:par>
+                              <p:par>
+                                <p:cTn id="7" presetID="1" presetClass="entr" presetSubtype="0" fill="hold" grpId="0" nodeType="withEffect">
+                                  <p:stCondLst>
+                                    <p:cond delay="0"/>
+                                  </p:stCondLst>
+                                  <p:childTnLst>
+                                    <p:set>
+                                      <p:cBhvr>
+                                        <p:cTn id="8" dur="1" fill="hold">
+                                          <p:stCondLst>
+                                            <p:cond delay="0"/>
+                                          </p:stCondLst>
+                                        </p:cTn>
+                                        <p:tgtEl>
+                                          <p:spTgt spid="3">
+                                            <p:txEl>
+                                              <p:pRg st="1" end="1"/>
+                                            </p:txEl>
+                                          </p:spTgt>
+                                        </p:tgtEl>
+                                        <p:attrNameLst>
+                                          <p:attrName>style.visibility</p:attrName>
+                                        </p:attrNameLst>
+                                      </p:cBhvr>
+                                      <p:to>
+                                        <p:strVal val="visible"/>
+                                      </p:to>
+                                    </p:set>
+                                  </p:childTnLst>
+                                </p:cTn>
+                              </p:par>
+                              <p:par>
+                                <p:cTn id="9" presetID="1" presetClass="entr" presetSubtype="0" fill="hold" grpId="0" nodeType="withEffect">
+                                  <p:stCondLst>
+                                    <p:cond delay="0"/>
+                                  </p:stCondLst>
+                                  <p:childTnLst>
+                                    <p:set>
+                                      <p:cBhvr>
+                                        <p:cTn id="10" dur="1" fill="hold">
+                                          <p:stCondLst>
+                                            <p:cond delay="0"/>
+                                          </p:stCondLst>
+                                        </p:cTn>
+                                        <p:tgtEl>
+                                          <p:spTgt spid="3">
+                                            <p:txEl>
+                                              <p:pRg st="2" end="2"/>
+                                            </p:txEl>
+                                          </p:spTgt>
+                                        </p:tgtEl>
+                                        <p:attrNameLst>
+                                          <p:attrName>style.visibility</p:attrName>
+                                        </p:attrNameLst>
+                                      </p:cBhvr>
+                                      <p:to>
+                                        <p:strVal val="visible"/>
+                                      </p:to>
+                                    </p:set>
+                                  </p:childTnLst>
+                                </p:cTn>
+                              </p:par>
+                              <p:par>
+                                <p:cTn id="11" presetID="1" presetClass="entr" presetSubtype="0" fill="hold" grpId="0" nodeType="withEffect">
+                                  <p:stCondLst>
+                                    <p:cond delay="0"/>
+                                  </p:stCondLst>
+                                  <p:childTnLst>
+                                    <p:set>
+                                      <p:cBhvr>
+                                        <p:cTn id="12" dur="1" fill="hold">
+                                          <p:stCondLst>
+                                            <p:cond delay="0"/>
+                                          </p:stCondLst>
+                                        </p:cTn>
+                                        <p:tgtEl>
+                                          <p:spTgt spid="5"/>
+                                        </p:tgtEl>
+                                        <p:attrNameLst>
+                                          <p:attrName>style.visibility</p:attrName>
+                                        </p:attrNameLst>
+                                      </p:cBhvr>
+                                      <p:to>
+                                        <p:strVal val="visible"/>
+                                      </p:to>
+                                    </p:set>
+                                  </p:childTnLst>
+                                </p:cTn>
+                              </p:par>
+                              <p:par>
+                                <p:cTn id="13" presetID="1" presetClass="entr" presetSubtype="0" fill="hold" grpId="0" nodeType="withEffect">
+                                  <p:stCondLst>
+                                    <p:cond delay="0"/>
+                                  </p:stCondLst>
+                                  <p:childTnLst>
+                                    <p:set>
+                                      <p:cBhvr>
+                                        <p:cTn id="14" dur="1" fill="hold">
+                                          <p:stCondLst>
+                                            <p:cond delay="0"/>
+                                          </p:stCondLst>
+                                        </p:cTn>
+                                        <p:tgtEl>
+                                          <p:spTgt spid="8"/>
+                                        </p:tgtEl>
+                                        <p:attrNameLst>
+                                          <p:attrName>style.visibility</p:attrName>
+                                        </p:attrNameLst>
+                                      </p:cBhvr>
+                                      <p:to>
+                                        <p:strVal val="visible"/>
+                                      </p:to>
+                                    </p:set>
+                                  </p:childTnLst>
+                                </p:cTn>
+                              </p:par>
+                              <p:par>
+                                <p:cTn id="15" presetID="1" presetClass="entr" presetSubtype="0" fill="hold" grpId="0" nodeType="withEffect">
+                                  <p:stCondLst>
+                                    <p:cond delay="0"/>
+                                  </p:stCondLst>
+                                  <p:childTnLst>
+                                    <p:set>
+                                      <p:cBhvr>
+                                        <p:cTn id="16" dur="1" fill="hold">
+                                          <p:stCondLst>
+                                            <p:cond delay="0"/>
+                                          </p:stCondLst>
+                                        </p:cTn>
+                                        <p:tgtEl>
+                                          <p:spTgt spid="9"/>
+                                        </p:tgtEl>
+                                        <p:attrNameLst>
+                                          <p:attrName>style.visibility</p:attrName>
+                                        </p:attrNameLst>
+                                      </p:cBhvr>
+                                      <p:to>
+                                        <p:strVal val="visible"/>
+                                      </p:to>
+                                    </p:set>
+                                  </p:childTnLst>
+                                </p:cTn>
+                              </p:par>
+                              <p:par>
+                                <p:cTn id="17" presetID="1" presetClass="entr" presetSubtype="0" fill="hold" grpId="0" nodeType="withEffect">
+                                  <p:stCondLst>
+                                    <p:cond delay="0"/>
+                                  </p:stCondLst>
+                                  <p:childTnLst>
+                                    <p:set>
+                                      <p:cBhvr>
+                                        <p:cTn id="18" dur="1" fill="hold">
+                                          <p:stCondLst>
+                                            <p:cond delay="0"/>
+                                          </p:stCondLst>
+                                        </p:cTn>
+                                        <p:tgtEl>
+                                          <p:spTgt spid="11"/>
+                                        </p:tgtEl>
+                                        <p:attrNameLst>
+                                          <p:attrName>style.visibility</p:attrName>
+                                        </p:attrNameLst>
+                                      </p:cBhvr>
+                                      <p:to>
+                                        <p:strVal val="visible"/>
+                                      </p:to>
+                                    </p:set>
+                                  </p:childTnLst>
+                                </p:cTn>
+                              </p:par>
+                            </p:childTnLst>
+                          </p:cTn>
+                        </p:par>
+                      </p:childTnLst>
+                    </p:cTn>
+                  </p:par>
+                  <p:par>
+                    <p:cTn id="19" fill="hold">
+                      <p:stCondLst>
+                        <p:cond delay="indefinite"/>
+                      </p:stCondLst>
+                      <p:childTnLst>
+                        <p:par>
+                          <p:cTn id="20" fill="hold">
+                            <p:stCondLst>
+                              <p:cond delay="0"/>
+                            </p:stCondLst>
+                            <p:childTnLst>
+                              <p:par>
+                                <p:cTn id="21" presetID="1" presetClass="entr" presetSubtype="0" fill="hold" grpId="0" nodeType="clickEffect">
+                                  <p:stCondLst>
+                                    <p:cond delay="0"/>
+                                  </p:stCondLst>
+                                  <p:childTnLst>
+                                    <p:set>
+                                      <p:cBhvr>
+                                        <p:cTn id="22" dur="1" fill="hold">
+                                          <p:stCondLst>
+                                            <p:cond delay="0"/>
+                                          </p:stCondLst>
+                                        </p:cTn>
+                                        <p:tgtEl>
+                                          <p:spTgt spid="12">
+                                            <p:txEl>
+                                              <p:pRg st="0" end="0"/>
+                                            </p:txEl>
+                                          </p:spTgt>
+                                        </p:tgtEl>
+                                        <p:attrNameLst>
+                                          <p:attrName>style.visibility</p:attrName>
+                                        </p:attrNameLst>
+                                      </p:cBhvr>
+                                      <p:to>
+                                        <p:strVal val="visible"/>
+                                      </p:to>
+                                    </p:set>
+                                  </p:childTnLst>
+                                </p:cTn>
+                              </p:par>
+                            </p:childTnLst>
+                          </p:cTn>
+                        </p:par>
+                      </p:childTnLst>
+                    </p:cTn>
+                  </p:par>
+                  <p:par>
+                    <p:cTn id="23" fill="hold">
+                      <p:stCondLst>
+                        <p:cond delay="indefinite"/>
+                      </p:stCondLst>
+                      <p:childTnLst>
+                        <p:par>
+                          <p:cTn id="24" fill="hold">
+                            <p:stCondLst>
+                              <p:cond delay="0"/>
+                            </p:stCondLst>
+                            <p:childTnLst>
+                              <p:par>
+                                <p:cTn id="25" presetID="1" presetClass="entr" presetSubtype="0" fill="hold" grpId="0" nodeType="clickEffect">
+                                  <p:stCondLst>
+                                    <p:cond delay="0"/>
+                                  </p:stCondLst>
+                                  <p:childTnLst>
+                                    <p:set>
+                                      <p:cBhvr>
+                                        <p:cTn id="26" dur="1" fill="hold">
+                                          <p:stCondLst>
+                                            <p:cond delay="0"/>
+                                          </p:stCondLst>
+                                        </p:cTn>
+                                        <p:tgtEl>
+                                          <p:spTgt spid="12">
+                                            <p:txEl>
+                                              <p:pRg st="1" end="1"/>
+                                            </p:txEl>
+                                          </p:spTgt>
+                                        </p:tgtEl>
+                                        <p:attrNameLst>
+                                          <p:attrName>style.visibility</p:attrName>
+                                        </p:attrNameLst>
+                                      </p:cBhvr>
+                                      <p:to>
+                                        <p:strVal val="visible"/>
+                                      </p:to>
+                                    </p:set>
+                                  </p:childTnLst>
+                                </p:cTn>
+                              </p:par>
+                            </p:childTnLst>
+                          </p:cTn>
+                        </p:par>
+                      </p:childTnLst>
+                    </p:cTn>
+                  </p:par>
+                  <p:par>
+                    <p:cTn id="27" fill="hold">
+                      <p:stCondLst>
+                        <p:cond delay="indefinite"/>
+                      </p:stCondLst>
+                      <p:childTnLst>
+                        <p:par>
+                          <p:cTn id="28" fill="hold">
+                            <p:stCondLst>
+                              <p:cond delay="0"/>
+                            </p:stCondLst>
+                            <p:childTnLst>
+                              <p:par>
+                                <p:cTn id="29" presetID="1" presetClass="entr" presetSubtype="0" fill="hold" grpId="0" nodeType="clickEffect">
+                                  <p:stCondLst>
+                                    <p:cond delay="0"/>
+                                  </p:stCondLst>
+                                  <p:childTnLst>
+                                    <p:set>
+                                      <p:cBhvr>
+                                        <p:cTn id="30" dur="1" fill="hold">
+                                          <p:stCondLst>
+                                            <p:cond delay="0"/>
+                                          </p:stCondLst>
+                                        </p:cTn>
+                                        <p:tgtEl>
+                                          <p:spTgt spid="12">
+                                            <p:txEl>
+                                              <p:pRg st="2" end="2"/>
+                                            </p:txEl>
+                                          </p:spTgt>
+                                        </p:tgtEl>
+                                        <p:attrNameLst>
+                                          <p:attrName>style.visibility</p:attrName>
+                                        </p:attrNameLst>
+                                      </p:cBhvr>
+                                      <p:to>
+                                        <p:strVal val="visible"/>
+                                      </p:to>
+                                    </p:set>
+                                  </p:childTnLst>
+                                </p:cTn>
+                              </p:par>
+                            </p:childTnLst>
+                          </p:cTn>
+                        </p:par>
+                      </p:childTnLst>
+                    </p:cTn>
+                  </p:par>
+                  <p:par>
+                    <p:cTn id="31" fill="hold">
+                      <p:stCondLst>
+                        <p:cond delay="indefinite"/>
+                      </p:stCondLst>
+                      <p:childTnLst>
+                        <p:par>
+                          <p:cTn id="32" fill="hold">
+                            <p:stCondLst>
+                              <p:cond delay="0"/>
+                            </p:stCondLst>
+                            <p:childTnLst>
+                              <p:par>
+                                <p:cTn id="33" presetID="1" presetClass="entr" presetSubtype="0" fill="hold" grpId="1" nodeType="clickEffect">
+                                  <p:stCondLst>
+                                    <p:cond delay="0"/>
+                                  </p:stCondLst>
+                                  <p:childTnLst>
+                                    <p:set>
+                                      <p:cBhvr>
+                                        <p:cTn id="34" dur="1" fill="hold">
+                                          <p:stCondLst>
+                                            <p:cond delay="0"/>
+                                          </p:stCondLst>
+                                        </p:cTn>
+                                        <p:tgtEl>
+                                          <p:spTgt spid="12">
+                                            <p:txEl>
+                                              <p:pRg st="0" end="0"/>
+                                            </p:txEl>
+                                          </p:spTgt>
+                                        </p:tgtEl>
+                                        <p:attrNameLst>
+                                          <p:attrName>style.visibility</p:attrName>
+                                        </p:attrNameLst>
+                                      </p:cBhvr>
+                                      <p:to>
+                                        <p:strVal val="visible"/>
+                                      </p:to>
+                                    </p:set>
+                                  </p:childTnLst>
+                                </p:cTn>
+                              </p:par>
+                              <p:par>
+                                <p:cTn id="35" presetID="1" presetClass="entr" presetSubtype="0" fill="hold" grpId="1" nodeType="withEffect">
+                                  <p:stCondLst>
+                                    <p:cond delay="0"/>
+                                  </p:stCondLst>
+                                  <p:childTnLst>
+                                    <p:set>
+                                      <p:cBhvr>
+                                        <p:cTn id="36" dur="1" fill="hold">
+                                          <p:stCondLst>
+                                            <p:cond delay="0"/>
+                                          </p:stCondLst>
+                                        </p:cTn>
+                                        <p:tgtEl>
+                                          <p:spTgt spid="12">
+                                            <p:txEl>
+                                              <p:pRg st="1" end="1"/>
+                                            </p:txEl>
+                                          </p:spTgt>
+                                        </p:tgtEl>
+                                        <p:attrNameLst>
+                                          <p:attrName>style.visibility</p:attrName>
+                                        </p:attrNameLst>
+                                      </p:cBhvr>
+                                      <p:to>
+                                        <p:strVal val="visible"/>
+                                      </p:to>
+                                    </p:set>
+                                  </p:childTnLst>
+                                </p:cTn>
+                              </p:par>
+                              <p:par>
+                                <p:cTn id="37" presetID="1" presetClass="entr" presetSubtype="0" fill="hold" grpId="1" nodeType="withEffect">
+                                  <p:stCondLst>
+                                    <p:cond delay="0"/>
+                                  </p:stCondLst>
+                                  <p:childTnLst>
+                                    <p:set>
+                                      <p:cBhvr>
+                                        <p:cTn id="38" dur="1" fill="hold">
+                                          <p:stCondLst>
+                                            <p:cond delay="0"/>
+                                          </p:stCondLst>
+                                        </p:cTn>
+                                        <p:tgtEl>
+                                          <p:spTgt spid="12">
+                                            <p:txEl>
+                                              <p:pRg st="2" end="2"/>
+                                            </p:txEl>
+                                          </p:spTgt>
+                                        </p:tgtEl>
+                                        <p:attrNameLst>
+                                          <p:attrName>style.visibility</p:attrName>
+                                        </p:attrNameLst>
+                                      </p:cBhvr>
+                                      <p:to>
+                                        <p:strVal val="visible"/>
+                                      </p:to>
+                                    </p:set>
+                                  </p:childTnLst>
+                                </p:cTn>
+                              </p:par>
+                              <p:par>
+                                <p:cTn id="39" presetID="1" presetClass="entr" presetSubtype="0" fill="hold" nodeType="withEffect">
+                                  <p:stCondLst>
+                                    <p:cond delay="0"/>
+                                  </p:stCondLst>
+                                  <p:childTnLst>
+                                    <p:set>
+                                      <p:cBhvr>
+                                        <p:cTn id="40" dur="1" fill="hold">
+                                          <p:stCondLst>
+                                            <p:cond delay="0"/>
+                                          </p:stCondLst>
+                                        </p:cTn>
+                                        <p:tgtEl>
+                                          <p:spTgt spid="13"/>
+                                        </p:tgtEl>
+                                        <p:attrNameLst>
+                                          <p:attrName>style.visibility</p:attrName>
+                                        </p:attrNameLst>
+                                      </p:cBhvr>
+                                      <p:to>
+                                        <p:strVal val="visible"/>
+                                      </p:to>
+                                    </p:set>
+                                  </p:childTnLst>
+                                </p:cTn>
+                              </p:par>
+                              <p:par>
+                                <p:cTn id="41" presetID="1" presetClass="entr" presetSubtype="0" fill="hold" grpId="0" nodeType="withEffect">
+                                  <p:stCondLst>
+                                    <p:cond delay="0"/>
+                                  </p:stCondLst>
+                                  <p:childTnLst>
+                                    <p:set>
+                                      <p:cBhvr>
+                                        <p:cTn id="42" dur="1" fill="hold">
+                                          <p:stCondLst>
+                                            <p:cond delay="0"/>
+                                          </p:stCondLst>
+                                        </p:cTn>
+                                        <p:tgtEl>
+                                          <p:spTgt spid="16"/>
+                                        </p:tgtEl>
+                                        <p:attrNameLst>
+                                          <p:attrName>style.visibility</p:attrName>
+                                        </p:attrNameLst>
+                                      </p:cBhvr>
+                                      <p:to>
+                                        <p:strVal val="visible"/>
+                                      </p:to>
+                                    </p:set>
+                                  </p:childTnLst>
+                                </p:cTn>
+                              </p:par>
+                            </p:childTnLst>
+                          </p:cTn>
+                        </p:par>
+                      </p:childTnLst>
+                    </p:cTn>
+                  </p:par>
+                  <p:par>
+                    <p:cTn id="43" fill="hold">
+                      <p:stCondLst>
+                        <p:cond delay="indefinite"/>
+                      </p:stCondLst>
+                      <p:childTnLst>
+                        <p:par>
+                          <p:cTn id="44" fill="hold">
+                            <p:stCondLst>
+                              <p:cond delay="0"/>
+                            </p:stCondLst>
+                            <p:childTnLst>
+                              <p:par>
+                                <p:cTn id="45" presetID="1" presetClass="entr" presetSubtype="0" fill="hold" grpId="0" nodeType="clickEffect">
+                                  <p:stCondLst>
+                                    <p:cond delay="0"/>
+                                  </p:stCondLst>
+                                  <p:childTnLst>
+                                    <p:set>
+                                      <p:cBhvr>
+                                        <p:cTn id="46" dur="1" fill="hold">
+                                          <p:stCondLst>
+                                            <p:cond delay="0"/>
+                                          </p:stCondLst>
+                                        </p:cTn>
+                                        <p:tgtEl>
+                                          <p:spTgt spid="15">
+                                            <p:txEl>
+                                              <p:pRg st="0" end="0"/>
+                                            </p:txEl>
+                                          </p:spTgt>
+                                        </p:tgtEl>
+                                        <p:attrNameLst>
+                                          <p:attrName>style.visibility</p:attrName>
+                                        </p:attrNameLst>
+                                      </p:cBhvr>
+                                      <p:to>
+                                        <p:strVal val="visible"/>
+                                      </p:to>
+                                    </p:set>
+                                  </p:childTnLst>
+                                </p:cTn>
+                              </p:par>
+                            </p:childTnLst>
+                          </p:cTn>
+                        </p:par>
+                      </p:childTnLst>
+                    </p:cTn>
+                  </p:par>
+                  <p:par>
+                    <p:cTn id="47" fill="hold">
+                      <p:stCondLst>
+                        <p:cond delay="indefinite"/>
+                      </p:stCondLst>
+                      <p:childTnLst>
+                        <p:par>
+                          <p:cTn id="48" fill="hold">
+                            <p:stCondLst>
+                              <p:cond delay="0"/>
+                            </p:stCondLst>
+                            <p:childTnLst>
+                              <p:par>
+                                <p:cTn id="49" presetID="1" presetClass="entr" presetSubtype="0" fill="hold" grpId="0" nodeType="clickEffect">
+                                  <p:stCondLst>
+                                    <p:cond delay="0"/>
+                                  </p:stCondLst>
+                                  <p:childTnLst>
+                                    <p:set>
+                                      <p:cBhvr>
+                                        <p:cTn id="50" dur="1" fill="hold">
+                                          <p:stCondLst>
+                                            <p:cond delay="0"/>
+                                          </p:stCondLst>
+                                        </p:cTn>
+                                        <p:tgtEl>
+                                          <p:spTgt spid="15">
+                                            <p:txEl>
+                                              <p:pRg st="1" end="1"/>
+                                            </p:txEl>
+                                          </p:spTgt>
+                                        </p:tgtEl>
+                                        <p:attrNameLst>
+                                          <p:attrName>style.visibility</p:attrName>
+                                        </p:attrNameLst>
+                                      </p:cBhvr>
+                                      <p:to>
+                                        <p:strVal val="visible"/>
+                                      </p:to>
+                                    </p:set>
+                                  </p:childTnLst>
+                                </p:cTn>
+                              </p:par>
+                            </p:childTnLst>
+                          </p:cTn>
+                        </p:par>
+                      </p:childTnLst>
+                    </p:cTn>
+                  </p:par>
+                  <p:par>
+                    <p:cTn id="51" fill="hold">
+                      <p:stCondLst>
+                        <p:cond delay="indefinite"/>
+                      </p:stCondLst>
+                      <p:childTnLst>
+                        <p:par>
+                          <p:cTn id="52" fill="hold">
+                            <p:stCondLst>
+                              <p:cond delay="0"/>
+                            </p:stCondLst>
+                            <p:childTnLst>
+                              <p:par>
+                                <p:cTn id="53" presetID="1" presetClass="entr" presetSubtype="0" fill="hold" grpId="0" nodeType="clickEffect">
+                                  <p:stCondLst>
+                                    <p:cond delay="0"/>
+                                  </p:stCondLst>
+                                  <p:childTnLst>
+                                    <p:set>
+                                      <p:cBhvr>
+                                        <p:cTn id="54" dur="1" fill="hold">
+                                          <p:stCondLst>
+                                            <p:cond delay="0"/>
+                                          </p:stCondLst>
+                                        </p:cTn>
+                                        <p:tgtEl>
+                                          <p:spTgt spid="15">
+                                            <p:txEl>
+                                              <p:pRg st="2" end="2"/>
+                                            </p:txEl>
+                                          </p:spTgt>
+                                        </p:tgtEl>
+                                        <p:attrNameLst>
+                                          <p:attrName>style.visibility</p:attrName>
+                                        </p:attrNameLst>
+                                      </p:cBhvr>
+                                      <p:to>
+                                        <p:strVal val="visible"/>
+                                      </p:to>
+                                    </p:set>
+                                  </p:childTnLst>
+                                </p:cTn>
+                              </p:par>
+                            </p:childTnLst>
+                          </p:cTn>
+                        </p:par>
+                      </p:childTnLst>
+                    </p:cTn>
+                  </p:par>
+                  <p:par>
+                    <p:cTn id="55" fill="hold">
+                      <p:stCondLst>
+                        <p:cond delay="indefinite"/>
+                      </p:stCondLst>
+                      <p:childTnLst>
+                        <p:par>
+                          <p:cTn id="56" fill="hold">
+                            <p:stCondLst>
+                              <p:cond delay="0"/>
+                            </p:stCondLst>
+                            <p:childTnLst>
+                              <p:par>
+                                <p:cTn id="57" presetID="1" presetClass="entr" presetSubtype="0" fill="hold" nodeType="clickEffect">
+                                  <p:stCondLst>
+                                    <p:cond delay="0"/>
+                                  </p:stCondLst>
+                                  <p:childTnLst>
+                                    <p:set>
+                                      <p:cBhvr>
+                                        <p:cTn id="58" dur="1" fill="hold">
+                                          <p:stCondLst>
+                                            <p:cond delay="0"/>
+                                          </p:stCondLst>
+                                        </p:cTn>
+                                        <p:tgtEl>
+                                          <p:spTgt spid="17"/>
+                                        </p:tgtEl>
+                                        <p:attrNameLst>
+                                          <p:attrName>style.visibility</p:attrName>
+                                        </p:attrNameLst>
+                                      </p:cBhvr>
+                                      <p:to>
+                                        <p:strVal val="visible"/>
+                                      </p:to>
+                                    </p:set>
+                                  </p:childTnLst>
+                                </p:cTn>
+                              </p:par>
+                              <p:par>
+                                <p:cTn id="59" presetID="1" presetClass="entr" presetSubtype="0" fill="hold" grpId="0" nodeType="withEffect">
+                                  <p:stCondLst>
+                                    <p:cond delay="0"/>
+                                  </p:stCondLst>
+                                  <p:childTnLst>
+                                    <p:set>
+                                      <p:cBhvr>
+                                        <p:cTn id="60" dur="1" fill="hold">
+                                          <p:stCondLst>
+                                            <p:cond delay="0"/>
+                                          </p:stCondLst>
+                                        </p:cTn>
+                                        <p:tgtEl>
+                                          <p:spTgt spid="10"/>
+                                        </p:tgtEl>
+                                        <p:attrNameLst>
+                                          <p:attrName>style.visibility</p:attrName>
+                                        </p:attrNameLst>
+                                      </p:cBhvr>
+                                      <p:to>
+                                        <p:strVal val="visible"/>
+                                      </p:to>
+                                    </p:set>
+                                  </p:childTnLst>
+                                </p:cTn>
+                              </p:par>
+                            </p:childTnLst>
+                          </p:cTn>
+                        </p:par>
+                      </p:childTnLst>
+                    </p:cTn>
+                  </p:par>
+                  <p:par>
+                    <p:cTn id="61" fill="hold">
+                      <p:stCondLst>
+                        <p:cond delay="indefinite"/>
+                      </p:stCondLst>
+                      <p:childTnLst>
+                        <p:par>
+                          <p:cTn id="62" fill="hold">
+                            <p:stCondLst>
+                              <p:cond delay="0"/>
+                            </p:stCondLst>
+                            <p:childTnLst>
+                              <p:par>
+                                <p:cTn id="63" presetID="1" presetClass="entr" presetSubtype="0" fill="hold" grpId="0" nodeType="clickEffect">
+                                  <p:stCondLst>
+                                    <p:cond delay="0"/>
+                                  </p:stCondLst>
+                                  <p:childTnLst>
+                                    <p:set>
+                                      <p:cBhvr>
+                                        <p:cTn id="64" dur="1" fill="hold">
+                                          <p:stCondLst>
+                                            <p:cond delay="0"/>
+                                          </p:stCondLst>
+                                        </p:cTn>
+                                        <p:tgtEl>
+                                          <p:spTgt spid="20">
+                                            <p:txEl>
+                                              <p:pRg st="0" end="0"/>
+                                            </p:txEl>
+                                          </p:spTgt>
+                                        </p:tgtEl>
+                                        <p:attrNameLst>
+                                          <p:attrName>style.visibility</p:attrName>
+                                        </p:attrNameLst>
+                                      </p:cBhvr>
+                                      <p:to>
+                                        <p:strVal val="visible"/>
+                                      </p:to>
+                                    </p:set>
+                                  </p:childTnLst>
+                                </p:cTn>
+                              </p:par>
+                            </p:childTnLst>
+                          </p:cTn>
+                        </p:par>
+                      </p:childTnLst>
+                    </p:cTn>
+                  </p:par>
+                  <p:par>
+                    <p:cTn id="65" fill="hold">
+                      <p:stCondLst>
+                        <p:cond delay="indefinite"/>
+                      </p:stCondLst>
+                      <p:childTnLst>
+                        <p:par>
+                          <p:cTn id="66" fill="hold">
+                            <p:stCondLst>
+                              <p:cond delay="0"/>
+                            </p:stCondLst>
+                            <p:childTnLst>
+                              <p:par>
+                                <p:cTn id="67" presetID="1" presetClass="entr" presetSubtype="0" fill="hold" grpId="0" nodeType="clickEffect">
+                                  <p:stCondLst>
+                                    <p:cond delay="0"/>
+                                  </p:stCondLst>
+                                  <p:childTnLst>
+                                    <p:set>
+                                      <p:cBhvr>
+                                        <p:cTn id="68" dur="1" fill="hold">
+                                          <p:stCondLst>
+                                            <p:cond delay="0"/>
+                                          </p:stCondLst>
+                                        </p:cTn>
+                                        <p:tgtEl>
+                                          <p:spTgt spid="20">
+                                            <p:txEl>
+                                              <p:pRg st="1" end="1"/>
+                                            </p:txEl>
+                                          </p:spTgt>
+                                        </p:tgtEl>
+                                        <p:attrNameLst>
+                                          <p:attrName>style.visibility</p:attrName>
+                                        </p:attrNameLst>
+                                      </p:cBhvr>
+                                      <p:to>
+                                        <p:strVal val="visible"/>
+                                      </p:to>
+                                    </p:set>
+                                  </p:childTnLst>
+                                </p:cTn>
+                              </p:par>
+                            </p:childTnLst>
+                          </p:cTn>
+                        </p:par>
+                      </p:childTnLst>
+                    </p:cTn>
+                  </p:par>
+                </p:childTnLst>
+              </p:cTn>
+              <p:prevCondLst>
+                <p:cond evt="onPrev" delay="0">
+                  <p:tgtEl>
+                    <p:sldTgt/>
+                  </p:tgtEl>
+                </p:cond>
+              </p:prevCondLst>
+              <p:nextCondLst>
+                <p:cond evt="onNext" delay="0">
+                  <p:tgtEl>
+                    <p:sldTgt/>
+                  </p:tgtEl>
+                </p:cond>
+              </p:nextCondLst>
+            </p:seq>
+          </p:childTnLst>
+        </p:cTn>
+      </p:par>
+    </p:tnLst>
+    <p:bldLst>
+      <p:bldP spid="3" grpId="0" build="p"/>
+      <p:bldP spid="5" grpId="0"/>
+      <p:bldP spid="8" grpId="0"/>
+      <p:bldP spid="9" grpId="0" animBg="1"/>
+      <p:bldP spid="10" grpId="0" animBg="1"/>
+      <p:bldP spid="11" grpId="0" animBg="1"/>
+      <p:bldP spid="12" grpId="0" build="p"/>
+      <p:bldP spid="12" grpId="1" build="allAtOnce"/>
+      <p:bldP spid="15" grpId="0" uiExpand="1" build="p"/>
+      <p:bldP spid="16" grpId="0" animBg="1"/>
+      <p:bldP spid="20" grpId="0" uiExpand="1" build="p"/>
+    </p:bldLst>
+  </p:timing>
+</p:sld>
+</file>
+
+<file path=ppt/slides/slide8.xml><?xml version="1.0" encoding="utf-8"?>
+<p:sld xmlns:a="http://schemas.openxmlformats.org/drawingml/2006/main" xmlns:r="http://schemas.openxmlformats.org/officeDocument/2006/relationships" xmlns:p="http://schemas.openxmlformats.org/presentationml/2006/main">
+  <p:cSld>
+    <p:spTree>
+      <p:nvGrpSpPr>
+        <p:cNvPr id="1" name=""/>
+        <p:cNvGrpSpPr/>
+        <p:nvPr/>
+      </p:nvGrpSpPr>
+      <p:grpSpPr>
+        <a:xfrm>
+          <a:off x="0" y="0"/>
+          <a:ext cx="0" cy="0"/>
+          <a:chOff x="0" y="0"/>
+          <a:chExt cx="0" cy="0"/>
+        </a:xfrm>
+      </p:grpSpPr>
+      <p:sp>
+        <p:nvSpPr>
+          <p:cNvPr id="2" name="Title 1">
+            <a:extLst>
+              <a:ext uri="{FF2B5EF4-FFF2-40B4-BE49-F238E27FC236}">
                 <a16:creationId xmlns:a16="http://schemas.microsoft.com/office/drawing/2014/main" id="{B52546B5-2005-5847-BB54-FA24B28BBD44}"/>
               </a:ext>
             </a:extLst>
@@ -9216,614 +12409,6 @@
 </p:sld>
 </file>
 
-<file path=ppt/slides/slide8.xml><?xml version="1.0" encoding="utf-8"?>
-<p:sld xmlns:a="http://schemas.openxmlformats.org/drawingml/2006/main" xmlns:r="http://schemas.openxmlformats.org/officeDocument/2006/relationships" xmlns:p="http://schemas.openxmlformats.org/presentationml/2006/main">
-  <p:cSld>
-    <p:spTree>
-      <p:nvGrpSpPr>
-        <p:cNvPr id="1" name=""/>
-        <p:cNvGrpSpPr/>
-        <p:nvPr/>
-      </p:nvGrpSpPr>
-      <p:grpSpPr>
-        <a:xfrm>
-          <a:off x="0" y="0"/>
-          <a:ext cx="0" cy="0"/>
-          <a:chOff x="0" y="0"/>
-          <a:chExt cx="0" cy="0"/>
-        </a:xfrm>
-      </p:grpSpPr>
-      <p:sp>
-        <p:nvSpPr>
-          <p:cNvPr id="2" name="Title 1">
-            <a:extLst>
-              <a:ext uri="{FF2B5EF4-FFF2-40B4-BE49-F238E27FC236}">
-                <a16:creationId xmlns:a16="http://schemas.microsoft.com/office/drawing/2014/main" id="{380B640B-36BF-3C4B-916C-AC584F6601AF}"/>
-              </a:ext>
-            </a:extLst>
-          </p:cNvPr>
-          <p:cNvSpPr>
-            <a:spLocks noGrp="1"/>
-          </p:cNvSpPr>
-          <p:nvPr>
-            <p:ph type="title"/>
-          </p:nvPr>
-        </p:nvSpPr>
-        <p:spPr/>
-        <p:txBody>
-          <a:bodyPr/>
-          <a:lstStyle/>
-          <a:p>
-            <a:r>
-              <a:rPr lang="en-US" dirty="0"/>
-              <a:t>Activity</a:t>
-            </a:r>
-          </a:p>
-        </p:txBody>
-      </p:sp>
-      <p:sp>
-        <p:nvSpPr>
-          <p:cNvPr id="3" name="Text Placeholder 2">
-            <a:extLst>
-              <a:ext uri="{FF2B5EF4-FFF2-40B4-BE49-F238E27FC236}">
-                <a16:creationId xmlns:a16="http://schemas.microsoft.com/office/drawing/2014/main" id="{52466651-B913-2643-95EC-1F7359A4277D}"/>
-              </a:ext>
-            </a:extLst>
-          </p:cNvPr>
-          <p:cNvSpPr>
-            <a:spLocks noGrp="1"/>
-          </p:cNvSpPr>
-          <p:nvPr>
-            <p:ph type="body" sz="quarter" idx="10"/>
-          </p:nvPr>
-        </p:nvSpPr>
-        <p:spPr>
-          <a:xfrm>
-            <a:off x="628075" y="1776683"/>
-            <a:ext cx="12561453" cy="494879"/>
-          </a:xfrm>
-        </p:spPr>
-        <p:txBody>
-          <a:bodyPr/>
-          <a:lstStyle/>
-          <a:p>
-            <a:r>
-              <a:rPr lang="en-US" dirty="0"/>
-              <a:t>Write the following as a </a:t>
-            </a:r>
-            <a:r>
-              <a:rPr lang="en-US" b="1" dirty="0"/>
-              <a:t>for</a:t>
-            </a:r>
-            <a:r>
-              <a:rPr lang="en-US" dirty="0"/>
-              <a:t> loop</a:t>
-            </a:r>
-          </a:p>
-        </p:txBody>
-      </p:sp>
-      <p:sp>
-        <p:nvSpPr>
-          <p:cNvPr id="5" name="TextBox 4">
-            <a:extLst>
-              <a:ext uri="{FF2B5EF4-FFF2-40B4-BE49-F238E27FC236}">
-                <a16:creationId xmlns:a16="http://schemas.microsoft.com/office/drawing/2014/main" id="{7043FF54-5C91-2B42-8FCC-7C6355334681}"/>
-              </a:ext>
-            </a:extLst>
-          </p:cNvPr>
-          <p:cNvSpPr txBox="1"/>
-          <p:nvPr/>
-        </p:nvSpPr>
-        <p:spPr>
-          <a:xfrm>
-            <a:off x="3454400" y="2611750"/>
-            <a:ext cx="6908800" cy="2554545"/>
-          </a:xfrm>
-          <a:prstGeom prst="rect">
-            <a:avLst/>
-          </a:prstGeom>
-          <a:noFill/>
-        </p:spPr>
-        <p:txBody>
-          <a:bodyPr wrap="square">
-            <a:spAutoFit/>
-          </a:bodyPr>
-          <a:lstStyle/>
-          <a:p>
-            <a:r>
-              <a:rPr lang="en-US" dirty="0">
-                <a:solidFill>
-                  <a:srgbClr val="CC7832"/>
-                </a:solidFill>
-                <a:effectLst/>
-                <a:latin typeface="Consolas" panose="020B0609020204030204" pitchFamily="49" charset="0"/>
-                <a:cs typeface="Consolas" panose="020B0609020204030204" pitchFamily="49" charset="0"/>
-              </a:rPr>
-              <a:t>public static void </a:t>
-            </a:r>
-            <a:r>
-              <a:rPr lang="en-US" dirty="0" err="1">
-                <a:solidFill>
-                  <a:srgbClr val="FFC66D"/>
-                </a:solidFill>
-                <a:effectLst/>
-                <a:latin typeface="Consolas" panose="020B0609020204030204" pitchFamily="49" charset="0"/>
-                <a:cs typeface="Consolas" panose="020B0609020204030204" pitchFamily="49" charset="0"/>
-              </a:rPr>
-              <a:t>simpleLoop</a:t>
-            </a:r>
-            <a:r>
-              <a:rPr lang="en-US" dirty="0">
-                <a:latin typeface="Consolas" panose="020B0609020204030204" pitchFamily="49" charset="0"/>
-                <a:cs typeface="Consolas" panose="020B0609020204030204" pitchFamily="49" charset="0"/>
-              </a:rPr>
-              <a:t>(</a:t>
-            </a:r>
-            <a:r>
-              <a:rPr lang="en-US" dirty="0">
-                <a:solidFill>
-                  <a:srgbClr val="CC7832"/>
-                </a:solidFill>
-                <a:effectLst/>
-                <a:latin typeface="Consolas" panose="020B0609020204030204" pitchFamily="49" charset="0"/>
-                <a:cs typeface="Consolas" panose="020B0609020204030204" pitchFamily="49" charset="0"/>
-              </a:rPr>
-              <a:t>int </a:t>
-            </a:r>
-            <a:r>
-              <a:rPr lang="en-US" i="1" dirty="0">
-                <a:solidFill>
-                  <a:srgbClr val="9876AA"/>
-                </a:solidFill>
-                <a:effectLst/>
-                <a:latin typeface="Consolas" panose="020B0609020204030204" pitchFamily="49" charset="0"/>
-                <a:cs typeface="Consolas" panose="020B0609020204030204" pitchFamily="49" charset="0"/>
-              </a:rPr>
-              <a:t>total</a:t>
-            </a:r>
-            <a:r>
-              <a:rPr lang="en-US" dirty="0">
-                <a:latin typeface="Consolas" panose="020B0609020204030204" pitchFamily="49" charset="0"/>
-                <a:cs typeface="Consolas" panose="020B0609020204030204" pitchFamily="49" charset="0"/>
-              </a:rPr>
-              <a:t>) {</a:t>
-            </a:r>
-            <a:br>
-              <a:rPr lang="en-US" dirty="0">
-                <a:latin typeface="Consolas" panose="020B0609020204030204" pitchFamily="49" charset="0"/>
-                <a:cs typeface="Consolas" panose="020B0609020204030204" pitchFamily="49" charset="0"/>
-              </a:rPr>
-            </a:br>
-            <a:r>
-              <a:rPr lang="en-US" dirty="0">
-                <a:latin typeface="Consolas" panose="020B0609020204030204" pitchFamily="49" charset="0"/>
-                <a:cs typeface="Consolas" panose="020B0609020204030204" pitchFamily="49" charset="0"/>
-              </a:rPr>
-              <a:t/>
-            </a:r>
-            <a:br>
-              <a:rPr lang="en-US" dirty="0">
-                <a:latin typeface="Consolas" panose="020B0609020204030204" pitchFamily="49" charset="0"/>
-                <a:cs typeface="Consolas" panose="020B0609020204030204" pitchFamily="49" charset="0"/>
-              </a:rPr>
-            </a:br>
-            <a:r>
-              <a:rPr lang="en-US" dirty="0">
-                <a:latin typeface="Consolas" panose="020B0609020204030204" pitchFamily="49" charset="0"/>
-                <a:cs typeface="Consolas" panose="020B0609020204030204" pitchFamily="49" charset="0"/>
-              </a:rPr>
-              <a:t>    </a:t>
-            </a:r>
-            <a:r>
-              <a:rPr lang="en-US" dirty="0">
-                <a:solidFill>
-                  <a:srgbClr val="CC7832"/>
-                </a:solidFill>
-                <a:effectLst/>
-                <a:latin typeface="Consolas" panose="020B0609020204030204" pitchFamily="49" charset="0"/>
-                <a:cs typeface="Consolas" panose="020B0609020204030204" pitchFamily="49" charset="0"/>
-              </a:rPr>
-              <a:t>int </a:t>
-            </a:r>
-            <a:r>
-              <a:rPr lang="en-US" i="1" dirty="0" err="1">
-                <a:solidFill>
-                  <a:srgbClr val="9876AA"/>
-                </a:solidFill>
-                <a:effectLst/>
-                <a:latin typeface="Consolas" panose="020B0609020204030204" pitchFamily="49" charset="0"/>
-                <a:cs typeface="Consolas" panose="020B0609020204030204" pitchFamily="49" charset="0"/>
-              </a:rPr>
-              <a:t>i</a:t>
-            </a:r>
-            <a:r>
-              <a:rPr lang="en-US" i="1" dirty="0">
-                <a:solidFill>
-                  <a:srgbClr val="9876AA"/>
-                </a:solidFill>
-                <a:effectLst/>
-                <a:latin typeface="Consolas" panose="020B0609020204030204" pitchFamily="49" charset="0"/>
-                <a:cs typeface="Consolas" panose="020B0609020204030204" pitchFamily="49" charset="0"/>
-              </a:rPr>
-              <a:t> </a:t>
-            </a:r>
-            <a:r>
-              <a:rPr lang="en-US" dirty="0">
-                <a:latin typeface="Consolas" panose="020B0609020204030204" pitchFamily="49" charset="0"/>
-                <a:cs typeface="Consolas" panose="020B0609020204030204" pitchFamily="49" charset="0"/>
-              </a:rPr>
-              <a:t>= </a:t>
-            </a:r>
-            <a:r>
-              <a:rPr lang="en-US" dirty="0">
-                <a:solidFill>
-                  <a:srgbClr val="6897BB"/>
-                </a:solidFill>
-                <a:effectLst/>
-                <a:latin typeface="Consolas" panose="020B0609020204030204" pitchFamily="49" charset="0"/>
-                <a:cs typeface="Consolas" panose="020B0609020204030204" pitchFamily="49" charset="0"/>
-              </a:rPr>
-              <a:t>1</a:t>
-            </a:r>
-            <a:r>
-              <a:rPr lang="en-US" dirty="0">
-                <a:solidFill>
-                  <a:srgbClr val="CC7832"/>
-                </a:solidFill>
-                <a:effectLst/>
-                <a:latin typeface="Consolas" panose="020B0609020204030204" pitchFamily="49" charset="0"/>
-                <a:cs typeface="Consolas" panose="020B0609020204030204" pitchFamily="49" charset="0"/>
-              </a:rPr>
-              <a:t>;</a:t>
-            </a:r>
-            <a:br>
-              <a:rPr lang="en-US" dirty="0">
-                <a:solidFill>
-                  <a:srgbClr val="CC7832"/>
-                </a:solidFill>
-                <a:effectLst/>
-                <a:latin typeface="Consolas" panose="020B0609020204030204" pitchFamily="49" charset="0"/>
-                <a:cs typeface="Consolas" panose="020B0609020204030204" pitchFamily="49" charset="0"/>
-              </a:rPr>
-            </a:br>
-            <a:r>
-              <a:rPr lang="en-US" dirty="0">
-                <a:solidFill>
-                  <a:srgbClr val="CC7832"/>
-                </a:solidFill>
-                <a:effectLst/>
-                <a:latin typeface="Consolas" panose="020B0609020204030204" pitchFamily="49" charset="0"/>
-                <a:cs typeface="Consolas" panose="020B0609020204030204" pitchFamily="49" charset="0"/>
-              </a:rPr>
-              <a:t>    while</a:t>
-            </a:r>
-            <a:r>
-              <a:rPr lang="en-US" dirty="0">
-                <a:latin typeface="Consolas" panose="020B0609020204030204" pitchFamily="49" charset="0"/>
-                <a:cs typeface="Consolas" panose="020B0609020204030204" pitchFamily="49" charset="0"/>
-              </a:rPr>
-              <a:t>(</a:t>
-            </a:r>
-            <a:r>
-              <a:rPr lang="en-US" i="1" dirty="0" err="1">
-                <a:solidFill>
-                  <a:srgbClr val="9876AA"/>
-                </a:solidFill>
-                <a:effectLst/>
-                <a:latin typeface="Consolas" panose="020B0609020204030204" pitchFamily="49" charset="0"/>
-                <a:cs typeface="Consolas" panose="020B0609020204030204" pitchFamily="49" charset="0"/>
-              </a:rPr>
-              <a:t>i</a:t>
-            </a:r>
-            <a:r>
-              <a:rPr lang="en-US" i="1" dirty="0">
-                <a:solidFill>
-                  <a:srgbClr val="9876AA"/>
-                </a:solidFill>
-                <a:effectLst/>
-                <a:latin typeface="Consolas" panose="020B0609020204030204" pitchFamily="49" charset="0"/>
-                <a:cs typeface="Consolas" panose="020B0609020204030204" pitchFamily="49" charset="0"/>
-              </a:rPr>
-              <a:t> </a:t>
-            </a:r>
-            <a:r>
-              <a:rPr lang="en-US" dirty="0">
-                <a:latin typeface="Consolas" panose="020B0609020204030204" pitchFamily="49" charset="0"/>
-                <a:cs typeface="Consolas" panose="020B0609020204030204" pitchFamily="49" charset="0"/>
-              </a:rPr>
-              <a:t>&lt;= </a:t>
-            </a:r>
-            <a:r>
-              <a:rPr lang="en-US" i="1" dirty="0">
-                <a:solidFill>
-                  <a:srgbClr val="9876AA"/>
-                </a:solidFill>
-                <a:effectLst/>
-                <a:latin typeface="Consolas" panose="020B0609020204030204" pitchFamily="49" charset="0"/>
-                <a:cs typeface="Consolas" panose="020B0609020204030204" pitchFamily="49" charset="0"/>
-              </a:rPr>
-              <a:t>total</a:t>
-            </a:r>
-            <a:r>
-              <a:rPr lang="en-US" dirty="0">
-                <a:latin typeface="Consolas" panose="020B0609020204030204" pitchFamily="49" charset="0"/>
-                <a:cs typeface="Consolas" panose="020B0609020204030204" pitchFamily="49" charset="0"/>
-              </a:rPr>
-              <a:t>) {</a:t>
-            </a:r>
-            <a:br>
-              <a:rPr lang="en-US" dirty="0">
-                <a:latin typeface="Consolas" panose="020B0609020204030204" pitchFamily="49" charset="0"/>
-                <a:cs typeface="Consolas" panose="020B0609020204030204" pitchFamily="49" charset="0"/>
-              </a:rPr>
-            </a:br>
-            <a:r>
-              <a:rPr lang="en-US" dirty="0">
-                <a:latin typeface="Consolas" panose="020B0609020204030204" pitchFamily="49" charset="0"/>
-                <a:cs typeface="Consolas" panose="020B0609020204030204" pitchFamily="49" charset="0"/>
-              </a:rPr>
-              <a:t>        </a:t>
-            </a:r>
-            <a:r>
-              <a:rPr lang="en-US" dirty="0" err="1">
-                <a:latin typeface="Consolas" panose="020B0609020204030204" pitchFamily="49" charset="0"/>
-                <a:cs typeface="Consolas" panose="020B0609020204030204" pitchFamily="49" charset="0"/>
-              </a:rPr>
-              <a:t>System.</a:t>
-            </a:r>
-            <a:r>
-              <a:rPr lang="en-US" i="1" dirty="0" err="1">
-                <a:solidFill>
-                  <a:srgbClr val="9876AA"/>
-                </a:solidFill>
-                <a:effectLst/>
-                <a:latin typeface="Consolas" panose="020B0609020204030204" pitchFamily="49" charset="0"/>
-                <a:cs typeface="Consolas" panose="020B0609020204030204" pitchFamily="49" charset="0"/>
-              </a:rPr>
-              <a:t>out</a:t>
-            </a:r>
-            <a:r>
-              <a:rPr lang="en-US" dirty="0" err="1">
-                <a:latin typeface="Consolas" panose="020B0609020204030204" pitchFamily="49" charset="0"/>
-                <a:cs typeface="Consolas" panose="020B0609020204030204" pitchFamily="49" charset="0"/>
-              </a:rPr>
-              <a:t>.print</a:t>
-            </a:r>
-            <a:r>
-              <a:rPr lang="en-US" dirty="0">
-                <a:latin typeface="Consolas" panose="020B0609020204030204" pitchFamily="49" charset="0"/>
-                <a:cs typeface="Consolas" panose="020B0609020204030204" pitchFamily="49" charset="0"/>
-              </a:rPr>
-              <a:t>(</a:t>
-            </a:r>
-            <a:r>
-              <a:rPr lang="en-US" i="1" dirty="0" err="1">
-                <a:solidFill>
-                  <a:srgbClr val="9876AA"/>
-                </a:solidFill>
-                <a:effectLst/>
-                <a:latin typeface="Consolas" panose="020B0609020204030204" pitchFamily="49" charset="0"/>
-                <a:cs typeface="Consolas" panose="020B0609020204030204" pitchFamily="49" charset="0"/>
-              </a:rPr>
-              <a:t>i</a:t>
-            </a:r>
-            <a:r>
-              <a:rPr lang="en-US" i="1" dirty="0">
-                <a:solidFill>
-                  <a:srgbClr val="9876AA"/>
-                </a:solidFill>
-                <a:effectLst/>
-                <a:latin typeface="Consolas" panose="020B0609020204030204" pitchFamily="49" charset="0"/>
-                <a:cs typeface="Consolas" panose="020B0609020204030204" pitchFamily="49" charset="0"/>
-              </a:rPr>
-              <a:t> </a:t>
-            </a:r>
-            <a:r>
-              <a:rPr lang="en-US" dirty="0">
-                <a:latin typeface="Consolas" panose="020B0609020204030204" pitchFamily="49" charset="0"/>
-                <a:cs typeface="Consolas" panose="020B0609020204030204" pitchFamily="49" charset="0"/>
-              </a:rPr>
-              <a:t>+ </a:t>
-            </a:r>
-            <a:r>
-              <a:rPr lang="en-US" dirty="0">
-                <a:solidFill>
-                  <a:srgbClr val="6A8759"/>
-                </a:solidFill>
-                <a:effectLst/>
-                <a:latin typeface="Consolas" panose="020B0609020204030204" pitchFamily="49" charset="0"/>
-                <a:cs typeface="Consolas" panose="020B0609020204030204" pitchFamily="49" charset="0"/>
-              </a:rPr>
-              <a:t>","</a:t>
-            </a:r>
-            <a:r>
-              <a:rPr lang="en-US" dirty="0">
-                <a:latin typeface="Consolas" panose="020B0609020204030204" pitchFamily="49" charset="0"/>
-                <a:cs typeface="Consolas" panose="020B0609020204030204" pitchFamily="49" charset="0"/>
-              </a:rPr>
-              <a:t>)</a:t>
-            </a:r>
-            <a:r>
-              <a:rPr lang="en-US" dirty="0">
-                <a:solidFill>
-                  <a:srgbClr val="CC7832"/>
-                </a:solidFill>
-                <a:effectLst/>
-                <a:latin typeface="Consolas" panose="020B0609020204030204" pitchFamily="49" charset="0"/>
-                <a:cs typeface="Consolas" panose="020B0609020204030204" pitchFamily="49" charset="0"/>
-              </a:rPr>
-              <a:t>;</a:t>
-            </a:r>
-            <a:br>
-              <a:rPr lang="en-US" dirty="0">
-                <a:solidFill>
-                  <a:srgbClr val="CC7832"/>
-                </a:solidFill>
-                <a:effectLst/>
-                <a:latin typeface="Consolas" panose="020B0609020204030204" pitchFamily="49" charset="0"/>
-                <a:cs typeface="Consolas" panose="020B0609020204030204" pitchFamily="49" charset="0"/>
-              </a:rPr>
-            </a:br>
-            <a:r>
-              <a:rPr lang="en-US" dirty="0">
-                <a:solidFill>
-                  <a:srgbClr val="CC7832"/>
-                </a:solidFill>
-                <a:effectLst/>
-                <a:latin typeface="Consolas" panose="020B0609020204030204" pitchFamily="49" charset="0"/>
-                <a:cs typeface="Consolas" panose="020B0609020204030204" pitchFamily="49" charset="0"/>
-              </a:rPr>
-              <a:t>        </a:t>
-            </a:r>
-            <a:r>
-              <a:rPr lang="en-US" i="1" dirty="0" err="1">
-                <a:solidFill>
-                  <a:srgbClr val="9876AA"/>
-                </a:solidFill>
-                <a:effectLst/>
-                <a:latin typeface="Consolas" panose="020B0609020204030204" pitchFamily="49" charset="0"/>
-                <a:cs typeface="Consolas" panose="020B0609020204030204" pitchFamily="49" charset="0"/>
-              </a:rPr>
-              <a:t>i</a:t>
-            </a:r>
-            <a:r>
-              <a:rPr lang="en-US" i="1" dirty="0">
-                <a:solidFill>
-                  <a:srgbClr val="9876AA"/>
-                </a:solidFill>
-                <a:effectLst/>
-                <a:latin typeface="Consolas" panose="020B0609020204030204" pitchFamily="49" charset="0"/>
-                <a:cs typeface="Consolas" panose="020B0609020204030204" pitchFamily="49" charset="0"/>
-              </a:rPr>
-              <a:t> </a:t>
-            </a:r>
-            <a:r>
-              <a:rPr lang="en-US" dirty="0">
-                <a:latin typeface="Consolas" panose="020B0609020204030204" pitchFamily="49" charset="0"/>
-                <a:cs typeface="Consolas" panose="020B0609020204030204" pitchFamily="49" charset="0"/>
-              </a:rPr>
-              <a:t>= </a:t>
-            </a:r>
-            <a:r>
-              <a:rPr lang="en-US" i="1" dirty="0" err="1">
-                <a:solidFill>
-                  <a:srgbClr val="9876AA"/>
-                </a:solidFill>
-                <a:effectLst/>
-                <a:latin typeface="Consolas" panose="020B0609020204030204" pitchFamily="49" charset="0"/>
-                <a:cs typeface="Consolas" panose="020B0609020204030204" pitchFamily="49" charset="0"/>
-              </a:rPr>
-              <a:t>i</a:t>
-            </a:r>
-            <a:r>
-              <a:rPr lang="en-US" i="1" dirty="0">
-                <a:solidFill>
-                  <a:srgbClr val="9876AA"/>
-                </a:solidFill>
-                <a:effectLst/>
-                <a:latin typeface="Consolas" panose="020B0609020204030204" pitchFamily="49" charset="0"/>
-                <a:cs typeface="Consolas" panose="020B0609020204030204" pitchFamily="49" charset="0"/>
-              </a:rPr>
-              <a:t> </a:t>
-            </a:r>
-            <a:r>
-              <a:rPr lang="en-US" dirty="0">
-                <a:latin typeface="Consolas" panose="020B0609020204030204" pitchFamily="49" charset="0"/>
-                <a:cs typeface="Consolas" panose="020B0609020204030204" pitchFamily="49" charset="0"/>
-              </a:rPr>
-              <a:t>+ </a:t>
-            </a:r>
-            <a:r>
-              <a:rPr lang="en-US" dirty="0">
-                <a:solidFill>
-                  <a:srgbClr val="6897BB"/>
-                </a:solidFill>
-                <a:effectLst/>
-                <a:latin typeface="Consolas" panose="020B0609020204030204" pitchFamily="49" charset="0"/>
-                <a:cs typeface="Consolas" panose="020B0609020204030204" pitchFamily="49" charset="0"/>
-              </a:rPr>
-              <a:t>1</a:t>
-            </a:r>
-            <a:r>
-              <a:rPr lang="en-US" dirty="0">
-                <a:solidFill>
-                  <a:srgbClr val="CC7832"/>
-                </a:solidFill>
-                <a:effectLst/>
-                <a:latin typeface="Consolas" panose="020B0609020204030204" pitchFamily="49" charset="0"/>
-                <a:cs typeface="Consolas" panose="020B0609020204030204" pitchFamily="49" charset="0"/>
-              </a:rPr>
-              <a:t>;</a:t>
-            </a:r>
-            <a:br>
-              <a:rPr lang="en-US" dirty="0">
-                <a:solidFill>
-                  <a:srgbClr val="CC7832"/>
-                </a:solidFill>
-                <a:effectLst/>
-                <a:latin typeface="Consolas" panose="020B0609020204030204" pitchFamily="49" charset="0"/>
-                <a:cs typeface="Consolas" panose="020B0609020204030204" pitchFamily="49" charset="0"/>
-              </a:rPr>
-            </a:br>
-            <a:r>
-              <a:rPr lang="en-US" dirty="0">
-                <a:solidFill>
-                  <a:srgbClr val="CC7832"/>
-                </a:solidFill>
-                <a:effectLst/>
-                <a:latin typeface="Consolas" panose="020B0609020204030204" pitchFamily="49" charset="0"/>
-                <a:cs typeface="Consolas" panose="020B0609020204030204" pitchFamily="49" charset="0"/>
-              </a:rPr>
-              <a:t>    </a:t>
-            </a:r>
-            <a:r>
-              <a:rPr lang="en-US" dirty="0">
-                <a:latin typeface="Consolas" panose="020B0609020204030204" pitchFamily="49" charset="0"/>
-                <a:cs typeface="Consolas" panose="020B0609020204030204" pitchFamily="49" charset="0"/>
-              </a:rPr>
-              <a:t>}</a:t>
-            </a:r>
-            <a:br>
-              <a:rPr lang="en-US" dirty="0">
-                <a:latin typeface="Consolas" panose="020B0609020204030204" pitchFamily="49" charset="0"/>
-                <a:cs typeface="Consolas" panose="020B0609020204030204" pitchFamily="49" charset="0"/>
-              </a:rPr>
-            </a:br>
-            <a:r>
-              <a:rPr lang="en-US" dirty="0">
-                <a:latin typeface="Consolas" panose="020B0609020204030204" pitchFamily="49" charset="0"/>
-                <a:cs typeface="Consolas" panose="020B0609020204030204" pitchFamily="49" charset="0"/>
-              </a:rPr>
-              <a:t>}</a:t>
-            </a:r>
-          </a:p>
-        </p:txBody>
-      </p:sp>
-    </p:spTree>
-    <p:extLst>
-      <p:ext uri="{BB962C8B-B14F-4D97-AF65-F5344CB8AC3E}">
-        <p14:creationId xmlns:p14="http://schemas.microsoft.com/office/powerpoint/2010/main" val="1000839727"/>
-      </p:ext>
-    </p:extLst>
-  </p:cSld>
-  <p:clrMapOvr>
-    <a:masterClrMapping/>
-  </p:clrMapOvr>
-  <mc:AlternateContent xmlns:mc="http://schemas.openxmlformats.org/markup-compatibility/2006" xmlns:p14="http://schemas.microsoft.com/office/powerpoint/2010/main">
-    <mc:Choice Requires="p14">
-      <p:transition p14:dur="300">
-        <p:fade/>
-      </p:transition>
-    </mc:Choice>
-    <mc:Fallback xmlns="">
-      <p:transition>
-        <p:fade/>
-      </p:transition>
-    </mc:Fallback>
-  </mc:AlternateContent>
-</p:sld>
-</file>
-
 <file path=ppt/slides/slide9.xml><?xml version="1.0" encoding="utf-8"?>
 <p:sld xmlns:a="http://schemas.openxmlformats.org/drawingml/2006/main" xmlns:r="http://schemas.openxmlformats.org/officeDocument/2006/relationships" xmlns:p="http://schemas.openxmlformats.org/presentationml/2006/main">
   <p:cSld>
@@ -9846,7 +12431,7 @@
           <p:cNvPr id="2" name="Title 1">
             <a:extLst>
               <a:ext uri="{FF2B5EF4-FFF2-40B4-BE49-F238E27FC236}">
-                <a16:creationId xmlns:a16="http://schemas.microsoft.com/office/drawing/2014/main" id="{1A61D683-00D4-0445-9448-BC3044AD8ED9}"/>
+                <a16:creationId xmlns:a16="http://schemas.microsoft.com/office/drawing/2014/main" id="{B52546B5-2005-5847-BB54-FA24B28BBD44}"/>
               </a:ext>
             </a:extLst>
           </p:cNvPr>
@@ -9864,60 +12449,17 @@
           <a:p>
             <a:r>
               <a:rPr lang="en-US" dirty="0"/>
-              <a:t>While/For Mostly Interchangeable</a:t>
-            </a:r>
-          </a:p>
-        </p:txBody>
-      </p:sp>
-      <p:sp>
-        <p:nvSpPr>
-          <p:cNvPr id="3" name="Text Placeholder 2">
-            <a:extLst>
-              <a:ext uri="{FF2B5EF4-FFF2-40B4-BE49-F238E27FC236}">
-                <a16:creationId xmlns:a16="http://schemas.microsoft.com/office/drawing/2014/main" id="{E449288E-D494-1942-ABCE-51152CB06154}"/>
-              </a:ext>
-            </a:extLst>
-          </p:cNvPr>
-          <p:cNvSpPr>
-            <a:spLocks noGrp="1"/>
-          </p:cNvSpPr>
-          <p:nvPr>
-            <p:ph type="body" sz="quarter" idx="10"/>
-          </p:nvPr>
-        </p:nvSpPr>
-        <p:spPr>
-          <a:xfrm>
-            <a:off x="9826171" y="1776682"/>
-            <a:ext cx="3363357" cy="1300099"/>
-          </a:xfrm>
-        </p:spPr>
-        <p:txBody>
-          <a:bodyPr/>
-          <a:lstStyle/>
-          <a:p>
-            <a:r>
-              <a:rPr lang="en-US" dirty="0"/>
-              <a:t>Let total = 10</a:t>
-            </a:r>
-          </a:p>
-          <a:p>
-            <a:r>
-              <a:rPr lang="en-US" dirty="0"/>
-              <a:t>0,1,2,3,4,5,6,7,8,9,</a:t>
-            </a:r>
-            <a:br>
-              <a:rPr lang="en-US" dirty="0"/>
-            </a:br>
-            <a:endParaRPr lang="en-US" dirty="0"/>
+              <a:t>For Loop</a:t>
+            </a:r>
           </a:p>
         </p:txBody>
       </p:sp>
       <p:pic>
         <p:nvPicPr>
-          <p:cNvPr id="3074" name="Picture 2">
+          <p:cNvPr id="2056" name="Picture 8">
             <a:extLst>
               <a:ext uri="{FF2B5EF4-FFF2-40B4-BE49-F238E27FC236}">
-                <a16:creationId xmlns:a16="http://schemas.microsoft.com/office/drawing/2014/main" id="{FB7748DD-DF09-434C-8BE3-3D3CB996FB6F}"/>
+                <a16:creationId xmlns:a16="http://schemas.microsoft.com/office/drawing/2014/main" id="{E26E1F08-DE40-654F-97D9-EA5612BC1895}"/>
               </a:ext>
             </a:extLst>
           </p:cNvPr>
@@ -9941,8 +12483,8 @@
         </p:blipFill>
         <p:spPr bwMode="auto">
           <a:xfrm>
-            <a:off x="268514" y="1463722"/>
-            <a:ext cx="9245600" cy="5232400"/>
+            <a:off x="6578600" y="0"/>
+            <a:ext cx="7239000" cy="1549400"/>
           </a:xfrm>
           <a:prstGeom prst="rect">
             <a:avLst/>
@@ -9959,10 +12501,663 @@
           </a:extLst>
         </p:spPr>
       </p:pic>
+      <p:sp>
+        <p:nvSpPr>
+          <p:cNvPr id="4" name="Text Placeholder 3"/>
+          <p:cNvSpPr>
+            <a:spLocks noGrp="1"/>
+          </p:cNvSpPr>
+          <p:nvPr>
+            <p:ph type="body" sz="quarter" idx="10"/>
+          </p:nvPr>
+        </p:nvSpPr>
+        <p:spPr>
+          <a:xfrm>
+            <a:off x="628075" y="1776683"/>
+            <a:ext cx="5761708" cy="3123932"/>
+          </a:xfrm>
+        </p:spPr>
+        <p:txBody>
+          <a:bodyPr/>
+          <a:lstStyle/>
+          <a:p>
+            <a:r>
+              <a:rPr lang="en-US" dirty="0" smtClean="0"/>
+              <a:t>How the for works:</a:t>
+            </a:r>
+          </a:p>
+          <a:p>
+            <a:pPr lvl="1">
+              <a:buFont typeface="+mj-lt"/>
+              <a:buAutoNum type="arabicPeriod"/>
+            </a:pPr>
+            <a:r>
+              <a:rPr lang="en-US" dirty="0" smtClean="0"/>
+              <a:t>control variable is initialized </a:t>
+            </a:r>
+          </a:p>
+          <a:p>
+            <a:pPr lvl="1">
+              <a:buFont typeface="+mj-lt"/>
+              <a:buAutoNum type="arabicPeriod"/>
+            </a:pPr>
+            <a:r>
+              <a:rPr lang="en-US" dirty="0"/>
+              <a:t>t</a:t>
+            </a:r>
+            <a:r>
+              <a:rPr lang="en-US" dirty="0" smtClean="0"/>
+              <a:t>est condition</a:t>
+            </a:r>
+          </a:p>
+          <a:p>
+            <a:pPr marL="1399233" lvl="2" indent="0">
+              <a:buNone/>
+            </a:pPr>
+            <a:r>
+              <a:rPr lang="en-US" dirty="0" smtClean="0"/>
+              <a:t>2.1. if test if true:</a:t>
+            </a:r>
+          </a:p>
+          <a:p>
+            <a:pPr lvl="2"/>
+            <a:r>
+              <a:rPr lang="en-US" dirty="0" smtClean="0"/>
+              <a:t>execute what is in {}</a:t>
+            </a:r>
+          </a:p>
+          <a:p>
+            <a:pPr lvl="2"/>
+            <a:r>
+              <a:rPr lang="en-US" dirty="0" smtClean="0"/>
+              <a:t>increment control variable and</a:t>
+            </a:r>
+          </a:p>
+          <a:p>
+            <a:pPr lvl="2"/>
+            <a:r>
+              <a:rPr lang="en-US" dirty="0" smtClean="0"/>
+              <a:t>go to step 2 again</a:t>
+            </a:r>
+          </a:p>
+          <a:p>
+            <a:pPr marL="1399233" lvl="2" indent="0">
+              <a:buNone/>
+            </a:pPr>
+            <a:r>
+              <a:rPr lang="en-US" dirty="0" smtClean="0"/>
+              <a:t>2.2. if test if false, exit for</a:t>
+            </a:r>
+            <a:endParaRPr lang="en-US" dirty="0"/>
+          </a:p>
+        </p:txBody>
+      </p:sp>
+      <p:sp>
+        <p:nvSpPr>
+          <p:cNvPr id="8" name="Rectangle 7">
+            <a:extLst>
+              <a:ext uri="{FF2B5EF4-FFF2-40B4-BE49-F238E27FC236}">
+                <a16:creationId xmlns:a16="http://schemas.microsoft.com/office/drawing/2014/main" id="{F8083C6D-3634-004D-BE41-F84DFC608329}"/>
+              </a:ext>
+            </a:extLst>
+          </p:cNvPr>
+          <p:cNvSpPr/>
+          <p:nvPr/>
+        </p:nvSpPr>
+        <p:spPr>
+          <a:xfrm>
+            <a:off x="8115417" y="1827931"/>
+            <a:ext cx="4763299" cy="979799"/>
+          </a:xfrm>
+          <a:prstGeom prst="rect">
+            <a:avLst/>
+          </a:prstGeom>
+          <a:solidFill>
+            <a:schemeClr val="bg2"/>
+          </a:solidFill>
+          <a:ln>
+            <a:noFill/>
+          </a:ln>
+          <a:effectLst/>
+        </p:spPr>
+        <p:style>
+          <a:lnRef idx="1">
+            <a:schemeClr val="accent1"/>
+          </a:lnRef>
+          <a:fillRef idx="3">
+            <a:schemeClr val="accent1"/>
+          </a:fillRef>
+          <a:effectRef idx="2">
+            <a:schemeClr val="accent1"/>
+          </a:effectRef>
+          <a:fontRef idx="minor">
+            <a:schemeClr val="lt1"/>
+          </a:fontRef>
+        </p:style>
+        <p:txBody>
+          <a:bodyPr lIns="274320" tIns="182880" rIns="274320" bIns="182880" rtlCol="0" anchor="ctr"/>
+          <a:lstStyle/>
+          <a:p>
+            <a:pPr algn="ctr"/>
+            <a:r>
+              <a:rPr lang="en-US" dirty="0" smtClean="0">
+                <a:solidFill>
+                  <a:srgbClr val="092529"/>
+                </a:solidFill>
+                <a:latin typeface="Proxima Nova" charset="0"/>
+                <a:ea typeface="Proxima Nova" charset="0"/>
+                <a:cs typeface="Proxima Nova" charset="0"/>
+              </a:rPr>
+              <a:t>What </a:t>
+            </a:r>
+            <a:r>
+              <a:rPr lang="en-US" dirty="0" smtClean="0">
+                <a:solidFill>
+                  <a:srgbClr val="092529"/>
+                </a:solidFill>
+                <a:latin typeface="Proxima Nova" charset="0"/>
+                <a:ea typeface="Proxima Nova" charset="0"/>
+                <a:cs typeface="Proxima Nova" charset="0"/>
+              </a:rPr>
+              <a:t>is the program output?</a:t>
+            </a:r>
+            <a:endParaRPr lang="en-US" dirty="0">
+              <a:solidFill>
+                <a:srgbClr val="092529"/>
+              </a:solidFill>
+              <a:latin typeface="Proxima Nova" charset="0"/>
+              <a:ea typeface="Proxima Nova" charset="0"/>
+              <a:cs typeface="Proxima Nova" charset="0"/>
+            </a:endParaRPr>
+          </a:p>
+        </p:txBody>
+      </p:sp>
+      <p:sp>
+        <p:nvSpPr>
+          <p:cNvPr id="9" name="Rectangle 8">
+            <a:extLst>
+              <a:ext uri="{FF2B5EF4-FFF2-40B4-BE49-F238E27FC236}">
+                <a16:creationId xmlns:a16="http://schemas.microsoft.com/office/drawing/2014/main" id="{F8083C6D-3634-004D-BE41-F84DFC608329}"/>
+              </a:ext>
+            </a:extLst>
+          </p:cNvPr>
+          <p:cNvSpPr/>
+          <p:nvPr/>
+        </p:nvSpPr>
+        <p:spPr>
+          <a:xfrm>
+            <a:off x="8115419" y="2899622"/>
+            <a:ext cx="4763300" cy="493574"/>
+          </a:xfrm>
+          <a:prstGeom prst="rect">
+            <a:avLst/>
+          </a:prstGeom>
+          <a:noFill/>
+          <a:ln>
+            <a:noFill/>
+          </a:ln>
+          <a:effectLst/>
+        </p:spPr>
+        <p:style>
+          <a:lnRef idx="1">
+            <a:schemeClr val="accent1"/>
+          </a:lnRef>
+          <a:fillRef idx="3">
+            <a:schemeClr val="accent1"/>
+          </a:fillRef>
+          <a:effectRef idx="2">
+            <a:schemeClr val="accent1"/>
+          </a:effectRef>
+          <a:fontRef idx="minor">
+            <a:schemeClr val="lt1"/>
+          </a:fontRef>
+        </p:style>
+        <p:txBody>
+          <a:bodyPr lIns="274320" tIns="182880" rIns="274320" bIns="182880" rtlCol="0" anchor="ctr"/>
+          <a:lstStyle/>
+          <a:p>
+            <a:pPr algn="ctr"/>
+            <a:r>
+              <a:rPr lang="en-US" dirty="0" smtClean="0">
+                <a:solidFill>
+                  <a:srgbClr val="092529"/>
+                </a:solidFill>
+                <a:latin typeface="Consolas" panose="020B0609020204030204" pitchFamily="49" charset="0"/>
+                <a:ea typeface="Proxima Nova" charset="0"/>
+                <a:cs typeface="Proxima Nova" charset="0"/>
+              </a:rPr>
+              <a:t>0123456789</a:t>
+            </a:r>
+            <a:endParaRPr lang="en-US" dirty="0">
+              <a:solidFill>
+                <a:srgbClr val="092529"/>
+              </a:solidFill>
+              <a:latin typeface="Consolas" panose="020B0609020204030204" pitchFamily="49" charset="0"/>
+              <a:ea typeface="Proxima Nova" charset="0"/>
+              <a:cs typeface="Proxima Nova" charset="0"/>
+            </a:endParaRPr>
+          </a:p>
+        </p:txBody>
+      </p:sp>
+      <p:sp>
+        <p:nvSpPr>
+          <p:cNvPr id="10" name="Rectangle 9">
+            <a:extLst>
+              <a:ext uri="{FF2B5EF4-FFF2-40B4-BE49-F238E27FC236}">
+                <a16:creationId xmlns:a16="http://schemas.microsoft.com/office/drawing/2014/main" id="{F8083C6D-3634-004D-BE41-F84DFC608329}"/>
+              </a:ext>
+            </a:extLst>
+          </p:cNvPr>
+          <p:cNvSpPr/>
+          <p:nvPr/>
+        </p:nvSpPr>
+        <p:spPr>
+          <a:xfrm>
+            <a:off x="8115420" y="3424295"/>
+            <a:ext cx="4763299" cy="979799"/>
+          </a:xfrm>
+          <a:prstGeom prst="rect">
+            <a:avLst/>
+          </a:prstGeom>
+          <a:solidFill>
+            <a:schemeClr val="bg2"/>
+          </a:solidFill>
+          <a:ln>
+            <a:noFill/>
+          </a:ln>
+          <a:effectLst/>
+        </p:spPr>
+        <p:style>
+          <a:lnRef idx="1">
+            <a:schemeClr val="accent1"/>
+          </a:lnRef>
+          <a:fillRef idx="3">
+            <a:schemeClr val="accent1"/>
+          </a:fillRef>
+          <a:effectRef idx="2">
+            <a:schemeClr val="accent1"/>
+          </a:effectRef>
+          <a:fontRef idx="minor">
+            <a:schemeClr val="lt1"/>
+          </a:fontRef>
+        </p:style>
+        <p:txBody>
+          <a:bodyPr lIns="274320" tIns="182880" rIns="274320" bIns="182880" rtlCol="0" anchor="ctr"/>
+          <a:lstStyle/>
+          <a:p>
+            <a:pPr algn="ctr"/>
+            <a:r>
+              <a:rPr lang="en-US" dirty="0" smtClean="0">
+                <a:solidFill>
+                  <a:srgbClr val="092529"/>
+                </a:solidFill>
+                <a:latin typeface="Proxima Nova" charset="0"/>
+                <a:ea typeface="Proxima Nova" charset="0"/>
+                <a:cs typeface="Proxima Nova" charset="0"/>
+              </a:rPr>
+              <a:t>What </a:t>
+            </a:r>
+            <a:r>
+              <a:rPr lang="en-US" dirty="0" smtClean="0">
+                <a:solidFill>
+                  <a:srgbClr val="092529"/>
+                </a:solidFill>
+                <a:latin typeface="Proxima Nova" charset="0"/>
+                <a:ea typeface="Proxima Nova" charset="0"/>
+                <a:cs typeface="Proxima Nova" charset="0"/>
+              </a:rPr>
+              <a:t>do we need to change to have each number in a different line?</a:t>
+            </a:r>
+            <a:endParaRPr lang="en-US" dirty="0">
+              <a:solidFill>
+                <a:srgbClr val="092529"/>
+              </a:solidFill>
+              <a:latin typeface="Proxima Nova" charset="0"/>
+              <a:ea typeface="Proxima Nova" charset="0"/>
+              <a:cs typeface="Proxima Nova" charset="0"/>
+            </a:endParaRPr>
+          </a:p>
+        </p:txBody>
+      </p:sp>
+      <p:sp>
+        <p:nvSpPr>
+          <p:cNvPr id="11" name="Rectangle 10">
+            <a:extLst>
+              <a:ext uri="{FF2B5EF4-FFF2-40B4-BE49-F238E27FC236}">
+                <a16:creationId xmlns:a16="http://schemas.microsoft.com/office/drawing/2014/main" id="{F8083C6D-3634-004D-BE41-F84DFC608329}"/>
+              </a:ext>
+            </a:extLst>
+          </p:cNvPr>
+          <p:cNvSpPr/>
+          <p:nvPr/>
+        </p:nvSpPr>
+        <p:spPr>
+          <a:xfrm>
+            <a:off x="8115416" y="5268091"/>
+            <a:ext cx="4763299" cy="979799"/>
+          </a:xfrm>
+          <a:prstGeom prst="rect">
+            <a:avLst/>
+          </a:prstGeom>
+          <a:solidFill>
+            <a:schemeClr val="bg2"/>
+          </a:solidFill>
+          <a:ln>
+            <a:noFill/>
+          </a:ln>
+          <a:effectLst/>
+        </p:spPr>
+        <p:style>
+          <a:lnRef idx="1">
+            <a:schemeClr val="accent1"/>
+          </a:lnRef>
+          <a:fillRef idx="3">
+            <a:schemeClr val="accent1"/>
+          </a:fillRef>
+          <a:effectRef idx="2">
+            <a:schemeClr val="accent1"/>
+          </a:effectRef>
+          <a:fontRef idx="minor">
+            <a:schemeClr val="lt1"/>
+          </a:fontRef>
+        </p:style>
+        <p:txBody>
+          <a:bodyPr lIns="274320" tIns="182880" rIns="274320" bIns="182880" rtlCol="0" anchor="ctr"/>
+          <a:lstStyle/>
+          <a:p>
+            <a:pPr algn="ctr"/>
+            <a:r>
+              <a:rPr lang="en-US" dirty="0" smtClean="0">
+                <a:solidFill>
+                  <a:srgbClr val="092529"/>
+                </a:solidFill>
+                <a:latin typeface="Proxima Nova" charset="0"/>
+                <a:ea typeface="Proxima Nova" charset="0"/>
+                <a:cs typeface="Proxima Nova" charset="0"/>
+              </a:rPr>
+              <a:t>What </a:t>
+            </a:r>
+            <a:r>
+              <a:rPr lang="en-US" dirty="0" smtClean="0">
+                <a:solidFill>
+                  <a:srgbClr val="092529"/>
+                </a:solidFill>
+                <a:latin typeface="Proxima Nova" charset="0"/>
+                <a:ea typeface="Proxima Nova" charset="0"/>
+                <a:cs typeface="Proxima Nova" charset="0"/>
+              </a:rPr>
+              <a:t>do we need to change to print the numbers in the inverse order?</a:t>
+            </a:r>
+            <a:endParaRPr lang="en-US" dirty="0">
+              <a:solidFill>
+                <a:srgbClr val="092529"/>
+              </a:solidFill>
+              <a:latin typeface="Proxima Nova" charset="0"/>
+              <a:ea typeface="Proxima Nova" charset="0"/>
+              <a:cs typeface="Proxima Nova" charset="0"/>
+            </a:endParaRPr>
+          </a:p>
+        </p:txBody>
+      </p:sp>
+      <p:sp>
+        <p:nvSpPr>
+          <p:cNvPr id="12" name="Rectangle 11">
+            <a:extLst>
+              <a:ext uri="{FF2B5EF4-FFF2-40B4-BE49-F238E27FC236}">
+                <a16:creationId xmlns:a16="http://schemas.microsoft.com/office/drawing/2014/main" id="{F8083C6D-3634-004D-BE41-F84DFC608329}"/>
+              </a:ext>
+            </a:extLst>
+          </p:cNvPr>
+          <p:cNvSpPr/>
+          <p:nvPr/>
+        </p:nvSpPr>
+        <p:spPr>
+          <a:xfrm>
+            <a:off x="8267819" y="4573756"/>
+            <a:ext cx="4763300" cy="493574"/>
+          </a:xfrm>
+          <a:prstGeom prst="rect">
+            <a:avLst/>
+          </a:prstGeom>
+          <a:noFill/>
+          <a:ln>
+            <a:noFill/>
+          </a:ln>
+          <a:effectLst/>
+        </p:spPr>
+        <p:style>
+          <a:lnRef idx="1">
+            <a:schemeClr val="accent1"/>
+          </a:lnRef>
+          <a:fillRef idx="3">
+            <a:schemeClr val="accent1"/>
+          </a:fillRef>
+          <a:effectRef idx="2">
+            <a:schemeClr val="accent1"/>
+          </a:effectRef>
+          <a:fontRef idx="minor">
+            <a:schemeClr val="lt1"/>
+          </a:fontRef>
+        </p:style>
+        <p:txBody>
+          <a:bodyPr lIns="274320" tIns="182880" rIns="274320" bIns="182880" rtlCol="0" anchor="ctr"/>
+          <a:lstStyle/>
+          <a:p>
+            <a:pPr algn="ctr"/>
+            <a:r>
+              <a:rPr lang="en-US" dirty="0" err="1" smtClean="0">
+                <a:solidFill>
+                  <a:srgbClr val="092529"/>
+                </a:solidFill>
+                <a:latin typeface="Consolas" panose="020B0609020204030204" pitchFamily="49" charset="0"/>
+                <a:ea typeface="Proxima Nova" charset="0"/>
+                <a:cs typeface="Proxima Nova" charset="0"/>
+              </a:rPr>
+              <a:t>System.out.println</a:t>
+            </a:r>
+            <a:r>
+              <a:rPr lang="en-US" dirty="0" smtClean="0">
+                <a:solidFill>
+                  <a:srgbClr val="092529"/>
+                </a:solidFill>
+                <a:latin typeface="Consolas" panose="020B0609020204030204" pitchFamily="49" charset="0"/>
+                <a:ea typeface="Proxima Nova" charset="0"/>
+                <a:cs typeface="Proxima Nova" charset="0"/>
+              </a:rPr>
+              <a:t>(</a:t>
+            </a:r>
+            <a:r>
+              <a:rPr lang="en-US" dirty="0" err="1" smtClean="0">
+                <a:solidFill>
+                  <a:srgbClr val="092529"/>
+                </a:solidFill>
+                <a:latin typeface="Consolas" panose="020B0609020204030204" pitchFamily="49" charset="0"/>
+                <a:ea typeface="Proxima Nova" charset="0"/>
+                <a:cs typeface="Proxima Nova" charset="0"/>
+              </a:rPr>
+              <a:t>i</a:t>
+            </a:r>
+            <a:r>
+              <a:rPr lang="en-US" dirty="0" smtClean="0">
+                <a:solidFill>
+                  <a:srgbClr val="092529"/>
+                </a:solidFill>
+                <a:latin typeface="Consolas" panose="020B0609020204030204" pitchFamily="49" charset="0"/>
+                <a:ea typeface="Proxima Nova" charset="0"/>
+                <a:cs typeface="Proxima Nova" charset="0"/>
+              </a:rPr>
+              <a:t>);</a:t>
+            </a:r>
+            <a:endParaRPr lang="en-US" dirty="0">
+              <a:solidFill>
+                <a:srgbClr val="092529"/>
+              </a:solidFill>
+              <a:latin typeface="Consolas" panose="020B0609020204030204" pitchFamily="49" charset="0"/>
+              <a:ea typeface="Proxima Nova" charset="0"/>
+              <a:cs typeface="Proxima Nova" charset="0"/>
+            </a:endParaRPr>
+          </a:p>
+        </p:txBody>
+      </p:sp>
+      <p:sp>
+        <p:nvSpPr>
+          <p:cNvPr id="13" name="Rectangle 12">
+            <a:extLst>
+              <a:ext uri="{FF2B5EF4-FFF2-40B4-BE49-F238E27FC236}">
+                <a16:creationId xmlns:a16="http://schemas.microsoft.com/office/drawing/2014/main" id="{F8083C6D-3634-004D-BE41-F84DFC608329}"/>
+              </a:ext>
+            </a:extLst>
+          </p:cNvPr>
+          <p:cNvSpPr/>
+          <p:nvPr/>
+        </p:nvSpPr>
+        <p:spPr>
+          <a:xfrm>
+            <a:off x="8115420" y="6417472"/>
+            <a:ext cx="4763300" cy="493574"/>
+          </a:xfrm>
+          <a:prstGeom prst="rect">
+            <a:avLst/>
+          </a:prstGeom>
+          <a:noFill/>
+          <a:ln>
+            <a:noFill/>
+          </a:ln>
+          <a:effectLst/>
+        </p:spPr>
+        <p:style>
+          <a:lnRef idx="1">
+            <a:schemeClr val="accent1"/>
+          </a:lnRef>
+          <a:fillRef idx="3">
+            <a:schemeClr val="accent1"/>
+          </a:fillRef>
+          <a:effectRef idx="2">
+            <a:schemeClr val="accent1"/>
+          </a:effectRef>
+          <a:fontRef idx="minor">
+            <a:schemeClr val="lt1"/>
+          </a:fontRef>
+        </p:style>
+        <p:txBody>
+          <a:bodyPr lIns="274320" tIns="182880" rIns="274320" bIns="182880" rtlCol="0" anchor="ctr"/>
+          <a:lstStyle/>
+          <a:p>
+            <a:pPr algn="ctr"/>
+            <a:r>
+              <a:rPr lang="en-US" dirty="0" smtClean="0">
+                <a:solidFill>
+                  <a:srgbClr val="092529"/>
+                </a:solidFill>
+                <a:latin typeface="Consolas" panose="020B0609020204030204" pitchFamily="49" charset="0"/>
+                <a:ea typeface="Proxima Nova" charset="0"/>
+                <a:cs typeface="Proxima Nova" charset="0"/>
+              </a:rPr>
+              <a:t>for(</a:t>
+            </a:r>
+            <a:r>
+              <a:rPr lang="en-US" dirty="0" err="1" smtClean="0">
+                <a:solidFill>
+                  <a:srgbClr val="092529"/>
+                </a:solidFill>
+                <a:latin typeface="Consolas" panose="020B0609020204030204" pitchFamily="49" charset="0"/>
+                <a:ea typeface="Proxima Nova" charset="0"/>
+                <a:cs typeface="Proxima Nova" charset="0"/>
+              </a:rPr>
+              <a:t>int</a:t>
+            </a:r>
+            <a:r>
+              <a:rPr lang="en-US" dirty="0" smtClean="0">
+                <a:solidFill>
+                  <a:srgbClr val="092529"/>
+                </a:solidFill>
+                <a:latin typeface="Consolas" panose="020B0609020204030204" pitchFamily="49" charset="0"/>
+                <a:ea typeface="Proxima Nova" charset="0"/>
+                <a:cs typeface="Proxima Nova" charset="0"/>
+              </a:rPr>
+              <a:t> </a:t>
+            </a:r>
+            <a:r>
+              <a:rPr lang="en-US" dirty="0" err="1" smtClean="0">
+                <a:solidFill>
+                  <a:srgbClr val="092529"/>
+                </a:solidFill>
+                <a:latin typeface="Consolas" panose="020B0609020204030204" pitchFamily="49" charset="0"/>
+                <a:ea typeface="Proxima Nova" charset="0"/>
+                <a:cs typeface="Proxima Nova" charset="0"/>
+              </a:rPr>
+              <a:t>i</a:t>
+            </a:r>
+            <a:r>
+              <a:rPr lang="en-US" dirty="0" smtClean="0">
+                <a:solidFill>
+                  <a:srgbClr val="092529"/>
+                </a:solidFill>
+                <a:latin typeface="Consolas" panose="020B0609020204030204" pitchFamily="49" charset="0"/>
+                <a:ea typeface="Proxima Nova" charset="0"/>
+                <a:cs typeface="Proxima Nova" charset="0"/>
+              </a:rPr>
+              <a:t> = 9; </a:t>
+            </a:r>
+            <a:r>
+              <a:rPr lang="en-US" dirty="0" err="1" smtClean="0">
+                <a:solidFill>
+                  <a:srgbClr val="092529"/>
+                </a:solidFill>
+                <a:latin typeface="Consolas" panose="020B0609020204030204" pitchFamily="49" charset="0"/>
+                <a:ea typeface="Proxima Nova" charset="0"/>
+                <a:cs typeface="Proxima Nova" charset="0"/>
+              </a:rPr>
+              <a:t>i</a:t>
+            </a:r>
+            <a:r>
+              <a:rPr lang="en-US" dirty="0" smtClean="0">
+                <a:solidFill>
+                  <a:srgbClr val="092529"/>
+                </a:solidFill>
+                <a:latin typeface="Consolas" panose="020B0609020204030204" pitchFamily="49" charset="0"/>
+                <a:ea typeface="Proxima Nova" charset="0"/>
+                <a:cs typeface="Proxima Nova" charset="0"/>
+              </a:rPr>
+              <a:t> &gt;=0; </a:t>
+            </a:r>
+            <a:r>
+              <a:rPr lang="en-US" dirty="0" err="1" smtClean="0">
+                <a:solidFill>
+                  <a:srgbClr val="092529"/>
+                </a:solidFill>
+                <a:latin typeface="Consolas" panose="020B0609020204030204" pitchFamily="49" charset="0"/>
+                <a:ea typeface="Proxima Nova" charset="0"/>
+                <a:cs typeface="Proxima Nova" charset="0"/>
+              </a:rPr>
+              <a:t>i</a:t>
+            </a:r>
+            <a:r>
+              <a:rPr lang="en-US" dirty="0" smtClean="0">
+                <a:solidFill>
+                  <a:srgbClr val="092529"/>
+                </a:solidFill>
+                <a:latin typeface="Consolas" panose="020B0609020204030204" pitchFamily="49" charset="0"/>
+                <a:ea typeface="Proxima Nova" charset="0"/>
+                <a:cs typeface="Proxima Nova" charset="0"/>
+              </a:rPr>
+              <a:t>--)</a:t>
+            </a:r>
+            <a:endParaRPr lang="en-US" dirty="0">
+              <a:solidFill>
+                <a:srgbClr val="092529"/>
+              </a:solidFill>
+              <a:latin typeface="Consolas" panose="020B0609020204030204" pitchFamily="49" charset="0"/>
+              <a:ea typeface="Proxima Nova" charset="0"/>
+              <a:cs typeface="Proxima Nova" charset="0"/>
+            </a:endParaRPr>
+          </a:p>
+        </p:txBody>
+      </p:sp>
     </p:spTree>
     <p:extLst>
       <p:ext uri="{BB962C8B-B14F-4D97-AF65-F5344CB8AC3E}">
-        <p14:creationId xmlns:p14="http://schemas.microsoft.com/office/powerpoint/2010/main" val="4045076339"/>
+        <p14:creationId xmlns:p14="http://schemas.microsoft.com/office/powerpoint/2010/main" val="1590345072"/>
       </p:ext>
     </p:extLst>
   </p:cSld>
@@ -10002,7 +13197,7 @@
                             </p:stCondLst>
                             <p:childTnLst>
                               <p:par>
-                                <p:cTn id="5" presetID="9" presetClass="entr" presetSubtype="0" fill="hold" grpId="0" nodeType="clickEffect">
+                                <p:cTn id="5" presetID="1" presetClass="entr" presetSubtype="0" fill="hold" grpId="0" nodeType="clickEffect">
                                   <p:stCondLst>
                                     <p:cond delay="0"/>
                                   </p:stCondLst>
@@ -10015,11 +13210,7 @@
                                           </p:stCondLst>
                                         </p:cTn>
                                         <p:tgtEl>
-                                          <p:spTgt spid="3">
-                                            <p:txEl>
-                                              <p:pRg st="0" end="0"/>
-                                            </p:txEl>
-                                          </p:spTgt>
+                                          <p:spTgt spid="8"/>
                                         </p:tgtEl>
                                         <p:attrNameLst>
                                           <p:attrName>style.visibility</p:attrName>
@@ -10029,18 +13220,6 @@
                                         <p:strVal val="visible"/>
                                       </p:to>
                                     </p:set>
-                                    <p:animEffect transition="in" filter="dissolve">
-                                      <p:cBhvr>
-                                        <p:cTn id="7" dur="500"/>
-                                        <p:tgtEl>
-                                          <p:spTgt spid="3">
-                                            <p:txEl>
-                                              <p:pRg st="0" end="0"/>
-                                            </p:txEl>
-                                          </p:spTgt>
-                                        </p:tgtEl>
-                                      </p:cBhvr>
-                                    </p:animEffect>
                                   </p:childTnLst>
                                 </p:cTn>
                               </p:par>
@@ -10051,36 +13230,32 @@
                     </p:cTn>
                   </p:par>
                   <p:par>
-                    <p:cTn id="8" fill="hold">
+                    <p:cTn id="7" fill="hold">
                       <p:stCondLst>
                         <p:cond delay="indefinite"/>
                       </p:stCondLst>
                       <p:childTnLst>
                         <p:par>
-                          <p:cTn id="9" fill="hold">
+                          <p:cTn id="8" fill="hold">
                             <p:stCondLst>
                               <p:cond delay="0"/>
                             </p:stCondLst>
                             <p:childTnLst>
                               <p:par>
-                                <p:cTn id="10" presetID="9" presetClass="entr" presetSubtype="0" fill="hold" grpId="0" nodeType="clickEffect">
+                                <p:cTn id="9" presetID="1" presetClass="entr" presetSubtype="0" fill="hold" grpId="0" nodeType="clickEffect">
                                   <p:stCondLst>
                                     <p:cond delay="0"/>
                                   </p:stCondLst>
                                   <p:childTnLst>
                                     <p:set>
                                       <p:cBhvr>
-                                        <p:cTn id="11" dur="1" fill="hold">
+                                        <p:cTn id="10" dur="1" fill="hold">
                                           <p:stCondLst>
                                             <p:cond delay="0"/>
                                           </p:stCondLst>
                                         </p:cTn>
                                         <p:tgtEl>
-                                          <p:spTgt spid="3">
-                                            <p:txEl>
-                                              <p:pRg st="1" end="1"/>
-                                            </p:txEl>
-                                          </p:spTgt>
+                                          <p:spTgt spid="9"/>
                                         </p:tgtEl>
                                         <p:attrNameLst>
                                           <p:attrName>style.visibility</p:attrName>
@@ -10090,18 +13265,186 @@
                                         <p:strVal val="visible"/>
                                       </p:to>
                                     </p:set>
-                                    <p:animEffect transition="in" filter="dissolve">
+                                  </p:childTnLst>
+                                </p:cTn>
+                              </p:par>
+                            </p:childTnLst>
+                          </p:cTn>
+                        </p:par>
+                      </p:childTnLst>
+                    </p:cTn>
+                  </p:par>
+                  <p:par>
+                    <p:cTn id="11" fill="hold">
+                      <p:stCondLst>
+                        <p:cond delay="indefinite"/>
+                      </p:stCondLst>
+                      <p:childTnLst>
+                        <p:par>
+                          <p:cTn id="12" fill="hold">
+                            <p:stCondLst>
+                              <p:cond delay="0"/>
+                            </p:stCondLst>
+                            <p:childTnLst>
+                              <p:par>
+                                <p:cTn id="13" presetID="1" presetClass="entr" presetSubtype="0" fill="hold" grpId="0" nodeType="clickEffect">
+                                  <p:stCondLst>
+                                    <p:cond delay="0"/>
+                                  </p:stCondLst>
+                                  <p:childTnLst>
+                                    <p:set>
                                       <p:cBhvr>
-                                        <p:cTn id="12" dur="500"/>
+                                        <p:cTn id="14" dur="1" fill="hold">
+                                          <p:stCondLst>
+                                            <p:cond delay="0"/>
+                                          </p:stCondLst>
+                                        </p:cTn>
                                         <p:tgtEl>
-                                          <p:spTgt spid="3">
-                                            <p:txEl>
-                                              <p:pRg st="1" end="1"/>
-                                            </p:txEl>
-                                          </p:spTgt>
+                                          <p:spTgt spid="10"/>
                                         </p:tgtEl>
+                                        <p:attrNameLst>
+                                          <p:attrName>style.visibility</p:attrName>
+                                        </p:attrNameLst>
                                       </p:cBhvr>
-                                    </p:animEffect>
+                                      <p:to>
+                                        <p:strVal val="visible"/>
+                                      </p:to>
+                                    </p:set>
+                                  </p:childTnLst>
+                                </p:cTn>
+                              </p:par>
+                            </p:childTnLst>
+                          </p:cTn>
+                        </p:par>
+                      </p:childTnLst>
+                    </p:cTn>
+                  </p:par>
+                  <p:par>
+                    <p:cTn id="15" fill="hold">
+                      <p:stCondLst>
+                        <p:cond delay="indefinite"/>
+                      </p:stCondLst>
+                      <p:childTnLst>
+                        <p:par>
+                          <p:cTn id="16" fill="hold">
+                            <p:stCondLst>
+                              <p:cond delay="0"/>
+                            </p:stCondLst>
+                            <p:childTnLst>
+                              <p:par>
+                                <p:cTn id="17" presetID="1" presetClass="entr" presetSubtype="0" fill="hold" grpId="0" nodeType="clickEffect">
+                                  <p:stCondLst>
+                                    <p:cond delay="0"/>
+                                  </p:stCondLst>
+                                  <p:childTnLst>
+                                    <p:set>
+                                      <p:cBhvr>
+                                        <p:cTn id="18" dur="1" fill="hold">
+                                          <p:stCondLst>
+                                            <p:cond delay="0"/>
+                                          </p:stCondLst>
+                                        </p:cTn>
+                                        <p:tgtEl>
+                                          <p:spTgt spid="12"/>
+                                        </p:tgtEl>
+                                        <p:attrNameLst>
+                                          <p:attrName>style.visibility</p:attrName>
+                                        </p:attrNameLst>
+                                      </p:cBhvr>
+                                      <p:to>
+                                        <p:strVal val="visible"/>
+                                      </p:to>
+                                    </p:set>
+                                  </p:childTnLst>
+                                </p:cTn>
+                              </p:par>
+                            </p:childTnLst>
+                          </p:cTn>
+                        </p:par>
+                      </p:childTnLst>
+                    </p:cTn>
+                  </p:par>
+                  <p:par>
+                    <p:cTn id="19" fill="hold">
+                      <p:stCondLst>
+                        <p:cond delay="indefinite"/>
+                      </p:stCondLst>
+                      <p:childTnLst>
+                        <p:par>
+                          <p:cTn id="20" fill="hold">
+                            <p:stCondLst>
+                              <p:cond delay="0"/>
+                            </p:stCondLst>
+                            <p:childTnLst>
+                              <p:par>
+                                <p:cTn id="21" presetID="1" presetClass="entr" presetSubtype="0" fill="hold" grpId="0" nodeType="clickEffect">
+                                  <p:stCondLst>
+                                    <p:cond delay="0"/>
+                                  </p:stCondLst>
+                                  <p:childTnLst>
+                                    <p:set>
+                                      <p:cBhvr>
+                                        <p:cTn id="22" dur="1" fill="hold">
+                                          <p:stCondLst>
+                                            <p:cond delay="0"/>
+                                          </p:stCondLst>
+                                        </p:cTn>
+                                        <p:tgtEl>
+                                          <p:spTgt spid="11"/>
+                                        </p:tgtEl>
+                                        <p:attrNameLst>
+                                          <p:attrName>style.visibility</p:attrName>
+                                        </p:attrNameLst>
+                                      </p:cBhvr>
+                                      <p:to>
+                                        <p:strVal val="visible"/>
+                                      </p:to>
+                                    </p:set>
+                                  </p:childTnLst>
+                                </p:cTn>
+                              </p:par>
+                            </p:childTnLst>
+                          </p:cTn>
+                        </p:par>
+                      </p:childTnLst>
+                    </p:cTn>
+                  </p:par>
+                  <p:par>
+                    <p:cTn id="23" fill="hold">
+                      <p:stCondLst>
+                        <p:cond delay="indefinite"/>
+                      </p:stCondLst>
+                      <p:childTnLst>
+                        <p:par>
+                          <p:cTn id="24" fill="hold">
+                            <p:stCondLst>
+                              <p:cond delay="0"/>
+                            </p:stCondLst>
+                            <p:childTnLst>
+                              <p:par>
+                                <p:cTn id="25" presetID="1" presetClass="entr" presetSubtype="0" fill="hold" grpId="0" nodeType="clickEffect">
+                                  <p:stCondLst>
+                                    <p:cond delay="0"/>
+                                  </p:stCondLst>
+                                  <p:childTnLst>
+                                    <p:set>
+                                      <p:cBhvr>
+                                        <p:cTn id="26" dur="1" fill="hold">
+                                          <p:stCondLst>
+                                            <p:cond delay="0"/>
+                                          </p:stCondLst>
+                                        </p:cTn>
+                                        <p:tgtEl>
+                                          <p:spTgt spid="13"/>
+                                        </p:tgtEl>
+                                        <p:attrNameLst>
+                                          <p:attrName>style.visibility</p:attrName>
+                                        </p:attrNameLst>
+                                      </p:cBhvr>
+                                      <p:to>
+                                        <p:strVal val="visible"/>
+                                      </p:to>
+                                    </p:set>
                                   </p:childTnLst>
                                 </p:cTn>
                               </p:par>
@@ -10133,7 +13476,12 @@
       </p:par>
     </p:tnLst>
     <p:bldLst>
-      <p:bldP spid="3" grpId="0" build="p"/>
+      <p:bldP spid="8" grpId="0" animBg="1"/>
+      <p:bldP spid="9" grpId="0"/>
+      <p:bldP spid="10" grpId="0" animBg="1"/>
+      <p:bldP spid="11" grpId="0" animBg="1"/>
+      <p:bldP spid="12" grpId="0"/>
+      <p:bldP spid="13" grpId="0"/>
     </p:bldLst>
   </p:timing>
 </p:sld>

</xml_diff>

<commit_message>
addd announcement, slight modifications to slides
</commit_message>
<xml_diff>
--- a/slides/On-Campus/03_02_Loops.pptx
+++ b/slides/On-Campus/03_02_Loops.pptx
@@ -226,7 +226,7 @@
           <a:p>
             <a:fld id="{4D7E51A5-B478-1E40-8CBB-0DAA8831E99D}" type="datetimeFigureOut">
               <a:rPr lang="en-US" smtClean="0"/>
-              <a:t>9/8/21</a:t>
+              <a:t>9/10/21</a:t>
             </a:fld>
             <a:endParaRPr lang="en-US"/>
           </a:p>
@@ -391,7 +391,7 @@
           <a:p>
             <a:fld id="{D0ED587F-861E-6740-9643-E3DDAE89B8D6}" type="datetimeFigureOut">
               <a:rPr lang="en-US" smtClean="0"/>
-              <a:t>9/8/21</a:t>
+              <a:t>9/10/21</a:t>
             </a:fld>
             <a:endParaRPr lang="en-US"/>
           </a:p>
@@ -7966,8 +7966,13 @@
           <a:p>
             <a:r>
               <a:rPr lang="en-US" dirty="0"/>
-              <a:t>Code Along</a:t>
-            </a:r>
+              <a:t>Code Along: </a:t>
+            </a:r>
+            <a:r>
+              <a:rPr lang="en-US" dirty="0" err="1"/>
+              <a:t>loopChallenge</a:t>
+            </a:r>
+            <a:endParaRPr lang="en-US" dirty="0"/>
           </a:p>
         </p:txBody>
       </p:sp>
@@ -8019,21 +8024,772 @@
           <a:p>
             <a:r>
               <a:rPr lang="en-US" dirty="0"/>
-              <a:t>What do we need to change in our code if instead of a predefined number we would like to ask for </a:t>
-            </a:r>
-            <a:r>
-              <a:rPr lang="en-US"/>
-              <a:t>the total </a:t>
-            </a:r>
+              <a:t>What do we need to change in our code if instead of a predefined number we would like to ask for the total number of pairs to read?</a:t>
+            </a:r>
+          </a:p>
+        </p:txBody>
+      </p:sp>
+      <p:sp>
+        <p:nvSpPr>
+          <p:cNvPr id="5" name="TextBox 4">
+            <a:extLst>
+              <a:ext uri="{FF2B5EF4-FFF2-40B4-BE49-F238E27FC236}">
+                <a16:creationId xmlns:a16="http://schemas.microsoft.com/office/drawing/2014/main" id="{754DD8F1-928F-DF4F-8960-F95DADAB03E3}"/>
+              </a:ext>
+            </a:extLst>
+          </p:cNvPr>
+          <p:cNvSpPr txBox="1"/>
+          <p:nvPr/>
+        </p:nvSpPr>
+        <p:spPr>
+          <a:xfrm>
+            <a:off x="6171912" y="3569467"/>
+            <a:ext cx="7315202" cy="3754874"/>
+          </a:xfrm>
+          <a:prstGeom prst="rect">
+            <a:avLst/>
+          </a:prstGeom>
+          <a:noFill/>
+        </p:spPr>
+        <p:txBody>
+          <a:bodyPr wrap="square">
+            <a:spAutoFit/>
+          </a:bodyPr>
+          <a:lstStyle/>
+          <a:p>
+            <a:r>
+              <a:rPr lang="en-US" sz="1400" dirty="0">
+                <a:solidFill>
+                  <a:srgbClr val="CC7832"/>
+                </a:solidFill>
+                <a:effectLst/>
+                <a:latin typeface="Consolas" panose="020B0609020204030204" pitchFamily="49" charset="0"/>
+                <a:cs typeface="Consolas" panose="020B0609020204030204" pitchFamily="49" charset="0"/>
+              </a:rPr>
+              <a:t>public class </a:t>
+            </a:r>
+            <a:r>
+              <a:rPr lang="en-US" sz="1400" dirty="0" err="1">
+                <a:latin typeface="Consolas" panose="020B0609020204030204" pitchFamily="49" charset="0"/>
+                <a:cs typeface="Consolas" panose="020B0609020204030204" pitchFamily="49" charset="0"/>
+              </a:rPr>
+              <a:t>InclassExample</a:t>
+            </a:r>
+            <a:r>
+              <a:rPr lang="en-US" sz="1400" dirty="0">
+                <a:latin typeface="Consolas" panose="020B0609020204030204" pitchFamily="49" charset="0"/>
+                <a:cs typeface="Consolas" panose="020B0609020204030204" pitchFamily="49" charset="0"/>
+              </a:rPr>
+              <a:t> {</a:t>
+            </a:r>
+            <a:br>
+              <a:rPr lang="en-US" sz="1400" dirty="0">
+                <a:latin typeface="Consolas" panose="020B0609020204030204" pitchFamily="49" charset="0"/>
+                <a:cs typeface="Consolas" panose="020B0609020204030204" pitchFamily="49" charset="0"/>
+              </a:rPr>
+            </a:br>
+            <a:r>
+              <a:rPr lang="en-US" sz="1400" dirty="0">
+                <a:latin typeface="Consolas" panose="020B0609020204030204" pitchFamily="49" charset="0"/>
+                <a:cs typeface="Consolas" panose="020B0609020204030204" pitchFamily="49" charset="0"/>
+              </a:rPr>
+              <a:t>    Scanner  </a:t>
+            </a:r>
+            <a:r>
+              <a:rPr lang="en-US" sz="1400" dirty="0">
+                <a:solidFill>
+                  <a:srgbClr val="9876AA"/>
+                </a:solidFill>
+                <a:effectLst/>
+                <a:latin typeface="Consolas" panose="020B0609020204030204" pitchFamily="49" charset="0"/>
+                <a:cs typeface="Consolas" panose="020B0609020204030204" pitchFamily="49" charset="0"/>
+              </a:rPr>
+              <a:t>scanner </a:t>
+            </a:r>
+            <a:r>
+              <a:rPr lang="en-US" sz="1400" dirty="0">
+                <a:latin typeface="Consolas" panose="020B0609020204030204" pitchFamily="49" charset="0"/>
+                <a:cs typeface="Consolas" panose="020B0609020204030204" pitchFamily="49" charset="0"/>
+              </a:rPr>
+              <a:t>= </a:t>
+            </a:r>
+            <a:r>
+              <a:rPr lang="en-US" sz="1400" dirty="0">
+                <a:solidFill>
+                  <a:srgbClr val="CC7832"/>
+                </a:solidFill>
+                <a:effectLst/>
+                <a:latin typeface="Consolas" panose="020B0609020204030204" pitchFamily="49" charset="0"/>
+                <a:cs typeface="Consolas" panose="020B0609020204030204" pitchFamily="49" charset="0"/>
+              </a:rPr>
+              <a:t>new </a:t>
+            </a:r>
+            <a:r>
+              <a:rPr lang="en-US" sz="1400" dirty="0">
+                <a:latin typeface="Consolas" panose="020B0609020204030204" pitchFamily="49" charset="0"/>
+                <a:cs typeface="Consolas" panose="020B0609020204030204" pitchFamily="49" charset="0"/>
+              </a:rPr>
+              <a:t>Scanner(</a:t>
+            </a:r>
+            <a:r>
+              <a:rPr lang="en-US" sz="1400" dirty="0" err="1">
+                <a:latin typeface="Consolas" panose="020B0609020204030204" pitchFamily="49" charset="0"/>
+                <a:cs typeface="Consolas" panose="020B0609020204030204" pitchFamily="49" charset="0"/>
+              </a:rPr>
+              <a:t>System.</a:t>
+            </a:r>
+            <a:r>
+              <a:rPr lang="en-US" sz="1400" i="1" dirty="0" err="1">
+                <a:solidFill>
+                  <a:srgbClr val="9876AA"/>
+                </a:solidFill>
+                <a:effectLst/>
+                <a:latin typeface="Consolas" panose="020B0609020204030204" pitchFamily="49" charset="0"/>
+                <a:cs typeface="Consolas" panose="020B0609020204030204" pitchFamily="49" charset="0"/>
+              </a:rPr>
+              <a:t>in</a:t>
+            </a:r>
+            <a:r>
+              <a:rPr lang="en-US" sz="1400" dirty="0">
+                <a:latin typeface="Consolas" panose="020B0609020204030204" pitchFamily="49" charset="0"/>
+                <a:cs typeface="Consolas" panose="020B0609020204030204" pitchFamily="49" charset="0"/>
+              </a:rPr>
+              <a:t>)</a:t>
+            </a:r>
+            <a:r>
+              <a:rPr lang="en-US" sz="1400" dirty="0">
+                <a:solidFill>
+                  <a:srgbClr val="CC7832"/>
+                </a:solidFill>
+                <a:effectLst/>
+                <a:latin typeface="Consolas" panose="020B0609020204030204" pitchFamily="49" charset="0"/>
+                <a:cs typeface="Consolas" panose="020B0609020204030204" pitchFamily="49" charset="0"/>
+              </a:rPr>
+              <a:t>; </a:t>
+            </a:r>
+            <a:r>
+              <a:rPr lang="en-US" sz="1400" dirty="0">
+                <a:solidFill>
+                  <a:srgbClr val="808080"/>
+                </a:solidFill>
+                <a:effectLst/>
+                <a:latin typeface="Consolas" panose="020B0609020204030204" pitchFamily="49" charset="0"/>
+                <a:cs typeface="Consolas" panose="020B0609020204030204" pitchFamily="49" charset="0"/>
+              </a:rPr>
+              <a:t>// instance!</a:t>
+            </a:r>
+            <a:br>
+              <a:rPr lang="en-US" sz="1400" dirty="0">
+                <a:solidFill>
+                  <a:srgbClr val="808080"/>
+                </a:solidFill>
+                <a:effectLst/>
+                <a:latin typeface="Consolas" panose="020B0609020204030204" pitchFamily="49" charset="0"/>
+                <a:cs typeface="Consolas" panose="020B0609020204030204" pitchFamily="49" charset="0"/>
+              </a:rPr>
+            </a:br>
+            <a:br>
+              <a:rPr lang="en-US" sz="1400" dirty="0">
+                <a:solidFill>
+                  <a:srgbClr val="808080"/>
+                </a:solidFill>
+                <a:effectLst/>
+                <a:latin typeface="Consolas" panose="020B0609020204030204" pitchFamily="49" charset="0"/>
+                <a:cs typeface="Consolas" panose="020B0609020204030204" pitchFamily="49" charset="0"/>
+              </a:rPr>
+            </a:br>
+            <a:r>
+              <a:rPr lang="en-US" sz="1400" dirty="0">
+                <a:solidFill>
+                  <a:srgbClr val="808080"/>
+                </a:solidFill>
+                <a:effectLst/>
+                <a:latin typeface="Consolas" panose="020B0609020204030204" pitchFamily="49" charset="0"/>
+                <a:cs typeface="Consolas" panose="020B0609020204030204" pitchFamily="49" charset="0"/>
+              </a:rPr>
+              <a:t>    </a:t>
+            </a:r>
+            <a:r>
+              <a:rPr lang="en-US" sz="1400" dirty="0">
+                <a:solidFill>
+                  <a:srgbClr val="CC7832"/>
+                </a:solidFill>
+                <a:effectLst/>
+                <a:latin typeface="Consolas" panose="020B0609020204030204" pitchFamily="49" charset="0"/>
+                <a:cs typeface="Consolas" panose="020B0609020204030204" pitchFamily="49" charset="0"/>
+              </a:rPr>
+              <a:t>public void </a:t>
+            </a:r>
+            <a:r>
+              <a:rPr lang="en-US" sz="1400" dirty="0" err="1">
+                <a:solidFill>
+                  <a:srgbClr val="FFC66D"/>
+                </a:solidFill>
+                <a:effectLst/>
+                <a:latin typeface="Consolas" panose="020B0609020204030204" pitchFamily="49" charset="0"/>
+                <a:cs typeface="Consolas" panose="020B0609020204030204" pitchFamily="49" charset="0"/>
+              </a:rPr>
+              <a:t>loopChallenge</a:t>
+            </a:r>
+            <a:r>
+              <a:rPr lang="en-US" sz="1400" dirty="0">
+                <a:latin typeface="Consolas" panose="020B0609020204030204" pitchFamily="49" charset="0"/>
+                <a:cs typeface="Consolas" panose="020B0609020204030204" pitchFamily="49" charset="0"/>
+              </a:rPr>
+              <a:t>(){</a:t>
+            </a:r>
+            <a:br>
+              <a:rPr lang="en-US" sz="1400" dirty="0">
+                <a:latin typeface="Consolas" panose="020B0609020204030204" pitchFamily="49" charset="0"/>
+                <a:cs typeface="Consolas" panose="020B0609020204030204" pitchFamily="49" charset="0"/>
+              </a:rPr>
+            </a:br>
+            <a:r>
+              <a:rPr lang="en-US" sz="1400" dirty="0">
+                <a:latin typeface="Consolas" panose="020B0609020204030204" pitchFamily="49" charset="0"/>
+                <a:cs typeface="Consolas" panose="020B0609020204030204" pitchFamily="49" charset="0"/>
+              </a:rPr>
+              <a:t>        </a:t>
+            </a:r>
+            <a:r>
+              <a:rPr lang="en-US" sz="1400" dirty="0">
+                <a:highlight>
+                  <a:srgbClr val="FFFF00"/>
+                </a:highlight>
+                <a:latin typeface="Consolas" panose="020B0609020204030204" pitchFamily="49" charset="0"/>
+                <a:cs typeface="Consolas" panose="020B0609020204030204" pitchFamily="49" charset="0"/>
+              </a:rPr>
+              <a:t>// TODO</a:t>
+            </a:r>
+            <a:br>
+              <a:rPr lang="en-US" sz="1400" dirty="0">
+                <a:latin typeface="Consolas" panose="020B0609020204030204" pitchFamily="49" charset="0"/>
+                <a:cs typeface="Consolas" panose="020B0609020204030204" pitchFamily="49" charset="0"/>
+              </a:rPr>
+            </a:br>
+            <a:r>
+              <a:rPr lang="en-US" sz="1400" dirty="0">
+                <a:latin typeface="Consolas" panose="020B0609020204030204" pitchFamily="49" charset="0"/>
+                <a:cs typeface="Consolas" panose="020B0609020204030204" pitchFamily="49" charset="0"/>
+              </a:rPr>
+              <a:t>    }</a:t>
+            </a:r>
+            <a:br>
+              <a:rPr lang="en-US" sz="1400" dirty="0">
+                <a:latin typeface="Consolas" panose="020B0609020204030204" pitchFamily="49" charset="0"/>
+                <a:cs typeface="Consolas" panose="020B0609020204030204" pitchFamily="49" charset="0"/>
+              </a:rPr>
+            </a:br>
+            <a:r>
+              <a:rPr lang="en-US" sz="1400" dirty="0">
+                <a:latin typeface="Consolas" panose="020B0609020204030204" pitchFamily="49" charset="0"/>
+                <a:cs typeface="Consolas" panose="020B0609020204030204" pitchFamily="49" charset="0"/>
+              </a:rPr>
+              <a:t>    </a:t>
+            </a:r>
+            <a:br>
+              <a:rPr lang="en-US" sz="1400" dirty="0">
+                <a:latin typeface="Consolas" panose="020B0609020204030204" pitchFamily="49" charset="0"/>
+                <a:cs typeface="Consolas" panose="020B0609020204030204" pitchFamily="49" charset="0"/>
+              </a:rPr>
+            </a:br>
+            <a:r>
+              <a:rPr lang="en-US" sz="1400" dirty="0">
+                <a:latin typeface="Consolas" panose="020B0609020204030204" pitchFamily="49" charset="0"/>
+                <a:cs typeface="Consolas" panose="020B0609020204030204" pitchFamily="49" charset="0"/>
+              </a:rPr>
+              <a:t>    </a:t>
+            </a:r>
+            <a:r>
+              <a:rPr lang="en-US" sz="1400" dirty="0">
+                <a:solidFill>
+                  <a:srgbClr val="CC7832"/>
+                </a:solidFill>
+                <a:effectLst/>
+                <a:latin typeface="Consolas" panose="020B0609020204030204" pitchFamily="49" charset="0"/>
+                <a:cs typeface="Consolas" panose="020B0609020204030204" pitchFamily="49" charset="0"/>
+              </a:rPr>
+              <a:t>public int </a:t>
+            </a:r>
+            <a:r>
+              <a:rPr lang="en-US" sz="1400" dirty="0" err="1">
+                <a:solidFill>
+                  <a:srgbClr val="FFC66D"/>
+                </a:solidFill>
+                <a:effectLst/>
+                <a:latin typeface="Consolas" panose="020B0609020204030204" pitchFamily="49" charset="0"/>
+                <a:cs typeface="Consolas" panose="020B0609020204030204" pitchFamily="49" charset="0"/>
+              </a:rPr>
+              <a:t>getInput</a:t>
+            </a:r>
+            <a:r>
+              <a:rPr lang="en-US" sz="1400" dirty="0">
+                <a:latin typeface="Consolas" panose="020B0609020204030204" pitchFamily="49" charset="0"/>
+                <a:cs typeface="Consolas" panose="020B0609020204030204" pitchFamily="49" charset="0"/>
+              </a:rPr>
+              <a:t>()  {</a:t>
+            </a:r>
+            <a:br>
+              <a:rPr lang="en-US" sz="1400" dirty="0">
+                <a:latin typeface="Consolas" panose="020B0609020204030204" pitchFamily="49" charset="0"/>
+                <a:cs typeface="Consolas" panose="020B0609020204030204" pitchFamily="49" charset="0"/>
+              </a:rPr>
+            </a:br>
+            <a:r>
+              <a:rPr lang="en-US" sz="1400" dirty="0">
+                <a:latin typeface="Consolas" panose="020B0609020204030204" pitchFamily="49" charset="0"/>
+                <a:cs typeface="Consolas" panose="020B0609020204030204" pitchFamily="49" charset="0"/>
+              </a:rPr>
+              <a:t>        </a:t>
+            </a:r>
+            <a:r>
+              <a:rPr lang="en-US" sz="1400" dirty="0" err="1">
+                <a:latin typeface="Consolas" panose="020B0609020204030204" pitchFamily="49" charset="0"/>
+                <a:cs typeface="Consolas" panose="020B0609020204030204" pitchFamily="49" charset="0"/>
+              </a:rPr>
+              <a:t>System.</a:t>
+            </a:r>
+            <a:r>
+              <a:rPr lang="en-US" sz="1400" i="1" dirty="0" err="1">
+                <a:solidFill>
+                  <a:srgbClr val="9876AA"/>
+                </a:solidFill>
+                <a:effectLst/>
+                <a:latin typeface="Consolas" panose="020B0609020204030204" pitchFamily="49" charset="0"/>
+                <a:cs typeface="Consolas" panose="020B0609020204030204" pitchFamily="49" charset="0"/>
+              </a:rPr>
+              <a:t>out</a:t>
+            </a:r>
+            <a:r>
+              <a:rPr lang="en-US" sz="1400" dirty="0" err="1">
+                <a:latin typeface="Consolas" panose="020B0609020204030204" pitchFamily="49" charset="0"/>
+                <a:cs typeface="Consolas" panose="020B0609020204030204" pitchFamily="49" charset="0"/>
+              </a:rPr>
+              <a:t>.println</a:t>
+            </a:r>
+            <a:r>
+              <a:rPr lang="en-US" sz="1400" dirty="0">
+                <a:latin typeface="Consolas" panose="020B0609020204030204" pitchFamily="49" charset="0"/>
+                <a:cs typeface="Consolas" panose="020B0609020204030204" pitchFamily="49" charset="0"/>
+              </a:rPr>
+              <a:t>(</a:t>
+            </a:r>
+            <a:r>
+              <a:rPr lang="en-US" sz="1400" dirty="0">
+                <a:solidFill>
+                  <a:srgbClr val="6A8759"/>
+                </a:solidFill>
+                <a:effectLst/>
+                <a:latin typeface="Consolas" panose="020B0609020204030204" pitchFamily="49" charset="0"/>
+                <a:cs typeface="Consolas" panose="020B0609020204030204" pitchFamily="49" charset="0"/>
+              </a:rPr>
+              <a:t>"I need a number? "</a:t>
+            </a:r>
+            <a:r>
+              <a:rPr lang="en-US" sz="1400" dirty="0">
+                <a:latin typeface="Consolas" panose="020B0609020204030204" pitchFamily="49" charset="0"/>
+                <a:cs typeface="Consolas" panose="020B0609020204030204" pitchFamily="49" charset="0"/>
+              </a:rPr>
+              <a:t>)</a:t>
+            </a:r>
+            <a:r>
+              <a:rPr lang="en-US" sz="1400" dirty="0">
+                <a:solidFill>
+                  <a:srgbClr val="CC7832"/>
+                </a:solidFill>
+                <a:effectLst/>
+                <a:latin typeface="Consolas" panose="020B0609020204030204" pitchFamily="49" charset="0"/>
+                <a:cs typeface="Consolas" panose="020B0609020204030204" pitchFamily="49" charset="0"/>
+              </a:rPr>
+              <a:t>;</a:t>
+            </a:r>
+            <a:br>
+              <a:rPr lang="en-US" sz="1400" dirty="0">
+                <a:solidFill>
+                  <a:srgbClr val="CC7832"/>
+                </a:solidFill>
+                <a:effectLst/>
+                <a:latin typeface="Consolas" panose="020B0609020204030204" pitchFamily="49" charset="0"/>
+                <a:cs typeface="Consolas" panose="020B0609020204030204" pitchFamily="49" charset="0"/>
+              </a:rPr>
+            </a:br>
+            <a:r>
+              <a:rPr lang="en-US" sz="1400" dirty="0">
+                <a:solidFill>
+                  <a:srgbClr val="CC7832"/>
+                </a:solidFill>
+                <a:effectLst/>
+                <a:latin typeface="Consolas" panose="020B0609020204030204" pitchFamily="49" charset="0"/>
+                <a:cs typeface="Consolas" panose="020B0609020204030204" pitchFamily="49" charset="0"/>
+              </a:rPr>
+              <a:t>        return </a:t>
+            </a:r>
+            <a:r>
+              <a:rPr lang="en-US" sz="1400" dirty="0" err="1">
+                <a:solidFill>
+                  <a:srgbClr val="9876AA"/>
+                </a:solidFill>
+                <a:effectLst/>
+                <a:latin typeface="Consolas" panose="020B0609020204030204" pitchFamily="49" charset="0"/>
+                <a:cs typeface="Consolas" panose="020B0609020204030204" pitchFamily="49" charset="0"/>
+              </a:rPr>
+              <a:t>scanner</a:t>
+            </a:r>
+            <a:r>
+              <a:rPr lang="en-US" sz="1400" dirty="0" err="1">
+                <a:latin typeface="Consolas" panose="020B0609020204030204" pitchFamily="49" charset="0"/>
+                <a:cs typeface="Consolas" panose="020B0609020204030204" pitchFamily="49" charset="0"/>
+              </a:rPr>
+              <a:t>.nextInt</a:t>
+            </a:r>
+            <a:r>
+              <a:rPr lang="en-US" sz="1400" dirty="0">
+                <a:latin typeface="Consolas" panose="020B0609020204030204" pitchFamily="49" charset="0"/>
+                <a:cs typeface="Consolas" panose="020B0609020204030204" pitchFamily="49" charset="0"/>
+              </a:rPr>
+              <a:t>()</a:t>
+            </a:r>
+            <a:r>
+              <a:rPr lang="en-US" sz="1400" dirty="0">
+                <a:solidFill>
+                  <a:srgbClr val="CC7832"/>
+                </a:solidFill>
+                <a:effectLst/>
+                <a:latin typeface="Consolas" panose="020B0609020204030204" pitchFamily="49" charset="0"/>
+                <a:cs typeface="Consolas" panose="020B0609020204030204" pitchFamily="49" charset="0"/>
+              </a:rPr>
+              <a:t>;</a:t>
+            </a:r>
+            <a:br>
+              <a:rPr lang="en-US" sz="1400" dirty="0">
+                <a:solidFill>
+                  <a:srgbClr val="CC7832"/>
+                </a:solidFill>
+                <a:effectLst/>
+                <a:latin typeface="Consolas" panose="020B0609020204030204" pitchFamily="49" charset="0"/>
+                <a:cs typeface="Consolas" panose="020B0609020204030204" pitchFamily="49" charset="0"/>
+              </a:rPr>
+            </a:br>
+            <a:r>
+              <a:rPr lang="en-US" sz="1400" dirty="0">
+                <a:solidFill>
+                  <a:srgbClr val="CC7832"/>
+                </a:solidFill>
+                <a:effectLst/>
+                <a:latin typeface="Consolas" panose="020B0609020204030204" pitchFamily="49" charset="0"/>
+                <a:cs typeface="Consolas" panose="020B0609020204030204" pitchFamily="49" charset="0"/>
+              </a:rPr>
+              <a:t>    </a:t>
+            </a:r>
+            <a:r>
+              <a:rPr lang="en-US" sz="1400" dirty="0">
+                <a:latin typeface="Consolas" panose="020B0609020204030204" pitchFamily="49" charset="0"/>
+                <a:cs typeface="Consolas" panose="020B0609020204030204" pitchFamily="49" charset="0"/>
+              </a:rPr>
+              <a:t>}</a:t>
+            </a:r>
+            <a:br>
+              <a:rPr lang="en-US" sz="1400" dirty="0">
+                <a:latin typeface="Consolas" panose="020B0609020204030204" pitchFamily="49" charset="0"/>
+                <a:cs typeface="Consolas" panose="020B0609020204030204" pitchFamily="49" charset="0"/>
+              </a:rPr>
+            </a:br>
+            <a:br>
+              <a:rPr lang="en-US" sz="1400" dirty="0">
+                <a:latin typeface="Consolas" panose="020B0609020204030204" pitchFamily="49" charset="0"/>
+                <a:cs typeface="Consolas" panose="020B0609020204030204" pitchFamily="49" charset="0"/>
+              </a:rPr>
+            </a:br>
+            <a:r>
+              <a:rPr lang="en-US" sz="1400" dirty="0">
+                <a:latin typeface="Consolas" panose="020B0609020204030204" pitchFamily="49" charset="0"/>
+                <a:cs typeface="Consolas" panose="020B0609020204030204" pitchFamily="49" charset="0"/>
+              </a:rPr>
+              <a:t>    </a:t>
+            </a:r>
+            <a:r>
+              <a:rPr lang="en-US" sz="1400" dirty="0">
+                <a:solidFill>
+                  <a:srgbClr val="CC7832"/>
+                </a:solidFill>
+                <a:effectLst/>
+                <a:latin typeface="Consolas" panose="020B0609020204030204" pitchFamily="49" charset="0"/>
+                <a:cs typeface="Consolas" panose="020B0609020204030204" pitchFamily="49" charset="0"/>
+              </a:rPr>
+              <a:t>public static void </a:t>
+            </a:r>
+            <a:r>
+              <a:rPr lang="en-US" sz="1400" dirty="0">
+                <a:solidFill>
+                  <a:srgbClr val="FFC66D"/>
+                </a:solidFill>
+                <a:effectLst/>
+                <a:latin typeface="Consolas" panose="020B0609020204030204" pitchFamily="49" charset="0"/>
+                <a:cs typeface="Consolas" panose="020B0609020204030204" pitchFamily="49" charset="0"/>
+              </a:rPr>
+              <a:t>main</a:t>
+            </a:r>
+            <a:r>
+              <a:rPr lang="en-US" sz="1400" dirty="0">
+                <a:latin typeface="Consolas" panose="020B0609020204030204" pitchFamily="49" charset="0"/>
+                <a:cs typeface="Consolas" panose="020B0609020204030204" pitchFamily="49" charset="0"/>
+              </a:rPr>
+              <a:t>(String[] </a:t>
+            </a:r>
+            <a:r>
+              <a:rPr lang="en-US" sz="1400" i="1" dirty="0" err="1">
+                <a:solidFill>
+                  <a:srgbClr val="9876AA"/>
+                </a:solidFill>
+                <a:effectLst/>
+                <a:latin typeface="Consolas" panose="020B0609020204030204" pitchFamily="49" charset="0"/>
+                <a:cs typeface="Consolas" panose="020B0609020204030204" pitchFamily="49" charset="0"/>
+              </a:rPr>
+              <a:t>args</a:t>
+            </a:r>
+            <a:r>
+              <a:rPr lang="en-US" sz="1400" dirty="0">
+                <a:latin typeface="Consolas" panose="020B0609020204030204" pitchFamily="49" charset="0"/>
+                <a:cs typeface="Consolas" panose="020B0609020204030204" pitchFamily="49" charset="0"/>
+              </a:rPr>
+              <a:t>) {</a:t>
+            </a:r>
+            <a:br>
+              <a:rPr lang="en-US" sz="1400" dirty="0">
+                <a:latin typeface="Consolas" panose="020B0609020204030204" pitchFamily="49" charset="0"/>
+                <a:cs typeface="Consolas" panose="020B0609020204030204" pitchFamily="49" charset="0"/>
+              </a:rPr>
+            </a:br>
+            <a:r>
+              <a:rPr lang="en-US" sz="1400" dirty="0">
+                <a:latin typeface="Consolas" panose="020B0609020204030204" pitchFamily="49" charset="0"/>
+                <a:cs typeface="Consolas" panose="020B0609020204030204" pitchFamily="49" charset="0"/>
+              </a:rPr>
+              <a:t>      </a:t>
+            </a:r>
+            <a:r>
+              <a:rPr lang="en-US" sz="1400" dirty="0" err="1">
+                <a:latin typeface="Consolas" panose="020B0609020204030204" pitchFamily="49" charset="0"/>
+                <a:cs typeface="Consolas" panose="020B0609020204030204" pitchFamily="49" charset="0"/>
+              </a:rPr>
+              <a:t>InclassExample</a:t>
+            </a:r>
+            <a:r>
+              <a:rPr lang="en-US" sz="1400" dirty="0">
+                <a:latin typeface="Consolas" panose="020B0609020204030204" pitchFamily="49" charset="0"/>
+                <a:cs typeface="Consolas" panose="020B0609020204030204" pitchFamily="49" charset="0"/>
+              </a:rPr>
+              <a:t> </a:t>
+            </a:r>
+            <a:r>
+              <a:rPr lang="en-US" sz="1400" i="1" dirty="0">
+                <a:solidFill>
+                  <a:srgbClr val="9876AA"/>
+                </a:solidFill>
+                <a:effectLst/>
+                <a:latin typeface="Consolas" panose="020B0609020204030204" pitchFamily="49" charset="0"/>
+                <a:cs typeface="Consolas" panose="020B0609020204030204" pitchFamily="49" charset="0"/>
+              </a:rPr>
+              <a:t>example </a:t>
+            </a:r>
+            <a:r>
+              <a:rPr lang="en-US" sz="1400" dirty="0">
+                <a:latin typeface="Consolas" panose="020B0609020204030204" pitchFamily="49" charset="0"/>
+                <a:cs typeface="Consolas" panose="020B0609020204030204" pitchFamily="49" charset="0"/>
+              </a:rPr>
+              <a:t>=  </a:t>
+            </a:r>
+            <a:r>
+              <a:rPr lang="en-US" sz="1400" dirty="0">
+                <a:solidFill>
+                  <a:srgbClr val="CC7832"/>
+                </a:solidFill>
+                <a:effectLst/>
+                <a:latin typeface="Consolas" panose="020B0609020204030204" pitchFamily="49" charset="0"/>
+                <a:cs typeface="Consolas" panose="020B0609020204030204" pitchFamily="49" charset="0"/>
+              </a:rPr>
+              <a:t>new </a:t>
+            </a:r>
+            <a:r>
+              <a:rPr lang="en-US" sz="1400" dirty="0" err="1">
+                <a:latin typeface="Consolas" panose="020B0609020204030204" pitchFamily="49" charset="0"/>
+                <a:cs typeface="Consolas" panose="020B0609020204030204" pitchFamily="49" charset="0"/>
+              </a:rPr>
+              <a:t>InclassExample</a:t>
+            </a:r>
+            <a:r>
+              <a:rPr lang="en-US" sz="1400" dirty="0">
+                <a:latin typeface="Consolas" panose="020B0609020204030204" pitchFamily="49" charset="0"/>
+                <a:cs typeface="Consolas" panose="020B0609020204030204" pitchFamily="49" charset="0"/>
+              </a:rPr>
+              <a:t>()</a:t>
+            </a:r>
+            <a:r>
+              <a:rPr lang="en-US" sz="1400" dirty="0">
+                <a:solidFill>
+                  <a:srgbClr val="CC7832"/>
+                </a:solidFill>
+                <a:effectLst/>
+                <a:latin typeface="Consolas" panose="020B0609020204030204" pitchFamily="49" charset="0"/>
+                <a:cs typeface="Consolas" panose="020B0609020204030204" pitchFamily="49" charset="0"/>
+              </a:rPr>
+              <a:t>;</a:t>
+            </a:r>
+            <a:br>
+              <a:rPr lang="en-US" sz="1400" dirty="0">
+                <a:solidFill>
+                  <a:srgbClr val="CC7832"/>
+                </a:solidFill>
+                <a:effectLst/>
+                <a:latin typeface="Consolas" panose="020B0609020204030204" pitchFamily="49" charset="0"/>
+                <a:cs typeface="Consolas" panose="020B0609020204030204" pitchFamily="49" charset="0"/>
+              </a:rPr>
+            </a:br>
+            <a:r>
+              <a:rPr lang="en-US" sz="1400" dirty="0">
+                <a:solidFill>
+                  <a:srgbClr val="CC7832"/>
+                </a:solidFill>
+                <a:effectLst/>
+                <a:latin typeface="Consolas" panose="020B0609020204030204" pitchFamily="49" charset="0"/>
+                <a:cs typeface="Consolas" panose="020B0609020204030204" pitchFamily="49" charset="0"/>
+              </a:rPr>
+              <a:t>      </a:t>
+            </a:r>
+            <a:r>
+              <a:rPr lang="en-US" sz="1400" i="1" dirty="0" err="1">
+                <a:solidFill>
+                  <a:srgbClr val="9876AA"/>
+                </a:solidFill>
+                <a:effectLst/>
+                <a:latin typeface="Consolas" panose="020B0609020204030204" pitchFamily="49" charset="0"/>
+                <a:cs typeface="Consolas" panose="020B0609020204030204" pitchFamily="49" charset="0"/>
+              </a:rPr>
+              <a:t>example</a:t>
+            </a:r>
+            <a:r>
+              <a:rPr lang="en-US" sz="1400" dirty="0" err="1">
+                <a:latin typeface="Consolas" panose="020B0609020204030204" pitchFamily="49" charset="0"/>
+                <a:cs typeface="Consolas" panose="020B0609020204030204" pitchFamily="49" charset="0"/>
+              </a:rPr>
+              <a:t>.loopChallenge</a:t>
+            </a:r>
+            <a:r>
+              <a:rPr lang="en-US" sz="1400" dirty="0">
+                <a:latin typeface="Consolas" panose="020B0609020204030204" pitchFamily="49" charset="0"/>
+                <a:cs typeface="Consolas" panose="020B0609020204030204" pitchFamily="49" charset="0"/>
+              </a:rPr>
+              <a:t>()</a:t>
+            </a:r>
+            <a:r>
+              <a:rPr lang="en-US" sz="1400" dirty="0">
+                <a:solidFill>
+                  <a:srgbClr val="CC7832"/>
+                </a:solidFill>
+                <a:effectLst/>
+                <a:latin typeface="Consolas" panose="020B0609020204030204" pitchFamily="49" charset="0"/>
+                <a:cs typeface="Consolas" panose="020B0609020204030204" pitchFamily="49" charset="0"/>
+              </a:rPr>
+              <a:t>; </a:t>
+            </a:r>
+            <a:r>
+              <a:rPr lang="en-US" sz="1400" dirty="0">
+                <a:solidFill>
+                  <a:srgbClr val="808080"/>
+                </a:solidFill>
+                <a:effectLst/>
+                <a:latin typeface="Consolas" panose="020B0609020204030204" pitchFamily="49" charset="0"/>
+                <a:cs typeface="Consolas" panose="020B0609020204030204" pitchFamily="49" charset="0"/>
+              </a:rPr>
+              <a:t>// because I  need scanner! </a:t>
+            </a:r>
+            <a:br>
+              <a:rPr lang="en-US" sz="1400" dirty="0">
+                <a:solidFill>
+                  <a:srgbClr val="808080"/>
+                </a:solidFill>
+                <a:effectLst/>
+                <a:latin typeface="Consolas" panose="020B0609020204030204" pitchFamily="49" charset="0"/>
+                <a:cs typeface="Consolas" panose="020B0609020204030204" pitchFamily="49" charset="0"/>
+              </a:rPr>
+            </a:br>
+            <a:r>
+              <a:rPr lang="en-US" sz="1400" dirty="0">
+                <a:solidFill>
+                  <a:srgbClr val="808080"/>
+                </a:solidFill>
+                <a:effectLst/>
+                <a:latin typeface="Consolas" panose="020B0609020204030204" pitchFamily="49" charset="0"/>
+                <a:cs typeface="Consolas" panose="020B0609020204030204" pitchFamily="49" charset="0"/>
+              </a:rPr>
+              <a:t>    </a:t>
+            </a:r>
+            <a:r>
+              <a:rPr lang="en-US" sz="1400" dirty="0">
+                <a:latin typeface="Consolas" panose="020B0609020204030204" pitchFamily="49" charset="0"/>
+                <a:cs typeface="Consolas" panose="020B0609020204030204" pitchFamily="49" charset="0"/>
+              </a:rPr>
+              <a:t>}    </a:t>
+            </a:r>
+            <a:br>
+              <a:rPr lang="en-US" sz="1400" dirty="0">
+                <a:latin typeface="Consolas" panose="020B0609020204030204" pitchFamily="49" charset="0"/>
+                <a:cs typeface="Consolas" panose="020B0609020204030204" pitchFamily="49" charset="0"/>
+              </a:rPr>
+            </a:br>
+            <a:r>
+              <a:rPr lang="en-US" sz="1400" dirty="0">
+                <a:latin typeface="Consolas" panose="020B0609020204030204" pitchFamily="49" charset="0"/>
+                <a:cs typeface="Consolas" panose="020B0609020204030204" pitchFamily="49" charset="0"/>
+              </a:rPr>
+              <a:t>}</a:t>
+            </a:r>
+          </a:p>
+        </p:txBody>
+      </p:sp>
+      <p:sp>
+        <p:nvSpPr>
+          <p:cNvPr id="6" name="TextBox 5">
+            <a:extLst>
+              <a:ext uri="{FF2B5EF4-FFF2-40B4-BE49-F238E27FC236}">
+                <a16:creationId xmlns:a16="http://schemas.microsoft.com/office/drawing/2014/main" id="{AE4C5429-F0DD-ED4D-9833-DCECB23289E0}"/>
+              </a:ext>
+            </a:extLst>
+          </p:cNvPr>
+          <p:cNvSpPr txBox="1"/>
+          <p:nvPr/>
+        </p:nvSpPr>
+        <p:spPr>
+          <a:xfrm>
+            <a:off x="2957689" y="5012267"/>
+            <a:ext cx="3065776" cy="707886"/>
+          </a:xfrm>
+          <a:prstGeom prst="rect">
+            <a:avLst/>
+          </a:prstGeom>
+          <a:noFill/>
+        </p:spPr>
+        <p:txBody>
+          <a:bodyPr wrap="none" rtlCol="0">
+            <a:spAutoFit/>
+          </a:bodyPr>
+          <a:lstStyle/>
+          <a:p>
             <a:r>
               <a:rPr lang="en-US" dirty="0"/>
-              <a:t>number </a:t>
-            </a:r>
-            <a:r>
-              <a:rPr lang="en-US"/>
-              <a:t>of pairs to read?</a:t>
+              <a:t>You can assume </a:t>
+            </a:r>
+            <a:r>
+              <a:rPr lang="en-US" dirty="0" err="1"/>
+              <a:t>getInput</a:t>
             </a:r>
             <a:endParaRPr lang="en-US" dirty="0"/>
+          </a:p>
+          <a:p>
+            <a:r>
+              <a:rPr lang="en-US" dirty="0"/>
+              <a:t>Only focus on the TODO</a:t>
+            </a:r>
           </a:p>
         </p:txBody>
       </p:sp>
@@ -8269,7 +9025,7 @@
         <p:spPr>
           <a:xfrm>
             <a:off x="5802489" y="174561"/>
-            <a:ext cx="7880153" cy="400110"/>
+            <a:ext cx="7880153" cy="1015663"/>
           </a:xfrm>
           <a:prstGeom prst="rect">
             <a:avLst/>
@@ -8287,6 +9043,12 @@
             <a:r>
               <a:rPr lang="en-US" b="1" dirty="0"/>
               <a:t>Opening Question</a:t>
+            </a:r>
+          </a:p>
+          <a:p>
+            <a:r>
+              <a:rPr lang="en-US" dirty="0"/>
+              <a:t>Can you think of a repetitive task? Is there a way to use tech to make that task easier?</a:t>
             </a:r>
           </a:p>
         </p:txBody>
@@ -13050,7 +13812,7 @@
                 <a:ea typeface="Proxima Nova" charset="0"/>
                 <a:cs typeface="Proxima Nova" charset="0"/>
               </a:rPr>
-              <a:t>What do we need to change to print the numbers in the inverse order?</a:t>
+              <a:t>What do we need to change to print the numbers in the reverse order?</a:t>
             </a:r>
           </a:p>
         </p:txBody>

</xml_diff>

<commit_message>
update for wed lecture
</commit_message>
<xml_diff>
--- a/slides/On-Campus/03_02_Loops.pptx
+++ b/slides/On-Campus/03_02_Loops.pptx
@@ -12,7 +12,7 @@
   </p:handoutMasterIdLst>
   <p:sldIdLst>
     <p:sldId id="256" r:id="rId2"/>
-    <p:sldId id="269" r:id="rId3"/>
+    <p:sldId id="270" r:id="rId3"/>
     <p:sldId id="257" r:id="rId4"/>
     <p:sldId id="258" r:id="rId5"/>
     <p:sldId id="265" r:id="rId6"/>
@@ -226,7 +226,7 @@
           <a:p>
             <a:fld id="{4D7E51A5-B478-1E40-8CBB-0DAA8831E99D}" type="datetimeFigureOut">
               <a:rPr lang="en-US" smtClean="0"/>
-              <a:t>9/10/21</a:t>
+              <a:t>1/30/2022</a:t>
             </a:fld>
             <a:endParaRPr lang="en-US"/>
           </a:p>
@@ -391,7 +391,7 @@
           <a:p>
             <a:fld id="{D0ED587F-861E-6740-9643-E3DDAE89B8D6}" type="datetimeFigureOut">
               <a:rPr lang="en-US" smtClean="0"/>
-              <a:t>9/10/21</a:t>
+              <a:t>1/30/2022</a:t>
             </a:fld>
             <a:endParaRPr lang="en-US"/>
           </a:p>
@@ -6755,7 +6755,7 @@
           <a:p>
             <a:r>
               <a:rPr lang="en-US" dirty="0"/>
-              <a:t>Activity</a:t>
+              <a:t>In Class Activity – Loop Practice</a:t>
             </a:r>
           </a:p>
         </p:txBody>
@@ -7966,13 +7966,8 @@
           <a:p>
             <a:r>
               <a:rPr lang="en-US" dirty="0"/>
-              <a:t>Code Along: </a:t>
-            </a:r>
-            <a:r>
-              <a:rPr lang="en-US" dirty="0" err="1"/>
-              <a:t>loopChallenge</a:t>
-            </a:r>
-            <a:endParaRPr lang="en-US" dirty="0"/>
+              <a:t>Code Along: loop Practice</a:t>
+            </a:r>
           </a:p>
         </p:txBody>
       </p:sp>
@@ -7995,7 +7990,7 @@
         <p:spPr>
           <a:xfrm>
             <a:off x="628075" y="1731645"/>
-            <a:ext cx="11087675" cy="2154436"/>
+            <a:ext cx="11087675" cy="1716432"/>
           </a:xfrm>
         </p:spPr>
         <p:txBody>
@@ -8004,792 +7999,41 @@
           <a:p>
             <a:r>
               <a:rPr lang="en-US" dirty="0"/>
-              <a:t>Write a program that reads 5 pairs (value1, value2) of </a:t>
+              <a:t>Back to Canvas / </a:t>
             </a:r>
             <a:r>
               <a:rPr lang="en-US" dirty="0" err="1"/>
-              <a:t>int</a:t>
+              <a:t>Zybooks</a:t>
             </a:r>
             <a:r>
               <a:rPr lang="en-US" dirty="0"/>
-              <a:t> values. For each pair print the smaller value. If the values are equal, print "equals" and the number.</a:t>
+              <a:t> – work on Activity 2 the number game.</a:t>
             </a:r>
           </a:p>
           <a:p>
             <a:r>
               <a:rPr lang="en-US" dirty="0"/>
-              <a:t>What do we need to change in our code if instead of 5 we want 100 pairs?</a:t>
-            </a:r>
-          </a:p>
-          <a:p>
+              <a:t>One person codes, the rests assists in the coding</a:t>
+            </a:r>
+          </a:p>
+          <a:p>
+            <a:pPr lvl="1"/>
             <a:r>
               <a:rPr lang="en-US" dirty="0"/>
-              <a:t>What do we need to change in our code if instead of a predefined number we would like to ask for the total number of pairs to read?</a:t>
-            </a:r>
-          </a:p>
-        </p:txBody>
-      </p:sp>
-      <p:sp>
-        <p:nvSpPr>
-          <p:cNvPr id="5" name="TextBox 4">
-            <a:extLst>
-              <a:ext uri="{FF2B5EF4-FFF2-40B4-BE49-F238E27FC236}">
-                <a16:creationId xmlns:a16="http://schemas.microsoft.com/office/drawing/2014/main" id="{754DD8F1-928F-DF4F-8960-F95DADAB03E3}"/>
-              </a:ext>
-            </a:extLst>
-          </p:cNvPr>
-          <p:cNvSpPr txBox="1"/>
-          <p:nvPr/>
-        </p:nvSpPr>
-        <p:spPr>
-          <a:xfrm>
-            <a:off x="6171912" y="3569467"/>
-            <a:ext cx="7315202" cy="3754874"/>
-          </a:xfrm>
-          <a:prstGeom prst="rect">
-            <a:avLst/>
-          </a:prstGeom>
-          <a:noFill/>
-        </p:spPr>
-        <p:txBody>
-          <a:bodyPr wrap="square">
-            <a:spAutoFit/>
-          </a:bodyPr>
-          <a:lstStyle/>
-          <a:p>
-            <a:r>
-              <a:rPr lang="en-US" sz="1400" dirty="0">
-                <a:solidFill>
-                  <a:srgbClr val="CC7832"/>
-                </a:solidFill>
-                <a:effectLst/>
-                <a:latin typeface="Consolas" panose="020B0609020204030204" pitchFamily="49" charset="0"/>
-                <a:cs typeface="Consolas" panose="020B0609020204030204" pitchFamily="49" charset="0"/>
-              </a:rPr>
-              <a:t>public class </a:t>
-            </a:r>
-            <a:r>
-              <a:rPr lang="en-US" sz="1400" dirty="0" err="1">
-                <a:latin typeface="Consolas" panose="020B0609020204030204" pitchFamily="49" charset="0"/>
-                <a:cs typeface="Consolas" panose="020B0609020204030204" pitchFamily="49" charset="0"/>
-              </a:rPr>
-              <a:t>InclassExample</a:t>
-            </a:r>
-            <a:r>
-              <a:rPr lang="en-US" sz="1400" dirty="0">
-                <a:latin typeface="Consolas" panose="020B0609020204030204" pitchFamily="49" charset="0"/>
-                <a:cs typeface="Consolas" panose="020B0609020204030204" pitchFamily="49" charset="0"/>
-              </a:rPr>
-              <a:t> {</a:t>
-            </a:r>
-            <a:br>
-              <a:rPr lang="en-US" sz="1400" dirty="0">
-                <a:latin typeface="Consolas" panose="020B0609020204030204" pitchFamily="49" charset="0"/>
-                <a:cs typeface="Consolas" panose="020B0609020204030204" pitchFamily="49" charset="0"/>
-              </a:rPr>
-            </a:br>
-            <a:r>
-              <a:rPr lang="en-US" sz="1400" dirty="0">
-                <a:latin typeface="Consolas" panose="020B0609020204030204" pitchFamily="49" charset="0"/>
-                <a:cs typeface="Consolas" panose="020B0609020204030204" pitchFamily="49" charset="0"/>
-              </a:rPr>
-              <a:t>    Scanner  </a:t>
-            </a:r>
-            <a:r>
-              <a:rPr lang="en-US" sz="1400" dirty="0">
-                <a:solidFill>
-                  <a:srgbClr val="9876AA"/>
-                </a:solidFill>
-                <a:effectLst/>
-                <a:latin typeface="Consolas" panose="020B0609020204030204" pitchFamily="49" charset="0"/>
-                <a:cs typeface="Consolas" panose="020B0609020204030204" pitchFamily="49" charset="0"/>
-              </a:rPr>
-              <a:t>scanner </a:t>
-            </a:r>
-            <a:r>
-              <a:rPr lang="en-US" sz="1400" dirty="0">
-                <a:latin typeface="Consolas" panose="020B0609020204030204" pitchFamily="49" charset="0"/>
-                <a:cs typeface="Consolas" panose="020B0609020204030204" pitchFamily="49" charset="0"/>
-              </a:rPr>
-              <a:t>= </a:t>
-            </a:r>
-            <a:r>
-              <a:rPr lang="en-US" sz="1400" dirty="0">
-                <a:solidFill>
-                  <a:srgbClr val="CC7832"/>
-                </a:solidFill>
-                <a:effectLst/>
-                <a:latin typeface="Consolas" panose="020B0609020204030204" pitchFamily="49" charset="0"/>
-                <a:cs typeface="Consolas" panose="020B0609020204030204" pitchFamily="49" charset="0"/>
-              </a:rPr>
-              <a:t>new </a:t>
-            </a:r>
-            <a:r>
-              <a:rPr lang="en-US" sz="1400" dirty="0">
-                <a:latin typeface="Consolas" panose="020B0609020204030204" pitchFamily="49" charset="0"/>
-                <a:cs typeface="Consolas" panose="020B0609020204030204" pitchFamily="49" charset="0"/>
-              </a:rPr>
-              <a:t>Scanner(</a:t>
-            </a:r>
-            <a:r>
-              <a:rPr lang="en-US" sz="1400" dirty="0" err="1">
-                <a:latin typeface="Consolas" panose="020B0609020204030204" pitchFamily="49" charset="0"/>
-                <a:cs typeface="Consolas" panose="020B0609020204030204" pitchFamily="49" charset="0"/>
-              </a:rPr>
-              <a:t>System.</a:t>
-            </a:r>
-            <a:r>
-              <a:rPr lang="en-US" sz="1400" i="1" dirty="0" err="1">
-                <a:solidFill>
-                  <a:srgbClr val="9876AA"/>
-                </a:solidFill>
-                <a:effectLst/>
-                <a:latin typeface="Consolas" panose="020B0609020204030204" pitchFamily="49" charset="0"/>
-                <a:cs typeface="Consolas" panose="020B0609020204030204" pitchFamily="49" charset="0"/>
-              </a:rPr>
-              <a:t>in</a:t>
-            </a:r>
-            <a:r>
-              <a:rPr lang="en-US" sz="1400" dirty="0">
-                <a:latin typeface="Consolas" panose="020B0609020204030204" pitchFamily="49" charset="0"/>
-                <a:cs typeface="Consolas" panose="020B0609020204030204" pitchFamily="49" charset="0"/>
-              </a:rPr>
-              <a:t>)</a:t>
-            </a:r>
-            <a:r>
-              <a:rPr lang="en-US" sz="1400" dirty="0">
-                <a:solidFill>
-                  <a:srgbClr val="CC7832"/>
-                </a:solidFill>
-                <a:effectLst/>
-                <a:latin typeface="Consolas" panose="020B0609020204030204" pitchFamily="49" charset="0"/>
-                <a:cs typeface="Consolas" panose="020B0609020204030204" pitchFamily="49" charset="0"/>
-              </a:rPr>
-              <a:t>; </a:t>
-            </a:r>
-            <a:r>
-              <a:rPr lang="en-US" sz="1400" dirty="0">
-                <a:solidFill>
-                  <a:srgbClr val="808080"/>
-                </a:solidFill>
-                <a:effectLst/>
-                <a:latin typeface="Consolas" panose="020B0609020204030204" pitchFamily="49" charset="0"/>
-                <a:cs typeface="Consolas" panose="020B0609020204030204" pitchFamily="49" charset="0"/>
-              </a:rPr>
-              <a:t>// instance!</a:t>
-            </a:r>
-            <a:br>
-              <a:rPr lang="en-US" sz="1400" dirty="0">
-                <a:solidFill>
-                  <a:srgbClr val="808080"/>
-                </a:solidFill>
-                <a:effectLst/>
-                <a:latin typeface="Consolas" panose="020B0609020204030204" pitchFamily="49" charset="0"/>
-                <a:cs typeface="Consolas" panose="020B0609020204030204" pitchFamily="49" charset="0"/>
-              </a:rPr>
-            </a:br>
-            <a:br>
-              <a:rPr lang="en-US" sz="1400" dirty="0">
-                <a:solidFill>
-                  <a:srgbClr val="808080"/>
-                </a:solidFill>
-                <a:effectLst/>
-                <a:latin typeface="Consolas" panose="020B0609020204030204" pitchFamily="49" charset="0"/>
-                <a:cs typeface="Consolas" panose="020B0609020204030204" pitchFamily="49" charset="0"/>
-              </a:rPr>
-            </a:br>
-            <a:r>
-              <a:rPr lang="en-US" sz="1400" dirty="0">
-                <a:solidFill>
-                  <a:srgbClr val="808080"/>
-                </a:solidFill>
-                <a:effectLst/>
-                <a:latin typeface="Consolas" panose="020B0609020204030204" pitchFamily="49" charset="0"/>
-                <a:cs typeface="Consolas" panose="020B0609020204030204" pitchFamily="49" charset="0"/>
-              </a:rPr>
-              <a:t>    </a:t>
-            </a:r>
-            <a:r>
-              <a:rPr lang="en-US" sz="1400" dirty="0">
-                <a:solidFill>
-                  <a:srgbClr val="CC7832"/>
-                </a:solidFill>
-                <a:effectLst/>
-                <a:latin typeface="Consolas" panose="020B0609020204030204" pitchFamily="49" charset="0"/>
-                <a:cs typeface="Consolas" panose="020B0609020204030204" pitchFamily="49" charset="0"/>
-              </a:rPr>
-              <a:t>public void </a:t>
-            </a:r>
-            <a:r>
-              <a:rPr lang="en-US" sz="1400" dirty="0" err="1">
-                <a:solidFill>
-                  <a:srgbClr val="FFC66D"/>
-                </a:solidFill>
-                <a:effectLst/>
-                <a:latin typeface="Consolas" panose="020B0609020204030204" pitchFamily="49" charset="0"/>
-                <a:cs typeface="Consolas" panose="020B0609020204030204" pitchFamily="49" charset="0"/>
-              </a:rPr>
-              <a:t>loopChallenge</a:t>
-            </a:r>
-            <a:r>
-              <a:rPr lang="en-US" sz="1400" dirty="0">
-                <a:latin typeface="Consolas" panose="020B0609020204030204" pitchFamily="49" charset="0"/>
-                <a:cs typeface="Consolas" panose="020B0609020204030204" pitchFamily="49" charset="0"/>
-              </a:rPr>
-              <a:t>(){</a:t>
-            </a:r>
-            <a:br>
-              <a:rPr lang="en-US" sz="1400" dirty="0">
-                <a:latin typeface="Consolas" panose="020B0609020204030204" pitchFamily="49" charset="0"/>
-                <a:cs typeface="Consolas" panose="020B0609020204030204" pitchFamily="49" charset="0"/>
-              </a:rPr>
-            </a:br>
-            <a:r>
-              <a:rPr lang="en-US" sz="1400" dirty="0">
-                <a:latin typeface="Consolas" panose="020B0609020204030204" pitchFamily="49" charset="0"/>
-                <a:cs typeface="Consolas" panose="020B0609020204030204" pitchFamily="49" charset="0"/>
-              </a:rPr>
-              <a:t>        </a:t>
-            </a:r>
-            <a:r>
-              <a:rPr lang="en-US" sz="1400" dirty="0">
-                <a:highlight>
-                  <a:srgbClr val="FFFF00"/>
-                </a:highlight>
-                <a:latin typeface="Consolas" panose="020B0609020204030204" pitchFamily="49" charset="0"/>
-                <a:cs typeface="Consolas" panose="020B0609020204030204" pitchFamily="49" charset="0"/>
-              </a:rPr>
-              <a:t>// TODO</a:t>
-            </a:r>
-            <a:br>
-              <a:rPr lang="en-US" sz="1400" dirty="0">
-                <a:latin typeface="Consolas" panose="020B0609020204030204" pitchFamily="49" charset="0"/>
-                <a:cs typeface="Consolas" panose="020B0609020204030204" pitchFamily="49" charset="0"/>
-              </a:rPr>
-            </a:br>
-            <a:r>
-              <a:rPr lang="en-US" sz="1400" dirty="0">
-                <a:latin typeface="Consolas" panose="020B0609020204030204" pitchFamily="49" charset="0"/>
-                <a:cs typeface="Consolas" panose="020B0609020204030204" pitchFamily="49" charset="0"/>
-              </a:rPr>
-              <a:t>    }</a:t>
-            </a:r>
-            <a:br>
-              <a:rPr lang="en-US" sz="1400" dirty="0">
-                <a:latin typeface="Consolas" panose="020B0609020204030204" pitchFamily="49" charset="0"/>
-                <a:cs typeface="Consolas" panose="020B0609020204030204" pitchFamily="49" charset="0"/>
-              </a:rPr>
-            </a:br>
-            <a:r>
-              <a:rPr lang="en-US" sz="1400" dirty="0">
-                <a:latin typeface="Consolas" panose="020B0609020204030204" pitchFamily="49" charset="0"/>
-                <a:cs typeface="Consolas" panose="020B0609020204030204" pitchFamily="49" charset="0"/>
-              </a:rPr>
-              <a:t>    </a:t>
-            </a:r>
-            <a:br>
-              <a:rPr lang="en-US" sz="1400" dirty="0">
-                <a:latin typeface="Consolas" panose="020B0609020204030204" pitchFamily="49" charset="0"/>
-                <a:cs typeface="Consolas" panose="020B0609020204030204" pitchFamily="49" charset="0"/>
-              </a:rPr>
-            </a:br>
-            <a:r>
-              <a:rPr lang="en-US" sz="1400" dirty="0">
-                <a:latin typeface="Consolas" panose="020B0609020204030204" pitchFamily="49" charset="0"/>
-                <a:cs typeface="Consolas" panose="020B0609020204030204" pitchFamily="49" charset="0"/>
-              </a:rPr>
-              <a:t>    </a:t>
-            </a:r>
-            <a:r>
-              <a:rPr lang="en-US" sz="1400" dirty="0">
-                <a:solidFill>
-                  <a:srgbClr val="CC7832"/>
-                </a:solidFill>
-                <a:effectLst/>
-                <a:latin typeface="Consolas" panose="020B0609020204030204" pitchFamily="49" charset="0"/>
-                <a:cs typeface="Consolas" panose="020B0609020204030204" pitchFamily="49" charset="0"/>
-              </a:rPr>
-              <a:t>public int </a:t>
-            </a:r>
-            <a:r>
-              <a:rPr lang="en-US" sz="1400" dirty="0" err="1">
-                <a:solidFill>
-                  <a:srgbClr val="FFC66D"/>
-                </a:solidFill>
-                <a:effectLst/>
-                <a:latin typeface="Consolas" panose="020B0609020204030204" pitchFamily="49" charset="0"/>
-                <a:cs typeface="Consolas" panose="020B0609020204030204" pitchFamily="49" charset="0"/>
-              </a:rPr>
-              <a:t>getInput</a:t>
-            </a:r>
-            <a:r>
-              <a:rPr lang="en-US" sz="1400" dirty="0">
-                <a:latin typeface="Consolas" panose="020B0609020204030204" pitchFamily="49" charset="0"/>
-                <a:cs typeface="Consolas" panose="020B0609020204030204" pitchFamily="49" charset="0"/>
-              </a:rPr>
-              <a:t>()  {</a:t>
-            </a:r>
-            <a:br>
-              <a:rPr lang="en-US" sz="1400" dirty="0">
-                <a:latin typeface="Consolas" panose="020B0609020204030204" pitchFamily="49" charset="0"/>
-                <a:cs typeface="Consolas" panose="020B0609020204030204" pitchFamily="49" charset="0"/>
-              </a:rPr>
-            </a:br>
-            <a:r>
-              <a:rPr lang="en-US" sz="1400" dirty="0">
-                <a:latin typeface="Consolas" panose="020B0609020204030204" pitchFamily="49" charset="0"/>
-                <a:cs typeface="Consolas" panose="020B0609020204030204" pitchFamily="49" charset="0"/>
-              </a:rPr>
-              <a:t>        </a:t>
-            </a:r>
-            <a:r>
-              <a:rPr lang="en-US" sz="1400" dirty="0" err="1">
-                <a:latin typeface="Consolas" panose="020B0609020204030204" pitchFamily="49" charset="0"/>
-                <a:cs typeface="Consolas" panose="020B0609020204030204" pitchFamily="49" charset="0"/>
-              </a:rPr>
-              <a:t>System.</a:t>
-            </a:r>
-            <a:r>
-              <a:rPr lang="en-US" sz="1400" i="1" dirty="0" err="1">
-                <a:solidFill>
-                  <a:srgbClr val="9876AA"/>
-                </a:solidFill>
-                <a:effectLst/>
-                <a:latin typeface="Consolas" panose="020B0609020204030204" pitchFamily="49" charset="0"/>
-                <a:cs typeface="Consolas" panose="020B0609020204030204" pitchFamily="49" charset="0"/>
-              </a:rPr>
-              <a:t>out</a:t>
-            </a:r>
-            <a:r>
-              <a:rPr lang="en-US" sz="1400" dirty="0" err="1">
-                <a:latin typeface="Consolas" panose="020B0609020204030204" pitchFamily="49" charset="0"/>
-                <a:cs typeface="Consolas" panose="020B0609020204030204" pitchFamily="49" charset="0"/>
-              </a:rPr>
-              <a:t>.println</a:t>
-            </a:r>
-            <a:r>
-              <a:rPr lang="en-US" sz="1400" dirty="0">
-                <a:latin typeface="Consolas" panose="020B0609020204030204" pitchFamily="49" charset="0"/>
-                <a:cs typeface="Consolas" panose="020B0609020204030204" pitchFamily="49" charset="0"/>
-              </a:rPr>
-              <a:t>(</a:t>
-            </a:r>
-            <a:r>
-              <a:rPr lang="en-US" sz="1400" dirty="0">
-                <a:solidFill>
-                  <a:srgbClr val="6A8759"/>
-                </a:solidFill>
-                <a:effectLst/>
-                <a:latin typeface="Consolas" panose="020B0609020204030204" pitchFamily="49" charset="0"/>
-                <a:cs typeface="Consolas" panose="020B0609020204030204" pitchFamily="49" charset="0"/>
-              </a:rPr>
-              <a:t>"I need a number? "</a:t>
-            </a:r>
-            <a:r>
-              <a:rPr lang="en-US" sz="1400" dirty="0">
-                <a:latin typeface="Consolas" panose="020B0609020204030204" pitchFamily="49" charset="0"/>
-                <a:cs typeface="Consolas" panose="020B0609020204030204" pitchFamily="49" charset="0"/>
-              </a:rPr>
-              <a:t>)</a:t>
-            </a:r>
-            <a:r>
-              <a:rPr lang="en-US" sz="1400" dirty="0">
-                <a:solidFill>
-                  <a:srgbClr val="CC7832"/>
-                </a:solidFill>
-                <a:effectLst/>
-                <a:latin typeface="Consolas" panose="020B0609020204030204" pitchFamily="49" charset="0"/>
-                <a:cs typeface="Consolas" panose="020B0609020204030204" pitchFamily="49" charset="0"/>
-              </a:rPr>
-              <a:t>;</a:t>
-            </a:r>
-            <a:br>
-              <a:rPr lang="en-US" sz="1400" dirty="0">
-                <a:solidFill>
-                  <a:srgbClr val="CC7832"/>
-                </a:solidFill>
-                <a:effectLst/>
-                <a:latin typeface="Consolas" panose="020B0609020204030204" pitchFamily="49" charset="0"/>
-                <a:cs typeface="Consolas" panose="020B0609020204030204" pitchFamily="49" charset="0"/>
-              </a:rPr>
-            </a:br>
-            <a:r>
-              <a:rPr lang="en-US" sz="1400" dirty="0">
-                <a:solidFill>
-                  <a:srgbClr val="CC7832"/>
-                </a:solidFill>
-                <a:effectLst/>
-                <a:latin typeface="Consolas" panose="020B0609020204030204" pitchFamily="49" charset="0"/>
-                <a:cs typeface="Consolas" panose="020B0609020204030204" pitchFamily="49" charset="0"/>
-              </a:rPr>
-              <a:t>        return </a:t>
-            </a:r>
-            <a:r>
-              <a:rPr lang="en-US" sz="1400" dirty="0" err="1">
-                <a:solidFill>
-                  <a:srgbClr val="9876AA"/>
-                </a:solidFill>
-                <a:effectLst/>
-                <a:latin typeface="Consolas" panose="020B0609020204030204" pitchFamily="49" charset="0"/>
-                <a:cs typeface="Consolas" panose="020B0609020204030204" pitchFamily="49" charset="0"/>
-              </a:rPr>
-              <a:t>scanner</a:t>
-            </a:r>
-            <a:r>
-              <a:rPr lang="en-US" sz="1400" dirty="0" err="1">
-                <a:latin typeface="Consolas" panose="020B0609020204030204" pitchFamily="49" charset="0"/>
-                <a:cs typeface="Consolas" panose="020B0609020204030204" pitchFamily="49" charset="0"/>
-              </a:rPr>
-              <a:t>.nextInt</a:t>
-            </a:r>
-            <a:r>
-              <a:rPr lang="en-US" sz="1400" dirty="0">
-                <a:latin typeface="Consolas" panose="020B0609020204030204" pitchFamily="49" charset="0"/>
-                <a:cs typeface="Consolas" panose="020B0609020204030204" pitchFamily="49" charset="0"/>
-              </a:rPr>
-              <a:t>()</a:t>
-            </a:r>
-            <a:r>
-              <a:rPr lang="en-US" sz="1400" dirty="0">
-                <a:solidFill>
-                  <a:srgbClr val="CC7832"/>
-                </a:solidFill>
-                <a:effectLst/>
-                <a:latin typeface="Consolas" panose="020B0609020204030204" pitchFamily="49" charset="0"/>
-                <a:cs typeface="Consolas" panose="020B0609020204030204" pitchFamily="49" charset="0"/>
-              </a:rPr>
-              <a:t>;</a:t>
-            </a:r>
-            <a:br>
-              <a:rPr lang="en-US" sz="1400" dirty="0">
-                <a:solidFill>
-                  <a:srgbClr val="CC7832"/>
-                </a:solidFill>
-                <a:effectLst/>
-                <a:latin typeface="Consolas" panose="020B0609020204030204" pitchFamily="49" charset="0"/>
-                <a:cs typeface="Consolas" panose="020B0609020204030204" pitchFamily="49" charset="0"/>
-              </a:rPr>
-            </a:br>
-            <a:r>
-              <a:rPr lang="en-US" sz="1400" dirty="0">
-                <a:solidFill>
-                  <a:srgbClr val="CC7832"/>
-                </a:solidFill>
-                <a:effectLst/>
-                <a:latin typeface="Consolas" panose="020B0609020204030204" pitchFamily="49" charset="0"/>
-                <a:cs typeface="Consolas" panose="020B0609020204030204" pitchFamily="49" charset="0"/>
-              </a:rPr>
-              <a:t>    </a:t>
-            </a:r>
-            <a:r>
-              <a:rPr lang="en-US" sz="1400" dirty="0">
-                <a:latin typeface="Consolas" panose="020B0609020204030204" pitchFamily="49" charset="0"/>
-                <a:cs typeface="Consolas" panose="020B0609020204030204" pitchFamily="49" charset="0"/>
-              </a:rPr>
-              <a:t>}</a:t>
-            </a:r>
-            <a:br>
-              <a:rPr lang="en-US" sz="1400" dirty="0">
-                <a:latin typeface="Consolas" panose="020B0609020204030204" pitchFamily="49" charset="0"/>
-                <a:cs typeface="Consolas" panose="020B0609020204030204" pitchFamily="49" charset="0"/>
-              </a:rPr>
-            </a:br>
-            <a:br>
-              <a:rPr lang="en-US" sz="1400" dirty="0">
-                <a:latin typeface="Consolas" panose="020B0609020204030204" pitchFamily="49" charset="0"/>
-                <a:cs typeface="Consolas" panose="020B0609020204030204" pitchFamily="49" charset="0"/>
-              </a:rPr>
-            </a:br>
-            <a:r>
-              <a:rPr lang="en-US" sz="1400" dirty="0">
-                <a:latin typeface="Consolas" panose="020B0609020204030204" pitchFamily="49" charset="0"/>
-                <a:cs typeface="Consolas" panose="020B0609020204030204" pitchFamily="49" charset="0"/>
-              </a:rPr>
-              <a:t>    </a:t>
-            </a:r>
-            <a:r>
-              <a:rPr lang="en-US" sz="1400" dirty="0">
-                <a:solidFill>
-                  <a:srgbClr val="CC7832"/>
-                </a:solidFill>
-                <a:effectLst/>
-                <a:latin typeface="Consolas" panose="020B0609020204030204" pitchFamily="49" charset="0"/>
-                <a:cs typeface="Consolas" panose="020B0609020204030204" pitchFamily="49" charset="0"/>
-              </a:rPr>
-              <a:t>public static void </a:t>
-            </a:r>
-            <a:r>
-              <a:rPr lang="en-US" sz="1400" dirty="0">
-                <a:solidFill>
-                  <a:srgbClr val="FFC66D"/>
-                </a:solidFill>
-                <a:effectLst/>
-                <a:latin typeface="Consolas" panose="020B0609020204030204" pitchFamily="49" charset="0"/>
-                <a:cs typeface="Consolas" panose="020B0609020204030204" pitchFamily="49" charset="0"/>
-              </a:rPr>
-              <a:t>main</a:t>
-            </a:r>
-            <a:r>
-              <a:rPr lang="en-US" sz="1400" dirty="0">
-                <a:latin typeface="Consolas" panose="020B0609020204030204" pitchFamily="49" charset="0"/>
-                <a:cs typeface="Consolas" panose="020B0609020204030204" pitchFamily="49" charset="0"/>
-              </a:rPr>
-              <a:t>(String[] </a:t>
-            </a:r>
-            <a:r>
-              <a:rPr lang="en-US" sz="1400" i="1" dirty="0" err="1">
-                <a:solidFill>
-                  <a:srgbClr val="9876AA"/>
-                </a:solidFill>
-                <a:effectLst/>
-                <a:latin typeface="Consolas" panose="020B0609020204030204" pitchFamily="49" charset="0"/>
-                <a:cs typeface="Consolas" panose="020B0609020204030204" pitchFamily="49" charset="0"/>
-              </a:rPr>
-              <a:t>args</a:t>
-            </a:r>
-            <a:r>
-              <a:rPr lang="en-US" sz="1400" dirty="0">
-                <a:latin typeface="Consolas" panose="020B0609020204030204" pitchFamily="49" charset="0"/>
-                <a:cs typeface="Consolas" panose="020B0609020204030204" pitchFamily="49" charset="0"/>
-              </a:rPr>
-              <a:t>) {</a:t>
-            </a:r>
-            <a:br>
-              <a:rPr lang="en-US" sz="1400" dirty="0">
-                <a:latin typeface="Consolas" panose="020B0609020204030204" pitchFamily="49" charset="0"/>
-                <a:cs typeface="Consolas" panose="020B0609020204030204" pitchFamily="49" charset="0"/>
-              </a:rPr>
-            </a:br>
-            <a:r>
-              <a:rPr lang="en-US" sz="1400" dirty="0">
-                <a:latin typeface="Consolas" panose="020B0609020204030204" pitchFamily="49" charset="0"/>
-                <a:cs typeface="Consolas" panose="020B0609020204030204" pitchFamily="49" charset="0"/>
-              </a:rPr>
-              <a:t>      </a:t>
-            </a:r>
-            <a:r>
-              <a:rPr lang="en-US" sz="1400" dirty="0" err="1">
-                <a:latin typeface="Consolas" panose="020B0609020204030204" pitchFamily="49" charset="0"/>
-                <a:cs typeface="Consolas" panose="020B0609020204030204" pitchFamily="49" charset="0"/>
-              </a:rPr>
-              <a:t>InclassExample</a:t>
-            </a:r>
-            <a:r>
-              <a:rPr lang="en-US" sz="1400" dirty="0">
-                <a:latin typeface="Consolas" panose="020B0609020204030204" pitchFamily="49" charset="0"/>
-                <a:cs typeface="Consolas" panose="020B0609020204030204" pitchFamily="49" charset="0"/>
-              </a:rPr>
-              <a:t> </a:t>
-            </a:r>
-            <a:r>
-              <a:rPr lang="en-US" sz="1400" i="1" dirty="0">
-                <a:solidFill>
-                  <a:srgbClr val="9876AA"/>
-                </a:solidFill>
-                <a:effectLst/>
-                <a:latin typeface="Consolas" panose="020B0609020204030204" pitchFamily="49" charset="0"/>
-                <a:cs typeface="Consolas" panose="020B0609020204030204" pitchFamily="49" charset="0"/>
-              </a:rPr>
-              <a:t>example </a:t>
-            </a:r>
-            <a:r>
-              <a:rPr lang="en-US" sz="1400" dirty="0">
-                <a:latin typeface="Consolas" panose="020B0609020204030204" pitchFamily="49" charset="0"/>
-                <a:cs typeface="Consolas" panose="020B0609020204030204" pitchFamily="49" charset="0"/>
-              </a:rPr>
-              <a:t>=  </a:t>
-            </a:r>
-            <a:r>
-              <a:rPr lang="en-US" sz="1400" dirty="0">
-                <a:solidFill>
-                  <a:srgbClr val="CC7832"/>
-                </a:solidFill>
-                <a:effectLst/>
-                <a:latin typeface="Consolas" panose="020B0609020204030204" pitchFamily="49" charset="0"/>
-                <a:cs typeface="Consolas" panose="020B0609020204030204" pitchFamily="49" charset="0"/>
-              </a:rPr>
-              <a:t>new </a:t>
-            </a:r>
-            <a:r>
-              <a:rPr lang="en-US" sz="1400" dirty="0" err="1">
-                <a:latin typeface="Consolas" panose="020B0609020204030204" pitchFamily="49" charset="0"/>
-                <a:cs typeface="Consolas" panose="020B0609020204030204" pitchFamily="49" charset="0"/>
-              </a:rPr>
-              <a:t>InclassExample</a:t>
-            </a:r>
-            <a:r>
-              <a:rPr lang="en-US" sz="1400" dirty="0">
-                <a:latin typeface="Consolas" panose="020B0609020204030204" pitchFamily="49" charset="0"/>
-                <a:cs typeface="Consolas" panose="020B0609020204030204" pitchFamily="49" charset="0"/>
-              </a:rPr>
-              <a:t>()</a:t>
-            </a:r>
-            <a:r>
-              <a:rPr lang="en-US" sz="1400" dirty="0">
-                <a:solidFill>
-                  <a:srgbClr val="CC7832"/>
-                </a:solidFill>
-                <a:effectLst/>
-                <a:latin typeface="Consolas" panose="020B0609020204030204" pitchFamily="49" charset="0"/>
-                <a:cs typeface="Consolas" panose="020B0609020204030204" pitchFamily="49" charset="0"/>
-              </a:rPr>
-              <a:t>;</a:t>
-            </a:r>
-            <a:br>
-              <a:rPr lang="en-US" sz="1400" dirty="0">
-                <a:solidFill>
-                  <a:srgbClr val="CC7832"/>
-                </a:solidFill>
-                <a:effectLst/>
-                <a:latin typeface="Consolas" panose="020B0609020204030204" pitchFamily="49" charset="0"/>
-                <a:cs typeface="Consolas" panose="020B0609020204030204" pitchFamily="49" charset="0"/>
-              </a:rPr>
-            </a:br>
-            <a:r>
-              <a:rPr lang="en-US" sz="1400" dirty="0">
-                <a:solidFill>
-                  <a:srgbClr val="CC7832"/>
-                </a:solidFill>
-                <a:effectLst/>
-                <a:latin typeface="Consolas" panose="020B0609020204030204" pitchFamily="49" charset="0"/>
-                <a:cs typeface="Consolas" panose="020B0609020204030204" pitchFamily="49" charset="0"/>
-              </a:rPr>
-              <a:t>      </a:t>
-            </a:r>
-            <a:r>
-              <a:rPr lang="en-US" sz="1400" i="1" dirty="0" err="1">
-                <a:solidFill>
-                  <a:srgbClr val="9876AA"/>
-                </a:solidFill>
-                <a:effectLst/>
-                <a:latin typeface="Consolas" panose="020B0609020204030204" pitchFamily="49" charset="0"/>
-                <a:cs typeface="Consolas" panose="020B0609020204030204" pitchFamily="49" charset="0"/>
-              </a:rPr>
-              <a:t>example</a:t>
-            </a:r>
-            <a:r>
-              <a:rPr lang="en-US" sz="1400" dirty="0" err="1">
-                <a:latin typeface="Consolas" panose="020B0609020204030204" pitchFamily="49" charset="0"/>
-                <a:cs typeface="Consolas" panose="020B0609020204030204" pitchFamily="49" charset="0"/>
-              </a:rPr>
-              <a:t>.loopChallenge</a:t>
-            </a:r>
-            <a:r>
-              <a:rPr lang="en-US" sz="1400" dirty="0">
-                <a:latin typeface="Consolas" panose="020B0609020204030204" pitchFamily="49" charset="0"/>
-                <a:cs typeface="Consolas" panose="020B0609020204030204" pitchFamily="49" charset="0"/>
-              </a:rPr>
-              <a:t>()</a:t>
-            </a:r>
-            <a:r>
-              <a:rPr lang="en-US" sz="1400" dirty="0">
-                <a:solidFill>
-                  <a:srgbClr val="CC7832"/>
-                </a:solidFill>
-                <a:effectLst/>
-                <a:latin typeface="Consolas" panose="020B0609020204030204" pitchFamily="49" charset="0"/>
-                <a:cs typeface="Consolas" panose="020B0609020204030204" pitchFamily="49" charset="0"/>
-              </a:rPr>
-              <a:t>; </a:t>
-            </a:r>
-            <a:r>
-              <a:rPr lang="en-US" sz="1400" dirty="0">
-                <a:solidFill>
-                  <a:srgbClr val="808080"/>
-                </a:solidFill>
-                <a:effectLst/>
-                <a:latin typeface="Consolas" panose="020B0609020204030204" pitchFamily="49" charset="0"/>
-                <a:cs typeface="Consolas" panose="020B0609020204030204" pitchFamily="49" charset="0"/>
-              </a:rPr>
-              <a:t>// because I  need scanner! </a:t>
-            </a:r>
-            <a:br>
-              <a:rPr lang="en-US" sz="1400" dirty="0">
-                <a:solidFill>
-                  <a:srgbClr val="808080"/>
-                </a:solidFill>
-                <a:effectLst/>
-                <a:latin typeface="Consolas" panose="020B0609020204030204" pitchFamily="49" charset="0"/>
-                <a:cs typeface="Consolas" panose="020B0609020204030204" pitchFamily="49" charset="0"/>
-              </a:rPr>
-            </a:br>
-            <a:r>
-              <a:rPr lang="en-US" sz="1400" dirty="0">
-                <a:solidFill>
-                  <a:srgbClr val="808080"/>
-                </a:solidFill>
-                <a:effectLst/>
-                <a:latin typeface="Consolas" panose="020B0609020204030204" pitchFamily="49" charset="0"/>
-                <a:cs typeface="Consolas" panose="020B0609020204030204" pitchFamily="49" charset="0"/>
-              </a:rPr>
-              <a:t>    </a:t>
-            </a:r>
-            <a:r>
-              <a:rPr lang="en-US" sz="1400" dirty="0">
-                <a:latin typeface="Consolas" panose="020B0609020204030204" pitchFamily="49" charset="0"/>
-                <a:cs typeface="Consolas" panose="020B0609020204030204" pitchFamily="49" charset="0"/>
-              </a:rPr>
-              <a:t>}    </a:t>
-            </a:r>
-            <a:br>
-              <a:rPr lang="en-US" sz="1400" dirty="0">
-                <a:latin typeface="Consolas" panose="020B0609020204030204" pitchFamily="49" charset="0"/>
-                <a:cs typeface="Consolas" panose="020B0609020204030204" pitchFamily="49" charset="0"/>
-              </a:rPr>
-            </a:br>
-            <a:r>
-              <a:rPr lang="en-US" sz="1400" dirty="0">
-                <a:latin typeface="Consolas" panose="020B0609020204030204" pitchFamily="49" charset="0"/>
-                <a:cs typeface="Consolas" panose="020B0609020204030204" pitchFamily="49" charset="0"/>
-              </a:rPr>
-              <a:t>}</a:t>
-            </a:r>
-          </a:p>
-        </p:txBody>
-      </p:sp>
-      <p:sp>
-        <p:nvSpPr>
-          <p:cNvPr id="6" name="TextBox 5">
-            <a:extLst>
-              <a:ext uri="{FF2B5EF4-FFF2-40B4-BE49-F238E27FC236}">
-                <a16:creationId xmlns:a16="http://schemas.microsoft.com/office/drawing/2014/main" id="{AE4C5429-F0DD-ED4D-9833-DCECB23289E0}"/>
-              </a:ext>
-            </a:extLst>
-          </p:cNvPr>
-          <p:cNvSpPr txBox="1"/>
-          <p:nvPr/>
-        </p:nvSpPr>
-        <p:spPr>
-          <a:xfrm>
-            <a:off x="2957689" y="5012267"/>
-            <a:ext cx="3065776" cy="707886"/>
-          </a:xfrm>
-          <a:prstGeom prst="rect">
-            <a:avLst/>
-          </a:prstGeom>
-          <a:noFill/>
-        </p:spPr>
-        <p:txBody>
-          <a:bodyPr wrap="none" rtlCol="0">
-            <a:spAutoFit/>
-          </a:bodyPr>
-          <a:lstStyle/>
-          <a:p>
+              <a:t>Really, everyone trying it, isn’t as beneficial as everyone working together on these!</a:t>
+            </a:r>
+          </a:p>
+          <a:p>
+            <a:pPr lvl="1"/>
             <a:r>
               <a:rPr lang="en-US" dirty="0"/>
-              <a:t>You can assume </a:t>
-            </a:r>
-            <a:r>
-              <a:rPr lang="en-US" dirty="0" err="1"/>
-              <a:t>getInput</a:t>
+              <a:t>You </a:t>
+            </a:r>
+            <a:r>
+              <a:rPr lang="en-US"/>
+              <a:t>can always try it on our own later</a:t>
             </a:r>
             <a:endParaRPr lang="en-US" dirty="0"/>
-          </a:p>
-          <a:p>
-            <a:r>
-              <a:rPr lang="en-US" dirty="0"/>
-              <a:t>Only focus on the TODO</a:t>
-            </a:r>
           </a:p>
         </p:txBody>
       </p:sp>
@@ -8840,7 +8084,7 @@
           <p:cNvPr id="4" name="Title 3">
             <a:extLst>
               <a:ext uri="{FF2B5EF4-FFF2-40B4-BE49-F238E27FC236}">
-                <a16:creationId xmlns:a16="http://schemas.microsoft.com/office/drawing/2014/main" id="{4EB85848-D40E-C644-8BBD-356CFF5598D6}"/>
+                <a16:creationId xmlns:a16="http://schemas.microsoft.com/office/drawing/2014/main" id="{11F69212-F891-5844-91B0-396F6B018064}"/>
               </a:ext>
             </a:extLst>
           </p:cNvPr>
@@ -8858,17 +8102,167 @@
           <a:p>
             <a:r>
               <a:rPr lang="en-US" dirty="0"/>
-              <a:t>Announcements </a:t>
+              <a:t>Announcements</a:t>
             </a:r>
           </a:p>
         </p:txBody>
       </p:sp>
       <p:sp>
         <p:nvSpPr>
-          <p:cNvPr id="9" name="TextBox 8">
+          <p:cNvPr id="5" name="Text Placeholder 4">
             <a:extLst>
               <a:ext uri="{FF2B5EF4-FFF2-40B4-BE49-F238E27FC236}">
-                <a16:creationId xmlns:a16="http://schemas.microsoft.com/office/drawing/2014/main" id="{175001E9-0D5B-864B-AB16-328450214CEC}"/>
+                <a16:creationId xmlns:a16="http://schemas.microsoft.com/office/drawing/2014/main" id="{D45B7610-981A-7441-A483-AB5BABDA0AB4}"/>
+              </a:ext>
+            </a:extLst>
+          </p:cNvPr>
+          <p:cNvSpPr>
+            <a:spLocks noGrp="1"/>
+          </p:cNvSpPr>
+          <p:nvPr>
+            <p:ph type="body" sz="quarter" idx="10"/>
+          </p:nvPr>
+        </p:nvSpPr>
+        <p:spPr>
+          <a:xfrm>
+            <a:off x="628075" y="1776683"/>
+            <a:ext cx="6574699" cy="4765664"/>
+          </a:xfrm>
+        </p:spPr>
+        <p:txBody>
+          <a:bodyPr/>
+          <a:lstStyle/>
+          <a:p>
+            <a:r>
+              <a:rPr lang="en-US" dirty="0">
+                <a:solidFill>
+                  <a:srgbClr val="092529"/>
+                </a:solidFill>
+              </a:rPr>
+              <a:t>Reminder – readings are due </a:t>
+            </a:r>
+            <a:r>
+              <a:rPr lang="en-US" b="1" dirty="0">
+                <a:solidFill>
+                  <a:srgbClr val="092529"/>
+                </a:solidFill>
+              </a:rPr>
+              <a:t>before</a:t>
+            </a:r>
+            <a:r>
+              <a:rPr lang="en-US" dirty="0">
+                <a:solidFill>
+                  <a:srgbClr val="092529"/>
+                </a:solidFill>
+              </a:rPr>
+              <a:t> lecture</a:t>
+            </a:r>
+          </a:p>
+          <a:p>
+            <a:pPr lvl="1"/>
+            <a:r>
+              <a:rPr lang="en-US" dirty="0">
+                <a:solidFill>
+                  <a:srgbClr val="092529"/>
+                </a:solidFill>
+              </a:rPr>
+              <a:t>You don’t have to do all of it - challenge problems can be challenging…</a:t>
+            </a:r>
+          </a:p>
+          <a:p>
+            <a:pPr lvl="1"/>
+            <a:r>
+              <a:rPr lang="en-US" dirty="0">
+                <a:solidFill>
+                  <a:srgbClr val="092529"/>
+                </a:solidFill>
+              </a:rPr>
+              <a:t>You can return to them. </a:t>
+            </a:r>
+          </a:p>
+          <a:p>
+            <a:pPr lvl="1"/>
+            <a:r>
+              <a:rPr lang="en-US" dirty="0">
+                <a:solidFill>
+                  <a:srgbClr val="092529"/>
+                </a:solidFill>
+              </a:rPr>
+              <a:t>We start off each lecture with a quiz from your reading! </a:t>
+            </a:r>
+          </a:p>
+          <a:p>
+            <a:r>
+              <a:rPr lang="en-US" dirty="0">
+                <a:solidFill>
+                  <a:srgbClr val="092529"/>
+                </a:solidFill>
+              </a:rPr>
+              <a:t>Help Sessions</a:t>
+            </a:r>
+          </a:p>
+          <a:p>
+            <a:pPr lvl="1"/>
+            <a:r>
+              <a:rPr lang="en-US" dirty="0"/>
+              <a:t>Go to them! They make a difference</a:t>
+            </a:r>
+          </a:p>
+          <a:p>
+            <a:pPr lvl="1"/>
+            <a:r>
+              <a:rPr lang="en-US" dirty="0"/>
+              <a:t>Lab teams should be setup</a:t>
+            </a:r>
+          </a:p>
+          <a:p>
+            <a:pPr lvl="2"/>
+            <a:r>
+              <a:rPr lang="en-US" dirty="0">
+                <a:solidFill>
+                  <a:srgbClr val="092529"/>
+                </a:solidFill>
+              </a:rPr>
+              <a:t>If you are not on a private </a:t>
+            </a:r>
+            <a:r>
+              <a:rPr lang="en-US" dirty="0"/>
+              <a:t>channel with your other lab mates, let us know </a:t>
+            </a:r>
+          </a:p>
+          <a:p>
+            <a:r>
+              <a:rPr lang="en-US" dirty="0">
+                <a:solidFill>
+                  <a:srgbClr val="092529"/>
+                </a:solidFill>
+              </a:rPr>
+              <a:t>Tuesday </a:t>
+            </a:r>
+            <a:r>
+              <a:rPr lang="en-US" dirty="0"/>
+              <a:t>lab – meant to be done by Thursday</a:t>
+            </a:r>
+            <a:r>
+              <a:rPr lang="en-US" dirty="0">
+                <a:solidFill>
+                  <a:srgbClr val="092529"/>
+                </a:solidFill>
+              </a:rPr>
+              <a:t> </a:t>
+            </a:r>
+          </a:p>
+          <a:p>
+            <a:endParaRPr lang="en-US" b="1" dirty="0"/>
+          </a:p>
+        </p:txBody>
+      </p:sp>
+      <p:sp>
+        <p:nvSpPr>
+          <p:cNvPr id="7" name="TextBox 6">
+            <a:extLst>
+              <a:ext uri="{FF2B5EF4-FFF2-40B4-BE49-F238E27FC236}">
+                <a16:creationId xmlns:a16="http://schemas.microsoft.com/office/drawing/2014/main" id="{CB1D3C32-157D-4AB2-8254-1075DFAB882C}"/>
               </a:ext>
             </a:extLst>
           </p:cNvPr>
@@ -8877,8 +8271,8 @@
         </p:nvSpPr>
         <p:spPr>
           <a:xfrm>
-            <a:off x="8038197" y="3224480"/>
-            <a:ext cx="5644445" cy="1323439"/>
+            <a:off x="7202774" y="299645"/>
+            <a:ext cx="6910464" cy="707886"/>
           </a:xfrm>
           <a:prstGeom prst="rect">
             <a:avLst/>
@@ -8891,7 +8285,7 @@
           </a:bodyPr>
           <a:lstStyle/>
           <a:p>
-            <a:pPr marL="0" marR="0" algn="l">
+            <a:pPr marL="0" marR="0">
               <a:spcBef>
                 <a:spcPts val="0"/>
               </a:spcBef>
@@ -8900,18 +8294,32 @@
               </a:spcAft>
             </a:pPr>
             <a:r>
-              <a:rPr lang="en-US" sz="2000" b="0" i="0" u="none" strike="noStrike" dirty="0">
-                <a:solidFill>
-                  <a:srgbClr val="000000"/>
-                </a:solidFill>
+              <a:rPr lang="en-US" sz="2000" dirty="0">
                 <a:effectLst/>
                 <a:latin typeface="Calibri" panose="020F0502020204030204" pitchFamily="34" charset="0"/>
+                <a:ea typeface="Calibri" panose="020F0502020204030204" pitchFamily="34" charset="0"/>
               </a:rPr>
-              <a:t>ACM-W Diversity in Computing Dinner</a:t>
-            </a:r>
-          </a:p>
-          <a:p>
-            <a:pPr marL="0" marR="0" algn="l">
+              <a:t>February 2</a:t>
+            </a:r>
+            <a:r>
+              <a:rPr lang="en-US" sz="2000" baseline="30000" dirty="0">
+                <a:effectLst/>
+                <a:latin typeface="Calibri" panose="020F0502020204030204" pitchFamily="34" charset="0"/>
+                <a:ea typeface="Calibri" panose="020F0502020204030204" pitchFamily="34" charset="0"/>
+              </a:rPr>
+              <a:t>nd</a:t>
+            </a:r>
+            <a:r>
+              <a:rPr lang="en-US" sz="2000" dirty="0">
+                <a:effectLst/>
+                <a:latin typeface="Calibri" panose="020F0502020204030204" pitchFamily="34" charset="0"/>
+                <a:ea typeface="Calibri" panose="020F0502020204030204" pitchFamily="34" charset="0"/>
+              </a:rPr>
+              <a:t> : ACM – Presentation: Tech Interviews</a:t>
+            </a:r>
+          </a:p>
+          <a:p>
+            <a:pPr marL="0" marR="0">
               <a:spcBef>
                 <a:spcPts val="0"/>
               </a:spcBef>
@@ -8920,145 +8328,38 @@
               </a:spcAft>
             </a:pPr>
             <a:r>
-              <a:rPr lang="en-US" sz="2000" b="0" i="0" u="none" strike="noStrike" dirty="0">
-                <a:solidFill>
-                  <a:srgbClr val="000000"/>
-                </a:solidFill>
+              <a:rPr lang="en-US" sz="2000" dirty="0">
                 <a:effectLst/>
                 <a:latin typeface="Calibri" panose="020F0502020204030204" pitchFamily="34" charset="0"/>
+                <a:ea typeface="Calibri" panose="020F0502020204030204" pitchFamily="34" charset="0"/>
               </a:rPr>
-              <a:t>When: Thursday September 16</a:t>
-            </a:r>
-            <a:r>
-              <a:rPr lang="en-US" sz="2000" b="0" i="0" u="none" strike="noStrike" baseline="30000" dirty="0">
-                <a:solidFill>
-                  <a:srgbClr val="000000"/>
-                </a:solidFill>
+              <a:t>February 3</a:t>
+            </a:r>
+            <a:r>
+              <a:rPr lang="en-US" sz="2000" baseline="30000" dirty="0">
                 <a:effectLst/>
                 <a:latin typeface="Calibri" panose="020F0502020204030204" pitchFamily="34" charset="0"/>
+                <a:ea typeface="Calibri" panose="020F0502020204030204" pitchFamily="34" charset="0"/>
               </a:rPr>
-              <a:t>th</a:t>
-            </a:r>
-            <a:r>
-              <a:rPr lang="en-US" sz="2000" b="0" i="0" u="none" strike="noStrike" dirty="0">
-                <a:solidFill>
-                  <a:srgbClr val="000000"/>
-                </a:solidFill>
+              <a:t>rd</a:t>
+            </a:r>
+            <a:r>
+              <a:rPr lang="en-US" sz="2000" dirty="0">
                 <a:effectLst/>
                 <a:latin typeface="Calibri" panose="020F0502020204030204" pitchFamily="34" charset="0"/>
+                <a:ea typeface="Calibri" panose="020F0502020204030204" pitchFamily="34" charset="0"/>
               </a:rPr>
-              <a:t> at 5:30pm</a:t>
-            </a:r>
-          </a:p>
-          <a:p>
-            <a:pPr marL="0" marR="0" algn="l">
-              <a:spcBef>
-                <a:spcPts val="0"/>
-              </a:spcBef>
-              <a:spcAft>
-                <a:spcPts val="0"/>
-              </a:spcAft>
-            </a:pPr>
-            <a:r>
-              <a:rPr lang="en-US" sz="2000" b="0" i="0" u="none" strike="noStrike" dirty="0">
-                <a:solidFill>
-                  <a:srgbClr val="000000"/>
-                </a:solidFill>
-                <a:effectLst/>
-                <a:latin typeface="Calibri" panose="020F0502020204030204" pitchFamily="34" charset="0"/>
-              </a:rPr>
-              <a:t>Where: LSC room 382</a:t>
-            </a:r>
-          </a:p>
-          <a:p>
-            <a:pPr marL="0" marR="0" algn="l">
-              <a:spcBef>
-                <a:spcPts val="0"/>
-              </a:spcBef>
-              <a:spcAft>
-                <a:spcPts val="0"/>
-              </a:spcAft>
-            </a:pPr>
-            <a:r>
-              <a:rPr lang="en-US" sz="2000" b="0" i="0" u="none" strike="noStrike" dirty="0">
-                <a:solidFill>
-                  <a:srgbClr val="000000"/>
-                </a:solidFill>
-                <a:effectLst/>
-                <a:latin typeface="Calibri" panose="020F0502020204030204" pitchFamily="34" charset="0"/>
-              </a:rPr>
-              <a:t>RSVP: </a:t>
-            </a:r>
-            <a:r>
-              <a:rPr lang="en-US" sz="2000" b="0" i="0" u="none" strike="noStrike" dirty="0">
-                <a:solidFill>
-                  <a:srgbClr val="000000"/>
-                </a:solidFill>
-                <a:effectLst/>
-                <a:latin typeface="Calibri" panose="020F0502020204030204" pitchFamily="34" charset="0"/>
-                <a:hlinkClick r:id="rId2" tooltip="Original URL:&#10;https://forms.gle/LdDiVAPaui5Ctgw38&#10;&#10;Click to follow link."/>
-              </a:rPr>
-              <a:t>https://forms.gle/LdDiVAPaui5Ctgw38</a:t>
-            </a:r>
-            <a:endParaRPr lang="en-US" sz="2000" b="0" i="0" u="none" strike="noStrike" dirty="0">
-              <a:solidFill>
-                <a:srgbClr val="000000"/>
-              </a:solidFill>
-              <a:effectLst/>
-              <a:latin typeface="Calibri" panose="020F0502020204030204" pitchFamily="34" charset="0"/>
-            </a:endParaRPr>
+              <a:t> : ACM-W – Career Fair Prep</a:t>
+            </a:r>
           </a:p>
         </p:txBody>
       </p:sp>
       <p:sp>
         <p:nvSpPr>
-          <p:cNvPr id="10" name="TextBox 9">
+          <p:cNvPr id="9" name="Text Placeholder 4">
             <a:extLst>
               <a:ext uri="{FF2B5EF4-FFF2-40B4-BE49-F238E27FC236}">
-                <a16:creationId xmlns:a16="http://schemas.microsoft.com/office/drawing/2014/main" id="{04687C0F-3162-FD47-BF00-761D96A9475E}"/>
-              </a:ext>
-            </a:extLst>
-          </p:cNvPr>
-          <p:cNvSpPr txBox="1"/>
-          <p:nvPr/>
-        </p:nvSpPr>
-        <p:spPr>
-          <a:xfrm>
-            <a:off x="5802489" y="174561"/>
-            <a:ext cx="7880153" cy="1015663"/>
-          </a:xfrm>
-          <a:prstGeom prst="rect">
-            <a:avLst/>
-          </a:prstGeom>
-          <a:solidFill>
-            <a:schemeClr val="accent2"/>
-          </a:solidFill>
-        </p:spPr>
-        <p:txBody>
-          <a:bodyPr wrap="square" rtlCol="0">
-            <a:spAutoFit/>
-          </a:bodyPr>
-          <a:lstStyle/>
-          <a:p>
-            <a:r>
-              <a:rPr lang="en-US" b="1" dirty="0"/>
-              <a:t>Opening Question</a:t>
-            </a:r>
-          </a:p>
-          <a:p>
-            <a:r>
-              <a:rPr lang="en-US" dirty="0"/>
-              <a:t>Can you think of a repetitive task? Is there a way to use tech to make that task easier?</a:t>
-            </a:r>
-          </a:p>
-        </p:txBody>
-      </p:sp>
-      <p:sp>
-        <p:nvSpPr>
-          <p:cNvPr id="8" name="Text Placeholder 4">
-            <a:extLst>
-              <a:ext uri="{FF2B5EF4-FFF2-40B4-BE49-F238E27FC236}">
-                <a16:creationId xmlns:a16="http://schemas.microsoft.com/office/drawing/2014/main" id="{85ED3DE7-849C-6A4D-8F0B-681286F91A4C}"/>
+                <a16:creationId xmlns:a16="http://schemas.microsoft.com/office/drawing/2014/main" id="{B06B4A78-C810-42EF-9A72-6B2BEA732F0E}"/>
               </a:ext>
             </a:extLst>
           </p:cNvPr>
@@ -9069,12 +8370,17 @@
         </p:nvSpPr>
         <p:spPr>
           <a:xfrm>
-            <a:off x="431800" y="1765842"/>
-            <a:ext cx="6725359" cy="3950825"/>
+            <a:off x="7665797" y="1101333"/>
+            <a:ext cx="5984417" cy="5006563"/>
           </a:xfrm>
           <a:prstGeom prst="rect">
             <a:avLst/>
           </a:prstGeom>
+          <a:ln>
+            <a:solidFill>
+              <a:schemeClr val="tx2"/>
+            </a:solidFill>
+          </a:ln>
         </p:spPr>
         <p:txBody>
           <a:bodyPr vert="horz" wrap="square" lIns="91440" tIns="91440" rIns="91440" bIns="91440" rtlCol="0">
@@ -9242,75 +8548,131 @@
             </a:lvl9pPr>
           </a:lstStyle>
           <a:p>
+            <a:pPr marL="0" indent="0">
+              <a:buNone/>
+            </a:pPr>
+            <a:r>
+              <a:rPr lang="en-US" b="1" dirty="0"/>
+              <a:t>NEXT WEEK</a:t>
+            </a:r>
+          </a:p>
+          <a:p>
             <a:r>
               <a:rPr lang="en-US" dirty="0"/>
-              <a:t>Practical 1  -  work on it right away!</a:t>
+              <a:t>Monday: Lecture on </a:t>
+            </a:r>
+            <a:r>
+              <a:rPr lang="en-US" dirty="0" err="1"/>
+              <a:t>github</a:t>
+            </a:r>
+            <a:r>
+              <a:rPr lang="en-US" dirty="0"/>
+              <a:t> and IDEs </a:t>
+            </a:r>
+          </a:p>
+          <a:p>
+            <a:r>
+              <a:rPr lang="en-US" dirty="0"/>
+              <a:t>Tuesday: Setup IDE in lab and review</a:t>
             </a:r>
           </a:p>
           <a:p>
             <a:pPr lvl="1"/>
             <a:r>
               <a:rPr lang="en-US" dirty="0"/>
-              <a:t>Only three files have errors (rest are read only)</a:t>
+              <a:t>bring your laptop if you want help</a:t>
+            </a:r>
+          </a:p>
+          <a:p>
+            <a:r>
+              <a:rPr lang="en-US" dirty="0"/>
+              <a:t>Wednesday: Review Lecture</a:t>
             </a:r>
           </a:p>
           <a:p>
             <a:pPr lvl="1"/>
             <a:r>
               <a:rPr lang="en-US" dirty="0"/>
-              <a:t>Debugging is hard! </a:t>
-            </a:r>
-          </a:p>
-          <a:p>
-            <a:pPr lvl="2"/>
+              <a:t>Send me questions to review by EOD Monday</a:t>
+            </a:r>
+          </a:p>
+          <a:p>
             <a:r>
               <a:rPr lang="en-US" dirty="0"/>
-              <a:t>Especially if you wait until all the code is written…</a:t>
-            </a:r>
-          </a:p>
-          <a:p>
-            <a:r>
-              <a:rPr lang="en-US" u="sng" dirty="0"/>
-              <a:t>Next week</a:t>
-            </a:r>
+              <a:t>Thursday: EXAM </a:t>
+            </a:r>
+            <a:r>
+              <a:rPr lang="en-US" b="1" u="sng" dirty="0"/>
+              <a:t>in lab</a:t>
+            </a:r>
+          </a:p>
+          <a:p>
+            <a:pPr lvl="1"/>
             <a:r>
               <a:rPr lang="en-US" dirty="0"/>
-              <a:t>:</a:t>
+              <a:t>(most) Accommodations on Friday at help desk</a:t>
+            </a:r>
+          </a:p>
+          <a:p>
+            <a:r>
+              <a:rPr lang="en-US" dirty="0"/>
+              <a:t>Friday: No Class</a:t>
+            </a:r>
+          </a:p>
+          <a:p>
+            <a:r>
+              <a:rPr lang="en-US" dirty="0"/>
+              <a:t>Throughout the week </a:t>
             </a:r>
           </a:p>
           <a:p>
             <a:pPr lvl="1"/>
             <a:r>
               <a:rPr lang="en-US" dirty="0"/>
-              <a:t>Monday Lecture – help on debugging / coding follow along</a:t>
-            </a:r>
-          </a:p>
-          <a:p>
-            <a:pPr lvl="1"/>
+              <a:t>coding exam / one submission attempt assignment</a:t>
+            </a:r>
+          </a:p>
+        </p:txBody>
+      </p:sp>
+      <p:sp>
+        <p:nvSpPr>
+          <p:cNvPr id="10" name="TextBox 9">
+            <a:extLst>
+              <a:ext uri="{FF2B5EF4-FFF2-40B4-BE49-F238E27FC236}">
+                <a16:creationId xmlns:a16="http://schemas.microsoft.com/office/drawing/2014/main" id="{7D098E10-F699-4805-B39D-34F08B26A7E3}"/>
+              </a:ext>
+            </a:extLst>
+          </p:cNvPr>
+          <p:cNvSpPr txBox="1"/>
+          <p:nvPr/>
+        </p:nvSpPr>
+        <p:spPr>
+          <a:xfrm>
+            <a:off x="2968723" y="6265881"/>
+            <a:ext cx="7880153" cy="1015663"/>
+          </a:xfrm>
+          <a:prstGeom prst="rect">
+            <a:avLst/>
+          </a:prstGeom>
+          <a:solidFill>
+            <a:schemeClr val="accent2"/>
+          </a:solidFill>
+        </p:spPr>
+        <p:txBody>
+          <a:bodyPr wrap="square" rtlCol="0">
+            <a:spAutoFit/>
+          </a:bodyPr>
+          <a:lstStyle/>
+          <a:p>
+            <a:r>
+              <a:rPr lang="en-US" b="1" dirty="0"/>
+              <a:t>Opening Question</a:t>
+            </a:r>
+          </a:p>
+          <a:p>
             <a:r>
               <a:rPr lang="en-US" dirty="0"/>
-              <a:t>Coding exam – Tuesday in Lab</a:t>
-            </a:r>
-          </a:p>
-          <a:p>
-            <a:pPr lvl="1"/>
-            <a:r>
-              <a:rPr lang="en-US" dirty="0"/>
-              <a:t>Wednesday Lecture - review session</a:t>
-            </a:r>
-          </a:p>
-          <a:p>
-            <a:pPr lvl="1"/>
-            <a:r>
-              <a:rPr lang="en-US" dirty="0"/>
-              <a:t>Canvas exam – Thursday in Lab</a:t>
-            </a:r>
-          </a:p>
-          <a:p>
-            <a:pPr lvl="1"/>
-            <a:r>
-              <a:rPr lang="en-US" dirty="0"/>
-              <a:t>Friday Lecture – Cancelled (take time to catch up)</a:t>
+              <a:t>Can you think of a repetitive task? Is there a way to use tech to make that task easier?</a:t>
             </a:r>
           </a:p>
         </p:txBody>
@@ -9318,7 +8680,7 @@
     </p:spTree>
     <p:extLst>
       <p:ext uri="{BB962C8B-B14F-4D97-AF65-F5344CB8AC3E}">
-        <p14:creationId xmlns:p14="http://schemas.microsoft.com/office/powerpoint/2010/main" val="3989986971"/>
+        <p14:creationId xmlns:p14="http://schemas.microsoft.com/office/powerpoint/2010/main" val="876244202"/>
       </p:ext>
     </p:extLst>
   </p:cSld>
@@ -9729,10 +9091,10 @@
       </p:sp>
       <p:sp>
         <p:nvSpPr>
-          <p:cNvPr id="5" name="TextBox 4">
+          <p:cNvPr id="6" name="TextBox 5">
             <a:extLst>
               <a:ext uri="{FF2B5EF4-FFF2-40B4-BE49-F238E27FC236}">
-                <a16:creationId xmlns:a16="http://schemas.microsoft.com/office/drawing/2014/main" id="{D00D0A5B-E1CB-B549-BF83-2A4E072A2598}"/>
+                <a16:creationId xmlns:a16="http://schemas.microsoft.com/office/drawing/2014/main" id="{CD1A2BF2-75E8-450A-948B-5F0E819DECA1}"/>
               </a:ext>
             </a:extLst>
           </p:cNvPr>
@@ -9741,8 +9103,8 @@
         </p:nvSpPr>
         <p:spPr>
           <a:xfrm>
-            <a:off x="3042355" y="1685597"/>
-            <a:ext cx="7732889" cy="4401205"/>
+            <a:off x="1536852" y="2026743"/>
+            <a:ext cx="6907576" cy="1631216"/>
           </a:xfrm>
           <a:prstGeom prst="rect">
             <a:avLst/>
@@ -9756,888 +9118,385 @@
           <a:lstStyle/>
           <a:p>
             <a:r>
-              <a:rPr lang="en-US" dirty="0">
-                <a:solidFill>
-                  <a:srgbClr val="CC7832"/>
+              <a:rPr lang="en-US" b="0" i="0" dirty="0">
+                <a:solidFill>
+                  <a:srgbClr val="0000FF"/>
                 </a:solidFill>
                 <a:effectLst/>
                 <a:latin typeface="Consolas" panose="020B0609020204030204" pitchFamily="49" charset="0"/>
-                <a:cs typeface="Consolas" panose="020B0609020204030204" pitchFamily="49" charset="0"/>
               </a:rPr>
-              <a:t>public static void </a:t>
-            </a:r>
-            <a:r>
-              <a:rPr lang="en-US" dirty="0" err="1">
-                <a:solidFill>
-                  <a:srgbClr val="FFC66D"/>
+              <a:t>public</a:t>
+            </a:r>
+            <a:r>
+              <a:rPr lang="en-US" b="0" i="0" dirty="0">
+                <a:solidFill>
+                  <a:srgbClr val="000000"/>
                 </a:solidFill>
                 <a:effectLst/>
                 <a:latin typeface="Consolas" panose="020B0609020204030204" pitchFamily="49" charset="0"/>
-                <a:cs typeface="Consolas" panose="020B0609020204030204" pitchFamily="49" charset="0"/>
               </a:rPr>
-              <a:t>complexFor</a:t>
-            </a:r>
-            <a:r>
-              <a:rPr lang="en-US" dirty="0">
+              <a:t> </a:t>
+            </a:r>
+            <a:r>
+              <a:rPr lang="en-US" b="0" i="0" dirty="0">
+                <a:solidFill>
+                  <a:srgbClr val="0000FF"/>
+                </a:solidFill>
+                <a:effectLst/>
                 <a:latin typeface="Consolas" panose="020B0609020204030204" pitchFamily="49" charset="0"/>
-                <a:cs typeface="Consolas" panose="020B0609020204030204" pitchFamily="49" charset="0"/>
+              </a:rPr>
+              <a:t>static</a:t>
+            </a:r>
+            <a:r>
+              <a:rPr lang="en-US" b="0" i="0" dirty="0">
+                <a:solidFill>
+                  <a:srgbClr val="000000"/>
+                </a:solidFill>
+                <a:effectLst/>
+                <a:latin typeface="Consolas" panose="020B0609020204030204" pitchFamily="49" charset="0"/>
+              </a:rPr>
+              <a:t> </a:t>
+            </a:r>
+            <a:r>
+              <a:rPr lang="en-US" b="0" i="0" dirty="0">
+                <a:solidFill>
+                  <a:srgbClr val="267F99"/>
+                </a:solidFill>
+                <a:effectLst/>
+                <a:latin typeface="Consolas" panose="020B0609020204030204" pitchFamily="49" charset="0"/>
+              </a:rPr>
+              <a:t>void</a:t>
+            </a:r>
+            <a:r>
+              <a:rPr lang="en-US" b="0" i="0" dirty="0">
+                <a:solidFill>
+                  <a:srgbClr val="000000"/>
+                </a:solidFill>
+                <a:effectLst/>
+                <a:latin typeface="Consolas" panose="020B0609020204030204" pitchFamily="49" charset="0"/>
+              </a:rPr>
+              <a:t> </a:t>
+            </a:r>
+            <a:r>
+              <a:rPr lang="en-US" b="0" i="0" dirty="0">
+                <a:solidFill>
+                  <a:srgbClr val="795E26"/>
+                </a:solidFill>
+                <a:effectLst/>
+                <a:latin typeface="Consolas" panose="020B0609020204030204" pitchFamily="49" charset="0"/>
+              </a:rPr>
+              <a:t>loop</a:t>
+            </a:r>
+            <a:r>
+              <a:rPr lang="en-US" b="0" i="0" dirty="0">
+                <a:solidFill>
+                  <a:srgbClr val="000000"/>
+                </a:solidFill>
+                <a:effectLst/>
+                <a:latin typeface="Consolas" panose="020B0609020204030204" pitchFamily="49" charset="0"/>
+              </a:rPr>
+              <a:t>(int max, int </a:t>
+            </a:r>
+            <a:r>
+              <a:rPr lang="en-US" b="0" i="0" dirty="0" err="1">
+                <a:solidFill>
+                  <a:srgbClr val="000000"/>
+                </a:solidFill>
+                <a:effectLst/>
+                <a:latin typeface="Consolas" panose="020B0609020204030204" pitchFamily="49" charset="0"/>
+              </a:rPr>
+              <a:t>inc</a:t>
+            </a:r>
+            <a:r>
+              <a:rPr lang="en-US" b="0" i="0" dirty="0">
+                <a:solidFill>
+                  <a:srgbClr val="000000"/>
+                </a:solidFill>
+                <a:effectLst/>
+                <a:latin typeface="Consolas" panose="020B0609020204030204" pitchFamily="49" charset="0"/>
+              </a:rPr>
+              <a:t>) {</a:t>
+            </a:r>
+            <a:br>
+              <a:rPr lang="en-US" dirty="0"/>
+            </a:br>
+            <a:r>
+              <a:rPr lang="en-US" dirty="0"/>
+              <a:t>	</a:t>
+            </a:r>
+            <a:r>
+              <a:rPr lang="en-US" b="0" i="0" dirty="0">
+                <a:solidFill>
+                  <a:srgbClr val="AF00DB"/>
+                </a:solidFill>
+                <a:effectLst/>
+                <a:latin typeface="Consolas" panose="020B0609020204030204" pitchFamily="49" charset="0"/>
+              </a:rPr>
+              <a:t>for</a:t>
+            </a:r>
+            <a:r>
+              <a:rPr lang="en-US" b="0" i="0" dirty="0">
+                <a:solidFill>
+                  <a:srgbClr val="000000"/>
+                </a:solidFill>
+                <a:effectLst/>
+                <a:latin typeface="Consolas" panose="020B0609020204030204" pitchFamily="49" charset="0"/>
               </a:rPr>
               <a:t>(</a:t>
             </a:r>
             <a:r>
-              <a:rPr lang="en-US" dirty="0">
-                <a:solidFill>
-                  <a:srgbClr val="CC7832"/>
+              <a:rPr lang="en-US" b="0" i="0" dirty="0">
+                <a:solidFill>
+                  <a:srgbClr val="267F99"/>
                 </a:solidFill>
                 <a:effectLst/>
                 <a:latin typeface="Consolas" panose="020B0609020204030204" pitchFamily="49" charset="0"/>
-                <a:cs typeface="Consolas" panose="020B0609020204030204" pitchFamily="49" charset="0"/>
               </a:rPr>
-              <a:t>int </a:t>
-            </a:r>
-            <a:r>
-              <a:rPr lang="en-US" i="1" dirty="0">
-                <a:solidFill>
-                  <a:srgbClr val="9876AA"/>
+              <a:t>int</a:t>
+            </a:r>
+            <a:r>
+              <a:rPr lang="en-US" b="0" i="0" dirty="0">
+                <a:solidFill>
+                  <a:srgbClr val="000000"/>
                 </a:solidFill>
                 <a:effectLst/>
                 <a:latin typeface="Consolas" panose="020B0609020204030204" pitchFamily="49" charset="0"/>
-                <a:cs typeface="Consolas" panose="020B0609020204030204" pitchFamily="49" charset="0"/>
               </a:rPr>
-              <a:t>lines</a:t>
-            </a:r>
-            <a:r>
-              <a:rPr lang="en-US" dirty="0">
+              <a:t> </a:t>
+            </a:r>
+            <a:r>
+              <a:rPr lang="en-US" b="0" i="0" dirty="0" err="1">
+                <a:solidFill>
+                  <a:srgbClr val="001080"/>
+                </a:solidFill>
+                <a:effectLst/>
                 <a:latin typeface="Consolas" panose="020B0609020204030204" pitchFamily="49" charset="0"/>
-                <a:cs typeface="Consolas" panose="020B0609020204030204" pitchFamily="49" charset="0"/>
+              </a:rPr>
+              <a:t>i</a:t>
+            </a:r>
+            <a:r>
+              <a:rPr lang="en-US" b="0" i="0" dirty="0">
+                <a:solidFill>
+                  <a:srgbClr val="000000"/>
+                </a:solidFill>
+                <a:effectLst/>
+                <a:latin typeface="Consolas" panose="020B0609020204030204" pitchFamily="49" charset="0"/>
+              </a:rPr>
+              <a:t> = </a:t>
+            </a:r>
+            <a:r>
+              <a:rPr lang="en-US" b="0" i="0" dirty="0">
+                <a:solidFill>
+                  <a:srgbClr val="098658"/>
+                </a:solidFill>
+                <a:effectLst/>
+                <a:latin typeface="Consolas" panose="020B0609020204030204" pitchFamily="49" charset="0"/>
+              </a:rPr>
+              <a:t>0</a:t>
+            </a:r>
+            <a:r>
+              <a:rPr lang="en-US" b="0" i="0" dirty="0">
+                <a:solidFill>
+                  <a:srgbClr val="000000"/>
+                </a:solidFill>
+                <a:effectLst/>
+                <a:latin typeface="Consolas" panose="020B0609020204030204" pitchFamily="49" charset="0"/>
+              </a:rPr>
+              <a:t>; </a:t>
+            </a:r>
+            <a:r>
+              <a:rPr lang="en-US" b="0" i="0" dirty="0" err="1">
+                <a:solidFill>
+                  <a:srgbClr val="001080"/>
+                </a:solidFill>
+                <a:effectLst/>
+                <a:latin typeface="Consolas" panose="020B0609020204030204" pitchFamily="49" charset="0"/>
+              </a:rPr>
+              <a:t>i</a:t>
+            </a:r>
+            <a:r>
+              <a:rPr lang="en-US" b="0" i="0" dirty="0">
+                <a:solidFill>
+                  <a:srgbClr val="000000"/>
+                </a:solidFill>
+                <a:effectLst/>
+                <a:latin typeface="Consolas" panose="020B0609020204030204" pitchFamily="49" charset="0"/>
+              </a:rPr>
+              <a:t> &lt; max; </a:t>
+            </a:r>
+            <a:r>
+              <a:rPr lang="en-US" b="0" i="0" dirty="0" err="1">
+                <a:solidFill>
+                  <a:srgbClr val="001080"/>
+                </a:solidFill>
+                <a:effectLst/>
+                <a:latin typeface="Consolas" panose="020B0609020204030204" pitchFamily="49" charset="0"/>
+              </a:rPr>
+              <a:t>i</a:t>
+            </a:r>
+            <a:r>
+              <a:rPr lang="en-US" b="0" i="0" dirty="0">
+                <a:solidFill>
+                  <a:srgbClr val="000000"/>
+                </a:solidFill>
+                <a:effectLst/>
+                <a:latin typeface="Consolas" panose="020B0609020204030204" pitchFamily="49" charset="0"/>
+              </a:rPr>
+              <a:t>+= </a:t>
+            </a:r>
+            <a:r>
+              <a:rPr lang="en-US" b="0" i="0" dirty="0" err="1">
+                <a:solidFill>
+                  <a:srgbClr val="000000"/>
+                </a:solidFill>
+                <a:effectLst/>
+                <a:latin typeface="Consolas" panose="020B0609020204030204" pitchFamily="49" charset="0"/>
+              </a:rPr>
+              <a:t>inc</a:t>
+            </a:r>
+            <a:r>
+              <a:rPr lang="en-US" b="0" i="0" dirty="0">
+                <a:solidFill>
+                  <a:srgbClr val="000000"/>
+                </a:solidFill>
+                <a:effectLst/>
+                <a:latin typeface="Consolas" panose="020B0609020204030204" pitchFamily="49" charset="0"/>
               </a:rPr>
               <a:t>) {</a:t>
             </a:r>
             <a:br>
-              <a:rPr lang="en-US" dirty="0">
-                <a:latin typeface="Consolas" panose="020B0609020204030204" pitchFamily="49" charset="0"/>
-                <a:cs typeface="Consolas" panose="020B0609020204030204" pitchFamily="49" charset="0"/>
-              </a:rPr>
+              <a:rPr lang="en-US" dirty="0"/>
             </a:br>
             <a:r>
-              <a:rPr lang="en-US" dirty="0">
-                <a:latin typeface="Consolas" panose="020B0609020204030204" pitchFamily="49" charset="0"/>
-                <a:cs typeface="Consolas" panose="020B0609020204030204" pitchFamily="49" charset="0"/>
-              </a:rPr>
-              <a:t>    String </a:t>
-            </a:r>
-            <a:r>
-              <a:rPr lang="en-US" i="1" dirty="0" err="1">
-                <a:solidFill>
-                  <a:srgbClr val="9876AA"/>
+              <a:rPr lang="en-US" b="0" i="0" dirty="0">
+                <a:solidFill>
+                  <a:srgbClr val="000000"/>
                 </a:solidFill>
                 <a:effectLst/>
                 <a:latin typeface="Consolas" panose="020B0609020204030204" pitchFamily="49" charset="0"/>
-                <a:cs typeface="Consolas" panose="020B0609020204030204" pitchFamily="49" charset="0"/>
               </a:rPr>
-              <a:t>count_up</a:t>
-            </a:r>
-            <a:r>
-              <a:rPr lang="en-US" i="1" dirty="0">
-                <a:solidFill>
-                  <a:srgbClr val="9876AA"/>
+              <a:t>    	</a:t>
+            </a:r>
+            <a:r>
+              <a:rPr lang="en-US" b="0" i="0" dirty="0" err="1">
+                <a:solidFill>
+                  <a:srgbClr val="267F99"/>
                 </a:solidFill>
                 <a:effectLst/>
                 <a:latin typeface="Consolas" panose="020B0609020204030204" pitchFamily="49" charset="0"/>
-                <a:cs typeface="Consolas" panose="020B0609020204030204" pitchFamily="49" charset="0"/>
               </a:rPr>
-              <a:t> </a:t>
-            </a:r>
-            <a:r>
-              <a:rPr lang="en-US" dirty="0">
-                <a:latin typeface="Consolas" panose="020B0609020204030204" pitchFamily="49" charset="0"/>
-                <a:cs typeface="Consolas" panose="020B0609020204030204" pitchFamily="49" charset="0"/>
-              </a:rPr>
-              <a:t>= </a:t>
-            </a:r>
-            <a:r>
-              <a:rPr lang="en-US" dirty="0">
-                <a:solidFill>
-                  <a:srgbClr val="6A8759"/>
+              <a:t>System</a:t>
+            </a:r>
+            <a:r>
+              <a:rPr lang="en-US" b="0" i="0" dirty="0" err="1">
+                <a:solidFill>
+                  <a:srgbClr val="000000"/>
                 </a:solidFill>
                 <a:effectLst/>
                 <a:latin typeface="Consolas" panose="020B0609020204030204" pitchFamily="49" charset="0"/>
-                <a:cs typeface="Consolas" panose="020B0609020204030204" pitchFamily="49" charset="0"/>
               </a:rPr>
-              <a:t>""</a:t>
-            </a:r>
-            <a:r>
-              <a:rPr lang="en-US" dirty="0">
-                <a:solidFill>
-                  <a:srgbClr val="CC7832"/>
+              <a:t>.</a:t>
+            </a:r>
+            <a:r>
+              <a:rPr lang="en-US" b="0" i="0" dirty="0" err="1">
+                <a:solidFill>
+                  <a:srgbClr val="0070C1"/>
                 </a:solidFill>
                 <a:effectLst/>
                 <a:latin typeface="Consolas" panose="020B0609020204030204" pitchFamily="49" charset="0"/>
-                <a:cs typeface="Consolas" panose="020B0609020204030204" pitchFamily="49" charset="0"/>
               </a:rPr>
-              <a:t>;</a:t>
-            </a:r>
-            <a:br>
-              <a:rPr lang="en-US" dirty="0">
-                <a:solidFill>
-                  <a:srgbClr val="CC7832"/>
+              <a:t>out</a:t>
+            </a:r>
+            <a:r>
+              <a:rPr lang="en-US" b="0" i="0" dirty="0" err="1">
+                <a:solidFill>
+                  <a:srgbClr val="000000"/>
                 </a:solidFill>
                 <a:effectLst/>
                 <a:latin typeface="Consolas" panose="020B0609020204030204" pitchFamily="49" charset="0"/>
-                <a:cs typeface="Consolas" panose="020B0609020204030204" pitchFamily="49" charset="0"/>
               </a:rPr>
-            </a:br>
-            <a:r>
-              <a:rPr lang="en-US" dirty="0">
-                <a:solidFill>
-                  <a:srgbClr val="CC7832"/>
+              <a:t>.</a:t>
+            </a:r>
+            <a:r>
+              <a:rPr lang="en-US" b="0" i="0" dirty="0" err="1">
+                <a:solidFill>
+                  <a:srgbClr val="795E26"/>
                 </a:solidFill>
                 <a:effectLst/>
                 <a:latin typeface="Consolas" panose="020B0609020204030204" pitchFamily="49" charset="0"/>
-                <a:cs typeface="Consolas" panose="020B0609020204030204" pitchFamily="49" charset="0"/>
               </a:rPr>
-              <a:t>    </a:t>
-            </a:r>
-            <a:r>
-              <a:rPr lang="en-US" dirty="0">
-                <a:latin typeface="Consolas" panose="020B0609020204030204" pitchFamily="49" charset="0"/>
-                <a:cs typeface="Consolas" panose="020B0609020204030204" pitchFamily="49" charset="0"/>
-              </a:rPr>
-              <a:t>String </a:t>
-            </a:r>
-            <a:r>
-              <a:rPr lang="en-US" i="1" dirty="0" err="1">
-                <a:solidFill>
-                  <a:srgbClr val="9876AA"/>
+              <a:t>println</a:t>
+            </a:r>
+            <a:r>
+              <a:rPr lang="en-US" b="0" i="0" dirty="0">
+                <a:solidFill>
+                  <a:srgbClr val="000000"/>
                 </a:solidFill>
                 <a:effectLst/>
                 <a:latin typeface="Consolas" panose="020B0609020204030204" pitchFamily="49" charset="0"/>
-                <a:cs typeface="Consolas" panose="020B0609020204030204" pitchFamily="49" charset="0"/>
               </a:rPr>
-              <a:t>count_down</a:t>
-            </a:r>
-            <a:r>
-              <a:rPr lang="en-US" i="1" dirty="0">
-                <a:solidFill>
-                  <a:srgbClr val="9876AA"/>
+              <a:t>(</a:t>
+            </a:r>
+            <a:r>
+              <a:rPr lang="en-US" b="0" i="0" dirty="0" err="1">
+                <a:solidFill>
+                  <a:srgbClr val="001080"/>
                 </a:solidFill>
                 <a:effectLst/>
                 <a:latin typeface="Consolas" panose="020B0609020204030204" pitchFamily="49" charset="0"/>
-                <a:cs typeface="Consolas" panose="020B0609020204030204" pitchFamily="49" charset="0"/>
               </a:rPr>
-              <a:t> </a:t>
-            </a:r>
-            <a:r>
-              <a:rPr lang="en-US" dirty="0">
-                <a:latin typeface="Consolas" panose="020B0609020204030204" pitchFamily="49" charset="0"/>
-                <a:cs typeface="Consolas" panose="020B0609020204030204" pitchFamily="49" charset="0"/>
-              </a:rPr>
-              <a:t>= </a:t>
-            </a:r>
-            <a:r>
-              <a:rPr lang="en-US" dirty="0">
-                <a:solidFill>
-                  <a:srgbClr val="6A8759"/>
+              <a:t>i</a:t>
+            </a:r>
+            <a:r>
+              <a:rPr lang="en-US" b="0" i="0" dirty="0">
+                <a:solidFill>
+                  <a:srgbClr val="000000"/>
                 </a:solidFill>
                 <a:effectLst/>
                 <a:latin typeface="Consolas" panose="020B0609020204030204" pitchFamily="49" charset="0"/>
-                <a:cs typeface="Consolas" panose="020B0609020204030204" pitchFamily="49" charset="0"/>
               </a:rPr>
-              <a:t>""</a:t>
-            </a:r>
-            <a:r>
-              <a:rPr lang="en-US" dirty="0">
-                <a:solidFill>
-                  <a:srgbClr val="CC7832"/>
+              <a:t>);</a:t>
+            </a:r>
+            <a:br>
+              <a:rPr lang="en-US" dirty="0"/>
+            </a:br>
+            <a:r>
+              <a:rPr lang="en-US" dirty="0"/>
+              <a:t>	</a:t>
+            </a:r>
+            <a:r>
+              <a:rPr lang="en-US" b="0" i="0" dirty="0">
+                <a:solidFill>
+                  <a:srgbClr val="000000"/>
                 </a:solidFill>
                 <a:effectLst/>
                 <a:latin typeface="Consolas" panose="020B0609020204030204" pitchFamily="49" charset="0"/>
-                <a:cs typeface="Consolas" panose="020B0609020204030204" pitchFamily="49" charset="0"/>
               </a:rPr>
-              <a:t>;</a:t>
+              <a:t>}</a:t>
             </a:r>
             <a:br>
-              <a:rPr lang="en-US" dirty="0">
-                <a:solidFill>
-                  <a:srgbClr val="CC7832"/>
+              <a:rPr lang="en-US" dirty="0"/>
+            </a:br>
+            <a:r>
+              <a:rPr lang="en-US" b="0" i="0" dirty="0">
+                <a:solidFill>
+                  <a:srgbClr val="000000"/>
                 </a:solidFill>
                 <a:effectLst/>
                 <a:latin typeface="Consolas" panose="020B0609020204030204" pitchFamily="49" charset="0"/>
-                <a:cs typeface="Consolas" panose="020B0609020204030204" pitchFamily="49" charset="0"/>
-              </a:rPr>
-            </a:br>
-            <a:r>
-              <a:rPr lang="en-US" dirty="0">
-                <a:solidFill>
-                  <a:srgbClr val="CC7832"/>
-                </a:solidFill>
-                <a:effectLst/>
-                <a:latin typeface="Consolas" panose="020B0609020204030204" pitchFamily="49" charset="0"/>
-                <a:cs typeface="Consolas" panose="020B0609020204030204" pitchFamily="49" charset="0"/>
-              </a:rPr>
-              <a:t>    for</a:t>
-            </a:r>
-            <a:r>
-              <a:rPr lang="en-US" dirty="0">
-                <a:latin typeface="Consolas" panose="020B0609020204030204" pitchFamily="49" charset="0"/>
-                <a:cs typeface="Consolas" panose="020B0609020204030204" pitchFamily="49" charset="0"/>
-              </a:rPr>
-              <a:t>(</a:t>
-            </a:r>
-            <a:r>
-              <a:rPr lang="en-US" dirty="0">
-                <a:solidFill>
-                  <a:srgbClr val="CC7832"/>
-                </a:solidFill>
-                <a:effectLst/>
-                <a:latin typeface="Consolas" panose="020B0609020204030204" pitchFamily="49" charset="0"/>
-                <a:cs typeface="Consolas" panose="020B0609020204030204" pitchFamily="49" charset="0"/>
-              </a:rPr>
-              <a:t>int </a:t>
-            </a:r>
-            <a:r>
-              <a:rPr lang="en-US" i="1" dirty="0" err="1">
-                <a:solidFill>
-                  <a:srgbClr val="9876AA"/>
-                </a:solidFill>
-                <a:effectLst/>
-                <a:latin typeface="Consolas" panose="020B0609020204030204" pitchFamily="49" charset="0"/>
-                <a:cs typeface="Consolas" panose="020B0609020204030204" pitchFamily="49" charset="0"/>
-              </a:rPr>
-              <a:t>i</a:t>
-            </a:r>
-            <a:r>
-              <a:rPr lang="en-US" dirty="0">
-                <a:latin typeface="Consolas" panose="020B0609020204030204" pitchFamily="49" charset="0"/>
-                <a:cs typeface="Consolas" panose="020B0609020204030204" pitchFamily="49" charset="0"/>
-              </a:rPr>
-              <a:t>=</a:t>
-            </a:r>
-            <a:r>
-              <a:rPr lang="en-US" dirty="0">
-                <a:solidFill>
-                  <a:srgbClr val="6897BB"/>
-                </a:solidFill>
-                <a:effectLst/>
-                <a:latin typeface="Consolas" panose="020B0609020204030204" pitchFamily="49" charset="0"/>
-                <a:cs typeface="Consolas" panose="020B0609020204030204" pitchFamily="49" charset="0"/>
-              </a:rPr>
-              <a:t>0</a:t>
-            </a:r>
-            <a:r>
-              <a:rPr lang="en-US" dirty="0">
-                <a:solidFill>
-                  <a:srgbClr val="CC7832"/>
-                </a:solidFill>
-                <a:effectLst/>
-                <a:latin typeface="Consolas" panose="020B0609020204030204" pitchFamily="49" charset="0"/>
-                <a:cs typeface="Consolas" panose="020B0609020204030204" pitchFamily="49" charset="0"/>
-              </a:rPr>
-              <a:t>,</a:t>
-            </a:r>
-            <a:r>
-              <a:rPr lang="en-US" i="1" dirty="0">
-                <a:solidFill>
-                  <a:srgbClr val="9876AA"/>
-                </a:solidFill>
-                <a:effectLst/>
-                <a:latin typeface="Consolas" panose="020B0609020204030204" pitchFamily="49" charset="0"/>
-                <a:cs typeface="Consolas" panose="020B0609020204030204" pitchFamily="49" charset="0"/>
-              </a:rPr>
-              <a:t>j </a:t>
-            </a:r>
-            <a:r>
-              <a:rPr lang="en-US" dirty="0">
-                <a:latin typeface="Consolas" panose="020B0609020204030204" pitchFamily="49" charset="0"/>
-                <a:cs typeface="Consolas" panose="020B0609020204030204" pitchFamily="49" charset="0"/>
-              </a:rPr>
-              <a:t>= </a:t>
-            </a:r>
-            <a:r>
-              <a:rPr lang="en-US" i="1" dirty="0">
-                <a:solidFill>
-                  <a:srgbClr val="9876AA"/>
-                </a:solidFill>
-                <a:effectLst/>
-                <a:latin typeface="Consolas" panose="020B0609020204030204" pitchFamily="49" charset="0"/>
-                <a:cs typeface="Consolas" panose="020B0609020204030204" pitchFamily="49" charset="0"/>
-              </a:rPr>
-              <a:t>lines</a:t>
-            </a:r>
-            <a:r>
-              <a:rPr lang="en-US" dirty="0">
-                <a:solidFill>
-                  <a:srgbClr val="CC7832"/>
-                </a:solidFill>
-                <a:effectLst/>
-                <a:latin typeface="Consolas" panose="020B0609020204030204" pitchFamily="49" charset="0"/>
-                <a:cs typeface="Consolas" panose="020B0609020204030204" pitchFamily="49" charset="0"/>
-              </a:rPr>
-              <a:t>; </a:t>
-            </a:r>
-            <a:r>
-              <a:rPr lang="en-US" i="1" dirty="0" err="1">
-                <a:solidFill>
-                  <a:srgbClr val="9876AA"/>
-                </a:solidFill>
-                <a:effectLst/>
-                <a:latin typeface="Consolas" panose="020B0609020204030204" pitchFamily="49" charset="0"/>
-                <a:cs typeface="Consolas" panose="020B0609020204030204" pitchFamily="49" charset="0"/>
-              </a:rPr>
-              <a:t>i</a:t>
-            </a:r>
-            <a:r>
-              <a:rPr lang="en-US" i="1" dirty="0">
-                <a:solidFill>
-                  <a:srgbClr val="9876AA"/>
-                </a:solidFill>
-                <a:effectLst/>
-                <a:latin typeface="Consolas" panose="020B0609020204030204" pitchFamily="49" charset="0"/>
-                <a:cs typeface="Consolas" panose="020B0609020204030204" pitchFamily="49" charset="0"/>
-              </a:rPr>
-              <a:t> </a:t>
-            </a:r>
-            <a:r>
-              <a:rPr lang="en-US" dirty="0">
-                <a:latin typeface="Consolas" panose="020B0609020204030204" pitchFamily="49" charset="0"/>
-                <a:cs typeface="Consolas" panose="020B0609020204030204" pitchFamily="49" charset="0"/>
-              </a:rPr>
-              <a:t>&lt; </a:t>
-            </a:r>
-            <a:r>
-              <a:rPr lang="en-US" i="1" dirty="0">
-                <a:solidFill>
-                  <a:srgbClr val="9876AA"/>
-                </a:solidFill>
-                <a:effectLst/>
-                <a:latin typeface="Consolas" panose="020B0609020204030204" pitchFamily="49" charset="0"/>
-                <a:cs typeface="Consolas" panose="020B0609020204030204" pitchFamily="49" charset="0"/>
-              </a:rPr>
-              <a:t>lines</a:t>
-            </a:r>
-            <a:r>
-              <a:rPr lang="en-US" dirty="0">
-                <a:solidFill>
-                  <a:srgbClr val="CC7832"/>
-                </a:solidFill>
-                <a:effectLst/>
-                <a:latin typeface="Consolas" panose="020B0609020204030204" pitchFamily="49" charset="0"/>
-                <a:cs typeface="Consolas" panose="020B0609020204030204" pitchFamily="49" charset="0"/>
-              </a:rPr>
-              <a:t>; </a:t>
-            </a:r>
-            <a:r>
-              <a:rPr lang="en-US" i="1" dirty="0" err="1">
-                <a:solidFill>
-                  <a:srgbClr val="9876AA"/>
-                </a:solidFill>
-                <a:effectLst/>
-                <a:latin typeface="Consolas" panose="020B0609020204030204" pitchFamily="49" charset="0"/>
-                <a:cs typeface="Consolas" panose="020B0609020204030204" pitchFamily="49" charset="0"/>
-              </a:rPr>
-              <a:t>i</a:t>
-            </a:r>
-            <a:r>
-              <a:rPr lang="en-US" dirty="0">
-                <a:latin typeface="Consolas" panose="020B0609020204030204" pitchFamily="49" charset="0"/>
-                <a:cs typeface="Consolas" panose="020B0609020204030204" pitchFamily="49" charset="0"/>
-              </a:rPr>
-              <a:t>++</a:t>
-            </a:r>
-            <a:r>
-              <a:rPr lang="en-US" dirty="0">
-                <a:solidFill>
-                  <a:srgbClr val="CC7832"/>
-                </a:solidFill>
-                <a:effectLst/>
-                <a:latin typeface="Consolas" panose="020B0609020204030204" pitchFamily="49" charset="0"/>
-                <a:cs typeface="Consolas" panose="020B0609020204030204" pitchFamily="49" charset="0"/>
-              </a:rPr>
-              <a:t>, </a:t>
-            </a:r>
-            <a:r>
-              <a:rPr lang="en-US" i="1" dirty="0">
-                <a:solidFill>
-                  <a:srgbClr val="9876AA"/>
-                </a:solidFill>
-                <a:effectLst/>
-                <a:latin typeface="Consolas" panose="020B0609020204030204" pitchFamily="49" charset="0"/>
-                <a:cs typeface="Consolas" panose="020B0609020204030204" pitchFamily="49" charset="0"/>
-              </a:rPr>
-              <a:t>j</a:t>
-            </a:r>
-            <a:r>
-              <a:rPr lang="en-US" dirty="0">
-                <a:latin typeface="Consolas" panose="020B0609020204030204" pitchFamily="49" charset="0"/>
-                <a:cs typeface="Consolas" panose="020B0609020204030204" pitchFamily="49" charset="0"/>
-              </a:rPr>
-              <a:t>--) {</a:t>
-            </a:r>
-            <a:br>
-              <a:rPr lang="en-US" dirty="0">
-                <a:latin typeface="Consolas" panose="020B0609020204030204" pitchFamily="49" charset="0"/>
-                <a:cs typeface="Consolas" panose="020B0609020204030204" pitchFamily="49" charset="0"/>
-              </a:rPr>
-            </a:br>
-            <a:r>
-              <a:rPr lang="en-US" dirty="0">
-                <a:latin typeface="Consolas" panose="020B0609020204030204" pitchFamily="49" charset="0"/>
-                <a:cs typeface="Consolas" panose="020B0609020204030204" pitchFamily="49" charset="0"/>
-              </a:rPr>
-              <a:t>        </a:t>
-            </a:r>
-            <a:r>
-              <a:rPr lang="en-US" i="1" dirty="0" err="1">
-                <a:solidFill>
-                  <a:srgbClr val="9876AA"/>
-                </a:solidFill>
-                <a:effectLst/>
-                <a:latin typeface="Consolas" panose="020B0609020204030204" pitchFamily="49" charset="0"/>
-                <a:cs typeface="Consolas" panose="020B0609020204030204" pitchFamily="49" charset="0"/>
-              </a:rPr>
-              <a:t>count_up</a:t>
-            </a:r>
-            <a:r>
-              <a:rPr lang="en-US" i="1" dirty="0">
-                <a:solidFill>
-                  <a:srgbClr val="9876AA"/>
-                </a:solidFill>
-                <a:effectLst/>
-                <a:latin typeface="Consolas" panose="020B0609020204030204" pitchFamily="49" charset="0"/>
-                <a:cs typeface="Consolas" panose="020B0609020204030204" pitchFamily="49" charset="0"/>
-              </a:rPr>
-              <a:t> </a:t>
-            </a:r>
-            <a:r>
-              <a:rPr lang="en-US" dirty="0">
-                <a:latin typeface="Consolas" panose="020B0609020204030204" pitchFamily="49" charset="0"/>
-                <a:cs typeface="Consolas" panose="020B0609020204030204" pitchFamily="49" charset="0"/>
-              </a:rPr>
-              <a:t>= </a:t>
-            </a:r>
-            <a:r>
-              <a:rPr lang="en-US" i="1" dirty="0" err="1">
-                <a:solidFill>
-                  <a:srgbClr val="9876AA"/>
-                </a:solidFill>
-                <a:effectLst/>
-                <a:latin typeface="Consolas" panose="020B0609020204030204" pitchFamily="49" charset="0"/>
-                <a:cs typeface="Consolas" panose="020B0609020204030204" pitchFamily="49" charset="0"/>
-              </a:rPr>
-              <a:t>count_up</a:t>
-            </a:r>
-            <a:r>
-              <a:rPr lang="en-US" i="1" dirty="0">
-                <a:solidFill>
-                  <a:srgbClr val="9876AA"/>
-                </a:solidFill>
-                <a:effectLst/>
-                <a:latin typeface="Consolas" panose="020B0609020204030204" pitchFamily="49" charset="0"/>
-                <a:cs typeface="Consolas" panose="020B0609020204030204" pitchFamily="49" charset="0"/>
-              </a:rPr>
-              <a:t> </a:t>
-            </a:r>
-            <a:r>
-              <a:rPr lang="en-US" dirty="0">
-                <a:latin typeface="Consolas" panose="020B0609020204030204" pitchFamily="49" charset="0"/>
-                <a:cs typeface="Consolas" panose="020B0609020204030204" pitchFamily="49" charset="0"/>
-              </a:rPr>
-              <a:t>+ </a:t>
-            </a:r>
-            <a:r>
-              <a:rPr lang="en-US" i="1" dirty="0" err="1">
-                <a:solidFill>
-                  <a:srgbClr val="9876AA"/>
-                </a:solidFill>
-                <a:effectLst/>
-                <a:latin typeface="Consolas" panose="020B0609020204030204" pitchFamily="49" charset="0"/>
-                <a:cs typeface="Consolas" panose="020B0609020204030204" pitchFamily="49" charset="0"/>
-              </a:rPr>
-              <a:t>i</a:t>
-            </a:r>
-            <a:r>
-              <a:rPr lang="en-US" dirty="0">
-                <a:solidFill>
-                  <a:srgbClr val="CC7832"/>
-                </a:solidFill>
-                <a:effectLst/>
-                <a:latin typeface="Consolas" panose="020B0609020204030204" pitchFamily="49" charset="0"/>
-                <a:cs typeface="Consolas" panose="020B0609020204030204" pitchFamily="49" charset="0"/>
-              </a:rPr>
-              <a:t>;</a:t>
-            </a:r>
-            <a:br>
-              <a:rPr lang="en-US" dirty="0">
-                <a:solidFill>
-                  <a:srgbClr val="CC7832"/>
-                </a:solidFill>
-                <a:effectLst/>
-                <a:latin typeface="Consolas" panose="020B0609020204030204" pitchFamily="49" charset="0"/>
-                <a:cs typeface="Consolas" panose="020B0609020204030204" pitchFamily="49" charset="0"/>
-              </a:rPr>
-            </a:br>
-            <a:r>
-              <a:rPr lang="en-US" dirty="0">
-                <a:solidFill>
-                  <a:srgbClr val="CC7832"/>
-                </a:solidFill>
-                <a:effectLst/>
-                <a:latin typeface="Consolas" panose="020B0609020204030204" pitchFamily="49" charset="0"/>
-                <a:cs typeface="Consolas" panose="020B0609020204030204" pitchFamily="49" charset="0"/>
-              </a:rPr>
-              <a:t>        </a:t>
-            </a:r>
-            <a:r>
-              <a:rPr lang="en-US" i="1" dirty="0" err="1">
-                <a:solidFill>
-                  <a:srgbClr val="9876AA"/>
-                </a:solidFill>
-                <a:effectLst/>
-                <a:latin typeface="Consolas" panose="020B0609020204030204" pitchFamily="49" charset="0"/>
-                <a:cs typeface="Consolas" panose="020B0609020204030204" pitchFamily="49" charset="0"/>
-              </a:rPr>
-              <a:t>count_down</a:t>
-            </a:r>
-            <a:r>
-              <a:rPr lang="en-US" i="1" dirty="0">
-                <a:solidFill>
-                  <a:srgbClr val="9876AA"/>
-                </a:solidFill>
-                <a:effectLst/>
-                <a:latin typeface="Consolas" panose="020B0609020204030204" pitchFamily="49" charset="0"/>
-                <a:cs typeface="Consolas" panose="020B0609020204030204" pitchFamily="49" charset="0"/>
-              </a:rPr>
-              <a:t> </a:t>
-            </a:r>
-            <a:r>
-              <a:rPr lang="en-US" dirty="0">
-                <a:latin typeface="Consolas" panose="020B0609020204030204" pitchFamily="49" charset="0"/>
-                <a:cs typeface="Consolas" panose="020B0609020204030204" pitchFamily="49" charset="0"/>
-              </a:rPr>
-              <a:t>= </a:t>
-            </a:r>
-            <a:r>
-              <a:rPr lang="en-US" i="1" dirty="0" err="1">
-                <a:solidFill>
-                  <a:srgbClr val="9876AA"/>
-                </a:solidFill>
-                <a:effectLst/>
-                <a:latin typeface="Consolas" panose="020B0609020204030204" pitchFamily="49" charset="0"/>
-                <a:cs typeface="Consolas" panose="020B0609020204030204" pitchFamily="49" charset="0"/>
-              </a:rPr>
-              <a:t>count_down</a:t>
-            </a:r>
-            <a:r>
-              <a:rPr lang="en-US" i="1" dirty="0">
-                <a:solidFill>
-                  <a:srgbClr val="9876AA"/>
-                </a:solidFill>
-                <a:effectLst/>
-                <a:latin typeface="Consolas" panose="020B0609020204030204" pitchFamily="49" charset="0"/>
-                <a:cs typeface="Consolas" panose="020B0609020204030204" pitchFamily="49" charset="0"/>
-              </a:rPr>
-              <a:t> </a:t>
-            </a:r>
-            <a:r>
-              <a:rPr lang="en-US" dirty="0">
-                <a:latin typeface="Consolas" panose="020B0609020204030204" pitchFamily="49" charset="0"/>
-                <a:cs typeface="Consolas" panose="020B0609020204030204" pitchFamily="49" charset="0"/>
-              </a:rPr>
-              <a:t>+ </a:t>
-            </a:r>
-            <a:r>
-              <a:rPr lang="en-US" i="1" dirty="0">
-                <a:solidFill>
-                  <a:srgbClr val="9876AA"/>
-                </a:solidFill>
-                <a:effectLst/>
-                <a:latin typeface="Consolas" panose="020B0609020204030204" pitchFamily="49" charset="0"/>
-                <a:cs typeface="Consolas" panose="020B0609020204030204" pitchFamily="49" charset="0"/>
-              </a:rPr>
-              <a:t>j</a:t>
-            </a:r>
-            <a:r>
-              <a:rPr lang="en-US" dirty="0">
-                <a:solidFill>
-                  <a:srgbClr val="CC7832"/>
-                </a:solidFill>
-                <a:effectLst/>
-                <a:latin typeface="Consolas" panose="020B0609020204030204" pitchFamily="49" charset="0"/>
-                <a:cs typeface="Consolas" panose="020B0609020204030204" pitchFamily="49" charset="0"/>
-              </a:rPr>
-              <a:t>;</a:t>
-            </a:r>
-            <a:br>
-              <a:rPr lang="en-US" dirty="0">
-                <a:solidFill>
-                  <a:srgbClr val="CC7832"/>
-                </a:solidFill>
-                <a:effectLst/>
-                <a:latin typeface="Consolas" panose="020B0609020204030204" pitchFamily="49" charset="0"/>
-                <a:cs typeface="Consolas" panose="020B0609020204030204" pitchFamily="49" charset="0"/>
-              </a:rPr>
-            </a:br>
-            <a:r>
-              <a:rPr lang="en-US" dirty="0">
-                <a:solidFill>
-                  <a:srgbClr val="CC7832"/>
-                </a:solidFill>
-                <a:effectLst/>
-                <a:latin typeface="Consolas" panose="020B0609020204030204" pitchFamily="49" charset="0"/>
-                <a:cs typeface="Consolas" panose="020B0609020204030204" pitchFamily="49" charset="0"/>
-              </a:rPr>
-              <a:t>    </a:t>
-            </a:r>
-            <a:r>
-              <a:rPr lang="en-US" dirty="0">
-                <a:latin typeface="Consolas" panose="020B0609020204030204" pitchFamily="49" charset="0"/>
-                <a:cs typeface="Consolas" panose="020B0609020204030204" pitchFamily="49" charset="0"/>
               </a:rPr>
               <a:t>}</a:t>
             </a:r>
-            <a:br>
-              <a:rPr lang="en-US" dirty="0">
-                <a:latin typeface="Consolas" panose="020B0609020204030204" pitchFamily="49" charset="0"/>
-                <a:cs typeface="Consolas" panose="020B0609020204030204" pitchFamily="49" charset="0"/>
-              </a:rPr>
-            </a:br>
-            <a:r>
-              <a:rPr lang="en-US" dirty="0">
-                <a:latin typeface="Consolas" panose="020B0609020204030204" pitchFamily="49" charset="0"/>
-                <a:cs typeface="Consolas" panose="020B0609020204030204" pitchFamily="49" charset="0"/>
-              </a:rPr>
-              <a:t>    </a:t>
-            </a:r>
-            <a:r>
-              <a:rPr lang="en-US" dirty="0" err="1">
-                <a:latin typeface="Consolas" panose="020B0609020204030204" pitchFamily="49" charset="0"/>
-                <a:cs typeface="Consolas" panose="020B0609020204030204" pitchFamily="49" charset="0"/>
-              </a:rPr>
-              <a:t>System.</a:t>
-            </a:r>
-            <a:r>
-              <a:rPr lang="en-US" i="1" dirty="0" err="1">
-                <a:solidFill>
-                  <a:srgbClr val="9876AA"/>
-                </a:solidFill>
-                <a:effectLst/>
-                <a:latin typeface="Consolas" panose="020B0609020204030204" pitchFamily="49" charset="0"/>
-                <a:cs typeface="Consolas" panose="020B0609020204030204" pitchFamily="49" charset="0"/>
-              </a:rPr>
-              <a:t>out</a:t>
-            </a:r>
-            <a:r>
-              <a:rPr lang="en-US" dirty="0" err="1">
-                <a:latin typeface="Consolas" panose="020B0609020204030204" pitchFamily="49" charset="0"/>
-                <a:cs typeface="Consolas" panose="020B0609020204030204" pitchFamily="49" charset="0"/>
-              </a:rPr>
-              <a:t>.println</a:t>
-            </a:r>
-            <a:r>
-              <a:rPr lang="en-US" dirty="0">
-                <a:latin typeface="Consolas" panose="020B0609020204030204" pitchFamily="49" charset="0"/>
-                <a:cs typeface="Consolas" panose="020B0609020204030204" pitchFamily="49" charset="0"/>
-              </a:rPr>
-              <a:t>(</a:t>
-            </a:r>
-            <a:r>
-              <a:rPr lang="en-US" i="1" dirty="0" err="1">
-                <a:solidFill>
-                  <a:srgbClr val="9876AA"/>
-                </a:solidFill>
-                <a:effectLst/>
-                <a:latin typeface="Consolas" panose="020B0609020204030204" pitchFamily="49" charset="0"/>
-                <a:cs typeface="Consolas" panose="020B0609020204030204" pitchFamily="49" charset="0"/>
-              </a:rPr>
-              <a:t>count_down</a:t>
-            </a:r>
-            <a:r>
-              <a:rPr lang="en-US" dirty="0">
-                <a:latin typeface="Consolas" panose="020B0609020204030204" pitchFamily="49" charset="0"/>
-                <a:cs typeface="Consolas" panose="020B0609020204030204" pitchFamily="49" charset="0"/>
-              </a:rPr>
-              <a:t>)</a:t>
-            </a:r>
-            <a:r>
-              <a:rPr lang="en-US" dirty="0">
-                <a:solidFill>
-                  <a:srgbClr val="CC7832"/>
-                </a:solidFill>
-                <a:effectLst/>
-                <a:latin typeface="Consolas" panose="020B0609020204030204" pitchFamily="49" charset="0"/>
-                <a:cs typeface="Consolas" panose="020B0609020204030204" pitchFamily="49" charset="0"/>
-              </a:rPr>
-              <a:t>;  </a:t>
-            </a:r>
-            <a:br>
-              <a:rPr lang="en-US" dirty="0">
-                <a:solidFill>
-                  <a:srgbClr val="CC7832"/>
-                </a:solidFill>
-                <a:effectLst/>
-                <a:latin typeface="Consolas" panose="020B0609020204030204" pitchFamily="49" charset="0"/>
-                <a:cs typeface="Consolas" panose="020B0609020204030204" pitchFamily="49" charset="0"/>
-              </a:rPr>
-            </a:br>
-            <a:r>
-              <a:rPr lang="en-US" dirty="0">
-                <a:latin typeface="Consolas" panose="020B0609020204030204" pitchFamily="49" charset="0"/>
-                <a:cs typeface="Consolas" panose="020B0609020204030204" pitchFamily="49" charset="0"/>
-              </a:rPr>
-              <a:t>}</a:t>
-            </a:r>
-            <a:br>
-              <a:rPr lang="en-US" dirty="0">
-                <a:latin typeface="Consolas" panose="020B0609020204030204" pitchFamily="49" charset="0"/>
-                <a:cs typeface="Consolas" panose="020B0609020204030204" pitchFamily="49" charset="0"/>
-              </a:rPr>
-            </a:br>
-            <a:br>
-              <a:rPr lang="en-US" dirty="0">
-                <a:latin typeface="Consolas" panose="020B0609020204030204" pitchFamily="49" charset="0"/>
-                <a:cs typeface="Consolas" panose="020B0609020204030204" pitchFamily="49" charset="0"/>
-              </a:rPr>
-            </a:br>
-            <a:r>
-              <a:rPr lang="en-US" dirty="0">
-                <a:solidFill>
-                  <a:srgbClr val="CC7832"/>
-                </a:solidFill>
-                <a:effectLst/>
-                <a:latin typeface="Consolas" panose="020B0609020204030204" pitchFamily="49" charset="0"/>
-                <a:cs typeface="Consolas" panose="020B0609020204030204" pitchFamily="49" charset="0"/>
-              </a:rPr>
-              <a:t>public static void </a:t>
-            </a:r>
-            <a:r>
-              <a:rPr lang="en-US" dirty="0">
-                <a:solidFill>
-                  <a:srgbClr val="FFC66D"/>
-                </a:solidFill>
-                <a:effectLst/>
-                <a:latin typeface="Consolas" panose="020B0609020204030204" pitchFamily="49" charset="0"/>
-                <a:cs typeface="Consolas" panose="020B0609020204030204" pitchFamily="49" charset="0"/>
-              </a:rPr>
-              <a:t>main</a:t>
-            </a:r>
-            <a:r>
-              <a:rPr lang="en-US" dirty="0">
-                <a:latin typeface="Consolas" panose="020B0609020204030204" pitchFamily="49" charset="0"/>
-                <a:cs typeface="Consolas" panose="020B0609020204030204" pitchFamily="49" charset="0"/>
-              </a:rPr>
-              <a:t>(String[] </a:t>
-            </a:r>
-            <a:r>
-              <a:rPr lang="en-US" i="1" dirty="0" err="1">
-                <a:solidFill>
-                  <a:srgbClr val="9876AA"/>
-                </a:solidFill>
-                <a:effectLst/>
-                <a:latin typeface="Consolas" panose="020B0609020204030204" pitchFamily="49" charset="0"/>
-                <a:cs typeface="Consolas" panose="020B0609020204030204" pitchFamily="49" charset="0"/>
-              </a:rPr>
-              <a:t>args</a:t>
-            </a:r>
-            <a:r>
-              <a:rPr lang="en-US" dirty="0">
-                <a:latin typeface="Consolas" panose="020B0609020204030204" pitchFamily="49" charset="0"/>
-                <a:cs typeface="Consolas" panose="020B0609020204030204" pitchFamily="49" charset="0"/>
-              </a:rPr>
-              <a:t>) {</a:t>
-            </a:r>
-            <a:br>
-              <a:rPr lang="en-US" dirty="0">
-                <a:latin typeface="Consolas" panose="020B0609020204030204" pitchFamily="49" charset="0"/>
-                <a:cs typeface="Consolas" panose="020B0609020204030204" pitchFamily="49" charset="0"/>
-              </a:rPr>
-            </a:br>
-            <a:r>
-              <a:rPr lang="en-US" dirty="0">
-                <a:latin typeface="Consolas" panose="020B0609020204030204" pitchFamily="49" charset="0"/>
-                <a:cs typeface="Consolas" panose="020B0609020204030204" pitchFamily="49" charset="0"/>
-              </a:rPr>
-              <a:t>    </a:t>
-            </a:r>
-            <a:r>
-              <a:rPr lang="en-US" i="1" dirty="0" err="1">
-                <a:effectLst/>
-                <a:latin typeface="Consolas" panose="020B0609020204030204" pitchFamily="49" charset="0"/>
-                <a:cs typeface="Consolas" panose="020B0609020204030204" pitchFamily="49" charset="0"/>
-              </a:rPr>
-              <a:t>complexFor</a:t>
-            </a:r>
-            <a:r>
-              <a:rPr lang="en-US" dirty="0">
-                <a:latin typeface="Consolas" panose="020B0609020204030204" pitchFamily="49" charset="0"/>
-                <a:cs typeface="Consolas" panose="020B0609020204030204" pitchFamily="49" charset="0"/>
-              </a:rPr>
-              <a:t>(</a:t>
-            </a:r>
-            <a:r>
-              <a:rPr lang="en-US" dirty="0">
-                <a:solidFill>
-                  <a:srgbClr val="6897BB"/>
-                </a:solidFill>
-                <a:effectLst/>
-                <a:latin typeface="Consolas" panose="020B0609020204030204" pitchFamily="49" charset="0"/>
-                <a:cs typeface="Consolas" panose="020B0609020204030204" pitchFamily="49" charset="0"/>
-              </a:rPr>
-              <a:t>7</a:t>
-            </a:r>
-            <a:r>
-              <a:rPr lang="en-US" dirty="0">
-                <a:latin typeface="Consolas" panose="020B0609020204030204" pitchFamily="49" charset="0"/>
-                <a:cs typeface="Consolas" panose="020B0609020204030204" pitchFamily="49" charset="0"/>
-              </a:rPr>
-              <a:t>)</a:t>
-            </a:r>
-            <a:r>
-              <a:rPr lang="en-US" dirty="0">
-                <a:solidFill>
-                  <a:srgbClr val="CC7832"/>
-                </a:solidFill>
-                <a:effectLst/>
-                <a:latin typeface="Consolas" panose="020B0609020204030204" pitchFamily="49" charset="0"/>
-                <a:cs typeface="Consolas" panose="020B0609020204030204" pitchFamily="49" charset="0"/>
-              </a:rPr>
-              <a:t>;</a:t>
-            </a:r>
-            <a:br>
-              <a:rPr lang="en-US" dirty="0">
-                <a:solidFill>
-                  <a:srgbClr val="CC7832"/>
-                </a:solidFill>
-                <a:effectLst/>
-                <a:latin typeface="Consolas" panose="020B0609020204030204" pitchFamily="49" charset="0"/>
-                <a:cs typeface="Consolas" panose="020B0609020204030204" pitchFamily="49" charset="0"/>
-              </a:rPr>
-            </a:br>
-            <a:r>
-              <a:rPr lang="en-US" dirty="0">
-                <a:latin typeface="Consolas" panose="020B0609020204030204" pitchFamily="49" charset="0"/>
-                <a:cs typeface="Consolas" panose="020B0609020204030204" pitchFamily="49" charset="0"/>
-              </a:rPr>
-              <a:t>}</a:t>
-            </a:r>
-            <a:br>
-              <a:rPr lang="en-US" dirty="0">
-                <a:latin typeface="Consolas" panose="020B0609020204030204" pitchFamily="49" charset="0"/>
-                <a:cs typeface="Consolas" panose="020B0609020204030204" pitchFamily="49" charset="0"/>
-              </a:rPr>
-            </a:br>
-            <a:endParaRPr lang="en-US" dirty="0">
-              <a:latin typeface="Consolas" panose="020B0609020204030204" pitchFamily="49" charset="0"/>
-              <a:cs typeface="Consolas" panose="020B0609020204030204" pitchFamily="49" charset="0"/>
-            </a:endParaRPr>
+            <a:endParaRPr lang="en-US" dirty="0"/>
           </a:p>
         </p:txBody>
       </p:sp>
       <p:sp>
         <p:nvSpPr>
-          <p:cNvPr id="7" name="TextBox 6">
+          <p:cNvPr id="4" name="TextBox 3">
             <a:extLst>
               <a:ext uri="{FF2B5EF4-FFF2-40B4-BE49-F238E27FC236}">
-                <a16:creationId xmlns:a16="http://schemas.microsoft.com/office/drawing/2014/main" id="{2D3F8ADD-DF1D-7F4B-BA16-D0E716C6F743}"/>
+                <a16:creationId xmlns:a16="http://schemas.microsoft.com/office/drawing/2014/main" id="{36825D35-2585-4794-8AF8-2F10859DC8CF}"/>
               </a:ext>
             </a:extLst>
           </p:cNvPr>
@@ -10646,8 +9505,8 @@
         </p:nvSpPr>
         <p:spPr>
           <a:xfrm>
-            <a:off x="5317067" y="6308677"/>
-            <a:ext cx="1237969" cy="400110"/>
+            <a:off x="1674564" y="3657959"/>
+            <a:ext cx="6907576" cy="400110"/>
           </a:xfrm>
           <a:prstGeom prst="rect">
             <a:avLst/>
@@ -10655,26 +9514,225 @@
           <a:noFill/>
         </p:spPr>
         <p:txBody>
-          <a:bodyPr wrap="square">
+          <a:bodyPr wrap="square" rtlCol="0">
             <a:spAutoFit/>
           </a:bodyPr>
           <a:lstStyle/>
           <a:p>
             <a:r>
-              <a:rPr lang="en-US" b="0" i="0" dirty="0">
-                <a:solidFill>
-                  <a:schemeClr val="accent1"/>
-                </a:solidFill>
-                <a:effectLst/>
-                <a:latin typeface="Lato Extended"/>
-              </a:rPr>
-              <a:t>7654321</a:t>
-            </a:r>
-            <a:endParaRPr lang="en-US" dirty="0">
-              <a:solidFill>
-                <a:schemeClr val="accent1"/>
-              </a:solidFill>
-            </a:endParaRPr>
+              <a:rPr lang="en-US" dirty="0"/>
+              <a:t>How many lines are printed, given the following call</a:t>
+            </a:r>
+          </a:p>
+        </p:txBody>
+      </p:sp>
+      <p:sp>
+        <p:nvSpPr>
+          <p:cNvPr id="8" name="TextBox 7">
+            <a:extLst>
+              <a:ext uri="{FF2B5EF4-FFF2-40B4-BE49-F238E27FC236}">
+                <a16:creationId xmlns:a16="http://schemas.microsoft.com/office/drawing/2014/main" id="{C8E7A84C-3DC4-4A7C-9E70-CD43E5C1B27C}"/>
+              </a:ext>
+            </a:extLst>
+          </p:cNvPr>
+          <p:cNvSpPr txBox="1"/>
+          <p:nvPr/>
+        </p:nvSpPr>
+        <p:spPr>
+          <a:xfrm>
+            <a:off x="1674565" y="5085786"/>
+            <a:ext cx="1366092" cy="400110"/>
+          </a:xfrm>
+          <a:prstGeom prst="rect">
+            <a:avLst/>
+          </a:prstGeom>
+          <a:noFill/>
+        </p:spPr>
+        <p:txBody>
+          <a:bodyPr wrap="square" rtlCol="0">
+            <a:spAutoFit/>
+          </a:bodyPr>
+          <a:lstStyle/>
+          <a:p>
+            <a:r>
+              <a:rPr lang="en-US" dirty="0"/>
+              <a:t>loop(9, 4)</a:t>
+            </a:r>
+          </a:p>
+        </p:txBody>
+      </p:sp>
+      <p:sp>
+        <p:nvSpPr>
+          <p:cNvPr id="9" name="TextBox 8">
+            <a:extLst>
+              <a:ext uri="{FF2B5EF4-FFF2-40B4-BE49-F238E27FC236}">
+                <a16:creationId xmlns:a16="http://schemas.microsoft.com/office/drawing/2014/main" id="{EF5EC79B-6CB2-43F5-BD76-FCF6C21A622B}"/>
+              </a:ext>
+            </a:extLst>
+          </p:cNvPr>
+          <p:cNvSpPr txBox="1"/>
+          <p:nvPr/>
+        </p:nvSpPr>
+        <p:spPr>
+          <a:xfrm>
+            <a:off x="3630059" y="5087453"/>
+            <a:ext cx="1366092" cy="400110"/>
+          </a:xfrm>
+          <a:prstGeom prst="rect">
+            <a:avLst/>
+          </a:prstGeom>
+          <a:noFill/>
+        </p:spPr>
+        <p:txBody>
+          <a:bodyPr wrap="square" rtlCol="0">
+            <a:spAutoFit/>
+          </a:bodyPr>
+          <a:lstStyle/>
+          <a:p>
+            <a:r>
+              <a:rPr lang="en-US" dirty="0"/>
+              <a:t>3</a:t>
+            </a:r>
+          </a:p>
+        </p:txBody>
+      </p:sp>
+      <p:sp>
+        <p:nvSpPr>
+          <p:cNvPr id="10" name="TextBox 9">
+            <a:extLst>
+              <a:ext uri="{FF2B5EF4-FFF2-40B4-BE49-F238E27FC236}">
+                <a16:creationId xmlns:a16="http://schemas.microsoft.com/office/drawing/2014/main" id="{C2C97BFF-82D6-42D9-A9CB-49913E6BEE9A}"/>
+              </a:ext>
+            </a:extLst>
+          </p:cNvPr>
+          <p:cNvSpPr txBox="1"/>
+          <p:nvPr/>
+        </p:nvSpPr>
+        <p:spPr>
+          <a:xfrm>
+            <a:off x="1674564" y="5487563"/>
+            <a:ext cx="1586429" cy="400110"/>
+          </a:xfrm>
+          <a:prstGeom prst="rect">
+            <a:avLst/>
+          </a:prstGeom>
+          <a:noFill/>
+        </p:spPr>
+        <p:txBody>
+          <a:bodyPr wrap="square" rtlCol="0">
+            <a:spAutoFit/>
+          </a:bodyPr>
+          <a:lstStyle/>
+          <a:p>
+            <a:r>
+              <a:rPr lang="en-US" dirty="0"/>
+              <a:t>loop(0, 3)</a:t>
+            </a:r>
+          </a:p>
+        </p:txBody>
+      </p:sp>
+      <p:sp>
+        <p:nvSpPr>
+          <p:cNvPr id="11" name="TextBox 10">
+            <a:extLst>
+              <a:ext uri="{FF2B5EF4-FFF2-40B4-BE49-F238E27FC236}">
+                <a16:creationId xmlns:a16="http://schemas.microsoft.com/office/drawing/2014/main" id="{DE5E953C-4D1B-42ED-8476-16F3C8ED41C0}"/>
+              </a:ext>
+            </a:extLst>
+          </p:cNvPr>
+          <p:cNvSpPr txBox="1"/>
+          <p:nvPr/>
+        </p:nvSpPr>
+        <p:spPr>
+          <a:xfrm>
+            <a:off x="3630059" y="5489230"/>
+            <a:ext cx="1366092" cy="400110"/>
+          </a:xfrm>
+          <a:prstGeom prst="rect">
+            <a:avLst/>
+          </a:prstGeom>
+          <a:noFill/>
+        </p:spPr>
+        <p:txBody>
+          <a:bodyPr wrap="square" rtlCol="0">
+            <a:spAutoFit/>
+          </a:bodyPr>
+          <a:lstStyle/>
+          <a:p>
+            <a:r>
+              <a:rPr lang="en-US" dirty="0"/>
+              <a:t>0</a:t>
+            </a:r>
+          </a:p>
+        </p:txBody>
+      </p:sp>
+      <p:sp>
+        <p:nvSpPr>
+          <p:cNvPr id="12" name="TextBox 11">
+            <a:extLst>
+              <a:ext uri="{FF2B5EF4-FFF2-40B4-BE49-F238E27FC236}">
+                <a16:creationId xmlns:a16="http://schemas.microsoft.com/office/drawing/2014/main" id="{2CCDA3F4-6972-41B2-B1F6-30527B3215CB}"/>
+              </a:ext>
+            </a:extLst>
+          </p:cNvPr>
+          <p:cNvSpPr txBox="1"/>
+          <p:nvPr/>
+        </p:nvSpPr>
+        <p:spPr>
+          <a:xfrm>
+            <a:off x="1674565" y="4696020"/>
+            <a:ext cx="1366092" cy="400110"/>
+          </a:xfrm>
+          <a:prstGeom prst="rect">
+            <a:avLst/>
+          </a:prstGeom>
+          <a:noFill/>
+        </p:spPr>
+        <p:txBody>
+          <a:bodyPr wrap="square" rtlCol="0">
+            <a:spAutoFit/>
+          </a:bodyPr>
+          <a:lstStyle/>
+          <a:p>
+            <a:r>
+              <a:rPr lang="en-US" dirty="0"/>
+              <a:t>loop(5, 1)</a:t>
+            </a:r>
+          </a:p>
+        </p:txBody>
+      </p:sp>
+      <p:sp>
+        <p:nvSpPr>
+          <p:cNvPr id="13" name="TextBox 12">
+            <a:extLst>
+              <a:ext uri="{FF2B5EF4-FFF2-40B4-BE49-F238E27FC236}">
+                <a16:creationId xmlns:a16="http://schemas.microsoft.com/office/drawing/2014/main" id="{B783A650-6F9F-4D39-B0DE-72064AE7D0F3}"/>
+              </a:ext>
+            </a:extLst>
+          </p:cNvPr>
+          <p:cNvSpPr txBox="1"/>
+          <p:nvPr/>
+        </p:nvSpPr>
+        <p:spPr>
+          <a:xfrm>
+            <a:off x="3624548" y="4685676"/>
+            <a:ext cx="1366092" cy="400110"/>
+          </a:xfrm>
+          <a:prstGeom prst="rect">
+            <a:avLst/>
+          </a:prstGeom>
+          <a:noFill/>
+        </p:spPr>
+        <p:txBody>
+          <a:bodyPr wrap="square" rtlCol="0">
+            <a:spAutoFit/>
+          </a:bodyPr>
+          <a:lstStyle/>
+          <a:p>
+            <a:r>
+              <a:rPr lang="en-US" dirty="0"/>
+              <a:t>5</a:t>
+            </a:r>
           </a:p>
         </p:txBody>
       </p:sp>
@@ -10721,7 +9779,7 @@
                             </p:stCondLst>
                             <p:childTnLst>
                               <p:par>
-                                <p:cTn id="5" presetID="45" presetClass="entr" presetSubtype="0" fill="hold" grpId="0" nodeType="clickEffect">
+                                <p:cTn id="5" presetID="10" presetClass="entr" presetSubtype="0" fill="hold" grpId="0" nodeType="clickEffect">
                                   <p:stCondLst>
                                     <p:cond delay="0"/>
                                   </p:stCondLst>
@@ -10734,7 +9792,7 @@
                                           </p:stCondLst>
                                         </p:cTn>
                                         <p:tgtEl>
-                                          <p:spTgt spid="7"/>
+                                          <p:spTgt spid="12"/>
                                         </p:tgtEl>
                                         <p:attrNameLst>
                                           <p:attrName>style.visibility</p:attrName>
@@ -10746,58 +9804,277 @@
                                     </p:set>
                                     <p:animEffect transition="in" filter="fade">
                                       <p:cBhvr>
-                                        <p:cTn id="7" dur="2000"/>
+                                        <p:cTn id="7" dur="500"/>
                                         <p:tgtEl>
-                                          <p:spTgt spid="7"/>
+                                          <p:spTgt spid="12"/>
                                         </p:tgtEl>
                                       </p:cBhvr>
                                     </p:animEffect>
-                                    <p:anim calcmode="lin" valueType="num">
+                                  </p:childTnLst>
+                                </p:cTn>
+                              </p:par>
+                            </p:childTnLst>
+                          </p:cTn>
+                        </p:par>
+                      </p:childTnLst>
+                    </p:cTn>
+                  </p:par>
+                  <p:par>
+                    <p:cTn id="8" fill="hold">
+                      <p:stCondLst>
+                        <p:cond delay="indefinite"/>
+                      </p:stCondLst>
+                      <p:childTnLst>
+                        <p:par>
+                          <p:cTn id="9" fill="hold">
+                            <p:stCondLst>
+                              <p:cond delay="0"/>
+                            </p:stCondLst>
+                            <p:childTnLst>
+                              <p:par>
+                                <p:cTn id="10" presetID="10" presetClass="entr" presetSubtype="0" fill="hold" grpId="0" nodeType="clickEffect">
+                                  <p:stCondLst>
+                                    <p:cond delay="0"/>
+                                  </p:stCondLst>
+                                  <p:childTnLst>
+                                    <p:set>
                                       <p:cBhvr>
-                                        <p:cTn id="8" dur="2000" fill="hold"/>
+                                        <p:cTn id="11" dur="1" fill="hold">
+                                          <p:stCondLst>
+                                            <p:cond delay="0"/>
+                                          </p:stCondLst>
+                                        </p:cTn>
                                         <p:tgtEl>
-                                          <p:spTgt spid="7"/>
+                                          <p:spTgt spid="13"/>
                                         </p:tgtEl>
                                         <p:attrNameLst>
-                                          <p:attrName>ppt_w</p:attrName>
+                                          <p:attrName>style.visibility</p:attrName>
                                         </p:attrNameLst>
                                       </p:cBhvr>
-                                      <p:tavLst>
-                                        <p:tav tm="0" fmla="#ppt_w*sin(2.5*pi*$)">
-                                          <p:val>
-                                            <p:fltVal val="0"/>
-                                          </p:val>
-                                        </p:tav>
-                                        <p:tav tm="100000">
-                                          <p:val>
-                                            <p:fltVal val="1"/>
-                                          </p:val>
-                                        </p:tav>
-                                      </p:tavLst>
-                                    </p:anim>
-                                    <p:anim calcmode="lin" valueType="num">
+                                      <p:to>
+                                        <p:strVal val="visible"/>
+                                      </p:to>
+                                    </p:set>
+                                    <p:animEffect transition="in" filter="fade">
                                       <p:cBhvr>
-                                        <p:cTn id="9" dur="2000" fill="hold"/>
+                                        <p:cTn id="12" dur="500"/>
                                         <p:tgtEl>
-                                          <p:spTgt spid="7"/>
+                                          <p:spTgt spid="13"/>
+                                        </p:tgtEl>
+                                      </p:cBhvr>
+                                    </p:animEffect>
+                                  </p:childTnLst>
+                                </p:cTn>
+                              </p:par>
+                            </p:childTnLst>
+                          </p:cTn>
+                        </p:par>
+                      </p:childTnLst>
+                    </p:cTn>
+                  </p:par>
+                  <p:par>
+                    <p:cTn id="13" fill="hold">
+                      <p:stCondLst>
+                        <p:cond delay="indefinite"/>
+                      </p:stCondLst>
+                      <p:childTnLst>
+                        <p:par>
+                          <p:cTn id="14" fill="hold">
+                            <p:stCondLst>
+                              <p:cond delay="0"/>
+                            </p:stCondLst>
+                            <p:childTnLst>
+                              <p:par>
+                                <p:cTn id="15" presetID="10" presetClass="entr" presetSubtype="0" fill="hold" grpId="0" nodeType="clickEffect">
+                                  <p:stCondLst>
+                                    <p:cond delay="0"/>
+                                  </p:stCondLst>
+                                  <p:childTnLst>
+                                    <p:set>
+                                      <p:cBhvr>
+                                        <p:cTn id="16" dur="1" fill="hold">
+                                          <p:stCondLst>
+                                            <p:cond delay="0"/>
+                                          </p:stCondLst>
+                                        </p:cTn>
+                                        <p:tgtEl>
+                                          <p:spTgt spid="8"/>
                                         </p:tgtEl>
                                         <p:attrNameLst>
-                                          <p:attrName>ppt_h</p:attrName>
+                                          <p:attrName>style.visibility</p:attrName>
                                         </p:attrNameLst>
                                       </p:cBhvr>
-                                      <p:tavLst>
-                                        <p:tav tm="0">
-                                          <p:val>
-                                            <p:strVal val="#ppt_h"/>
-                                          </p:val>
-                                        </p:tav>
-                                        <p:tav tm="100000">
-                                          <p:val>
-                                            <p:strVal val="#ppt_h"/>
-                                          </p:val>
-                                        </p:tav>
-                                      </p:tavLst>
-                                    </p:anim>
+                                      <p:to>
+                                        <p:strVal val="visible"/>
+                                      </p:to>
+                                    </p:set>
+                                    <p:animEffect transition="in" filter="fade">
+                                      <p:cBhvr>
+                                        <p:cTn id="17" dur="500"/>
+                                        <p:tgtEl>
+                                          <p:spTgt spid="8"/>
+                                        </p:tgtEl>
+                                      </p:cBhvr>
+                                    </p:animEffect>
+                                  </p:childTnLst>
+                                </p:cTn>
+                              </p:par>
+                            </p:childTnLst>
+                          </p:cTn>
+                        </p:par>
+                      </p:childTnLst>
+                    </p:cTn>
+                  </p:par>
+                  <p:par>
+                    <p:cTn id="18" fill="hold">
+                      <p:stCondLst>
+                        <p:cond delay="indefinite"/>
+                      </p:stCondLst>
+                      <p:childTnLst>
+                        <p:par>
+                          <p:cTn id="19" fill="hold">
+                            <p:stCondLst>
+                              <p:cond delay="0"/>
+                            </p:stCondLst>
+                            <p:childTnLst>
+                              <p:par>
+                                <p:cTn id="20" presetID="10" presetClass="entr" presetSubtype="0" fill="hold" grpId="0" nodeType="clickEffect">
+                                  <p:stCondLst>
+                                    <p:cond delay="0"/>
+                                  </p:stCondLst>
+                                  <p:childTnLst>
+                                    <p:set>
+                                      <p:cBhvr>
+                                        <p:cTn id="21" dur="1" fill="hold">
+                                          <p:stCondLst>
+                                            <p:cond delay="0"/>
+                                          </p:stCondLst>
+                                        </p:cTn>
+                                        <p:tgtEl>
+                                          <p:spTgt spid="9"/>
+                                        </p:tgtEl>
+                                        <p:attrNameLst>
+                                          <p:attrName>style.visibility</p:attrName>
+                                        </p:attrNameLst>
+                                      </p:cBhvr>
+                                      <p:to>
+                                        <p:strVal val="visible"/>
+                                      </p:to>
+                                    </p:set>
+                                    <p:animEffect transition="in" filter="fade">
+                                      <p:cBhvr>
+                                        <p:cTn id="22" dur="500"/>
+                                        <p:tgtEl>
+                                          <p:spTgt spid="9"/>
+                                        </p:tgtEl>
+                                      </p:cBhvr>
+                                    </p:animEffect>
+                                  </p:childTnLst>
+                                </p:cTn>
+                              </p:par>
+                            </p:childTnLst>
+                          </p:cTn>
+                        </p:par>
+                      </p:childTnLst>
+                    </p:cTn>
+                  </p:par>
+                  <p:par>
+                    <p:cTn id="23" fill="hold">
+                      <p:stCondLst>
+                        <p:cond delay="indefinite"/>
+                      </p:stCondLst>
+                      <p:childTnLst>
+                        <p:par>
+                          <p:cTn id="24" fill="hold">
+                            <p:stCondLst>
+                              <p:cond delay="0"/>
+                            </p:stCondLst>
+                            <p:childTnLst>
+                              <p:par>
+                                <p:cTn id="25" presetID="10" presetClass="entr" presetSubtype="0" fill="hold" grpId="0" nodeType="clickEffect">
+                                  <p:stCondLst>
+                                    <p:cond delay="0"/>
+                                  </p:stCondLst>
+                                  <p:childTnLst>
+                                    <p:set>
+                                      <p:cBhvr>
+                                        <p:cTn id="26" dur="1" fill="hold">
+                                          <p:stCondLst>
+                                            <p:cond delay="0"/>
+                                          </p:stCondLst>
+                                        </p:cTn>
+                                        <p:tgtEl>
+                                          <p:spTgt spid="10"/>
+                                        </p:tgtEl>
+                                        <p:attrNameLst>
+                                          <p:attrName>style.visibility</p:attrName>
+                                        </p:attrNameLst>
+                                      </p:cBhvr>
+                                      <p:to>
+                                        <p:strVal val="visible"/>
+                                      </p:to>
+                                    </p:set>
+                                    <p:animEffect transition="in" filter="fade">
+                                      <p:cBhvr>
+                                        <p:cTn id="27" dur="500"/>
+                                        <p:tgtEl>
+                                          <p:spTgt spid="10"/>
+                                        </p:tgtEl>
+                                      </p:cBhvr>
+                                    </p:animEffect>
+                                  </p:childTnLst>
+                                </p:cTn>
+                              </p:par>
+                            </p:childTnLst>
+                          </p:cTn>
+                        </p:par>
+                      </p:childTnLst>
+                    </p:cTn>
+                  </p:par>
+                  <p:par>
+                    <p:cTn id="28" fill="hold">
+                      <p:stCondLst>
+                        <p:cond delay="indefinite"/>
+                      </p:stCondLst>
+                      <p:childTnLst>
+                        <p:par>
+                          <p:cTn id="29" fill="hold">
+                            <p:stCondLst>
+                              <p:cond delay="0"/>
+                            </p:stCondLst>
+                            <p:childTnLst>
+                              <p:par>
+                                <p:cTn id="30" presetID="10" presetClass="entr" presetSubtype="0" fill="hold" grpId="0" nodeType="clickEffect">
+                                  <p:stCondLst>
+                                    <p:cond delay="0"/>
+                                  </p:stCondLst>
+                                  <p:childTnLst>
+                                    <p:set>
+                                      <p:cBhvr>
+                                        <p:cTn id="31" dur="1" fill="hold">
+                                          <p:stCondLst>
+                                            <p:cond delay="0"/>
+                                          </p:stCondLst>
+                                        </p:cTn>
+                                        <p:tgtEl>
+                                          <p:spTgt spid="11"/>
+                                        </p:tgtEl>
+                                        <p:attrNameLst>
+                                          <p:attrName>style.visibility</p:attrName>
+                                        </p:attrNameLst>
+                                      </p:cBhvr>
+                                      <p:to>
+                                        <p:strVal val="visible"/>
+                                      </p:to>
+                                    </p:set>
+                                    <p:animEffect transition="in" filter="fade">
+                                      <p:cBhvr>
+                                        <p:cTn id="32" dur="500"/>
+                                        <p:tgtEl>
+                                          <p:spTgt spid="11"/>
+                                        </p:tgtEl>
+                                      </p:cBhvr>
+                                    </p:animEffect>
                                   </p:childTnLst>
                                 </p:cTn>
                               </p:par>
@@ -10829,7 +10106,12 @@
       </p:par>
     </p:tnLst>
     <p:bldLst>
-      <p:bldP spid="7" grpId="0"/>
+      <p:bldP spid="8" grpId="0"/>
+      <p:bldP spid="9" grpId="0"/>
+      <p:bldP spid="10" grpId="0"/>
+      <p:bldP spid="11" grpId="0"/>
+      <p:bldP spid="12" grpId="0"/>
+      <p:bldP spid="13" grpId="0"/>
     </p:bldLst>
   </p:timing>
 </p:sld>

</xml_diff>

<commit_message>
changes for inclass activity
</commit_message>
<xml_diff>
--- a/slides/On-Campus/03_02_Loops.pptx
+++ b/slides/On-Campus/03_02_Loops.pptx
@@ -226,7 +226,7 @@
           <a:p>
             <a:fld id="{4D7E51A5-B478-1E40-8CBB-0DAA8831E99D}" type="datetimeFigureOut">
               <a:rPr lang="en-US" smtClean="0"/>
-              <a:t>1/30/2022</a:t>
+              <a:t>2/3/22</a:t>
             </a:fld>
             <a:endParaRPr lang="en-US"/>
           </a:p>
@@ -391,7 +391,7 @@
           <a:p>
             <a:fld id="{D0ED587F-861E-6740-9643-E3DDAE89B8D6}" type="datetimeFigureOut">
               <a:rPr lang="en-US" smtClean="0"/>
-              <a:t>1/30/2022</a:t>
+              <a:t>2/3/22</a:t>
             </a:fld>
             <a:endParaRPr lang="en-US"/>
           </a:p>
@@ -8237,11 +8237,15 @@
                   <a:srgbClr val="092529"/>
                 </a:solidFill>
               </a:rPr>
-              <a:t>Tuesday </a:t>
+              <a:t>Thursday </a:t>
             </a:r>
             <a:r>
               <a:rPr lang="en-US" dirty="0"/>
-              <a:t>lab – meant to be done by Thursday</a:t>
+              <a:t>lab – meant to be done by </a:t>
+            </a:r>
+            <a:r>
+              <a:rPr lang="en-US" dirty="0" err="1"/>
+              <a:t>Tuseday</a:t>
             </a:r>
             <a:r>
               <a:rPr lang="en-US" dirty="0">
@@ -8254,103 +8258,6 @@
           </a:p>
           <a:p>
             <a:endParaRPr lang="en-US" b="1" dirty="0"/>
-          </a:p>
-        </p:txBody>
-      </p:sp>
-      <p:sp>
-        <p:nvSpPr>
-          <p:cNvPr id="7" name="TextBox 6">
-            <a:extLst>
-              <a:ext uri="{FF2B5EF4-FFF2-40B4-BE49-F238E27FC236}">
-                <a16:creationId xmlns:a16="http://schemas.microsoft.com/office/drawing/2014/main" id="{CB1D3C32-157D-4AB2-8254-1075DFAB882C}"/>
-              </a:ext>
-            </a:extLst>
-          </p:cNvPr>
-          <p:cNvSpPr txBox="1"/>
-          <p:nvPr/>
-        </p:nvSpPr>
-        <p:spPr>
-          <a:xfrm>
-            <a:off x="7202774" y="299645"/>
-            <a:ext cx="6910464" cy="707886"/>
-          </a:xfrm>
-          <a:prstGeom prst="rect">
-            <a:avLst/>
-          </a:prstGeom>
-          <a:noFill/>
-        </p:spPr>
-        <p:txBody>
-          <a:bodyPr wrap="square">
-            <a:spAutoFit/>
-          </a:bodyPr>
-          <a:lstStyle/>
-          <a:p>
-            <a:pPr marL="0" marR="0">
-              <a:spcBef>
-                <a:spcPts val="0"/>
-              </a:spcBef>
-              <a:spcAft>
-                <a:spcPts val="0"/>
-              </a:spcAft>
-            </a:pPr>
-            <a:r>
-              <a:rPr lang="en-US" sz="2000" dirty="0">
-                <a:effectLst/>
-                <a:latin typeface="Calibri" panose="020F0502020204030204" pitchFamily="34" charset="0"/>
-                <a:ea typeface="Calibri" panose="020F0502020204030204" pitchFamily="34" charset="0"/>
-              </a:rPr>
-              <a:t>February 2</a:t>
-            </a:r>
-            <a:r>
-              <a:rPr lang="en-US" sz="2000" baseline="30000" dirty="0">
-                <a:effectLst/>
-                <a:latin typeface="Calibri" panose="020F0502020204030204" pitchFamily="34" charset="0"/>
-                <a:ea typeface="Calibri" panose="020F0502020204030204" pitchFamily="34" charset="0"/>
-              </a:rPr>
-              <a:t>nd</a:t>
-            </a:r>
-            <a:r>
-              <a:rPr lang="en-US" sz="2000" dirty="0">
-                <a:effectLst/>
-                <a:latin typeface="Calibri" panose="020F0502020204030204" pitchFamily="34" charset="0"/>
-                <a:ea typeface="Calibri" panose="020F0502020204030204" pitchFamily="34" charset="0"/>
-              </a:rPr>
-              <a:t> : ACM – Presentation: Tech Interviews</a:t>
-            </a:r>
-          </a:p>
-          <a:p>
-            <a:pPr marL="0" marR="0">
-              <a:spcBef>
-                <a:spcPts val="0"/>
-              </a:spcBef>
-              <a:spcAft>
-                <a:spcPts val="0"/>
-              </a:spcAft>
-            </a:pPr>
-            <a:r>
-              <a:rPr lang="en-US" sz="2000" dirty="0">
-                <a:effectLst/>
-                <a:latin typeface="Calibri" panose="020F0502020204030204" pitchFamily="34" charset="0"/>
-                <a:ea typeface="Calibri" panose="020F0502020204030204" pitchFamily="34" charset="0"/>
-              </a:rPr>
-              <a:t>February 3</a:t>
-            </a:r>
-            <a:r>
-              <a:rPr lang="en-US" sz="2000" baseline="30000" dirty="0">
-                <a:effectLst/>
-                <a:latin typeface="Calibri" panose="020F0502020204030204" pitchFamily="34" charset="0"/>
-                <a:ea typeface="Calibri" panose="020F0502020204030204" pitchFamily="34" charset="0"/>
-              </a:rPr>
-              <a:t>rd</a:t>
-            </a:r>
-            <a:r>
-              <a:rPr lang="en-US" sz="2000" dirty="0">
-                <a:effectLst/>
-                <a:latin typeface="Calibri" panose="020F0502020204030204" pitchFamily="34" charset="0"/>
-                <a:ea typeface="Calibri" panose="020F0502020204030204" pitchFamily="34" charset="0"/>
-              </a:rPr>
-              <a:t> : ACM-W – Career Fair Prep</a:t>
-            </a:r>
           </a:p>
         </p:txBody>
       </p:sp>
@@ -8567,7 +8474,7 @@
             </a:r>
             <a:r>
               <a:rPr lang="en-US" dirty="0"/>
-              <a:t> and IDEs </a:t>
+              <a:t> and IDEs (bring laptop) </a:t>
             </a:r>
           </a:p>
           <a:p>
@@ -8580,7 +8487,7 @@
             <a:pPr lvl="1"/>
             <a:r>
               <a:rPr lang="en-US" dirty="0"/>
-              <a:t>bring your laptop if you want help</a:t>
+              <a:t>bring your laptop again</a:t>
             </a:r>
           </a:p>
           <a:p>

</xml_diff>